<commit_message>
2022/12/28 ppt view, class 추가
</commit_message>
<xml_diff>
--- a/보고서/발표보고서 홍민준.pptx
+++ b/보고서/발표보고서 홍민준.pptx
@@ -7,12 +7,14 @@
   <p:sldIdLst>
     <p:sldId id="256" r:id="rId2"/>
     <p:sldId id="258" r:id="rId3"/>
-    <p:sldId id="260" r:id="rId4"/>
-    <p:sldId id="261" r:id="rId5"/>
-    <p:sldId id="262" r:id="rId6"/>
-    <p:sldId id="263" r:id="rId7"/>
-    <p:sldId id="264" r:id="rId8"/>
-    <p:sldId id="265" r:id="rId9"/>
+    <p:sldId id="268" r:id="rId4"/>
+    <p:sldId id="269" r:id="rId5"/>
+    <p:sldId id="260" r:id="rId6"/>
+    <p:sldId id="261" r:id="rId7"/>
+    <p:sldId id="262" r:id="rId8"/>
+    <p:sldId id="263" r:id="rId9"/>
+    <p:sldId id="264" r:id="rId10"/>
+    <p:sldId id="265" r:id="rId11"/>
   </p:sldIdLst>
   <p:sldSz cx="12192000" cy="6858000"/>
   <p:notesSz cx="6858000" cy="9144000"/>
@@ -289,7 +291,7 @@
             <a:fld id="{87DE6118-2437-4B30-8E3C-4D2BE6020583}" type="datetimeFigureOut">
               <a:rPr lang="en-US" dirty="0"/>
               <a:pPr/>
-              <a:t>12/27/2022</a:t>
+              <a:t>12/28/2022</a:t>
             </a:fld>
             <a:endParaRPr lang="en-US" dirty="0"/>
           </a:p>
@@ -615,7 +617,7 @@
           <a:p>
             <a:fld id="{87DE6118-2437-4B30-8E3C-4D2BE6020583}" type="datetimeFigureOut">
               <a:rPr lang="en-US" dirty="0"/>
-              <a:t>12/27/2022</a:t>
+              <a:t>12/28/2022</a:t>
             </a:fld>
             <a:endParaRPr lang="en-US" dirty="0"/>
           </a:p>
@@ -790,7 +792,7 @@
           <a:p>
             <a:fld id="{87DE6118-2437-4B30-8E3C-4D2BE6020583}" type="datetimeFigureOut">
               <a:rPr lang="en-US" dirty="0"/>
-              <a:t>12/27/2022</a:t>
+              <a:t>12/28/2022</a:t>
             </a:fld>
             <a:endParaRPr lang="en-US" dirty="0"/>
           </a:p>
@@ -955,7 +957,7 @@
           <a:p>
             <a:fld id="{87DE6118-2437-4B30-8E3C-4D2BE6020583}" type="datetimeFigureOut">
               <a:rPr lang="en-US" dirty="0"/>
-              <a:t>12/27/2022</a:t>
+              <a:t>12/28/2022</a:t>
             </a:fld>
             <a:endParaRPr lang="en-US" dirty="0"/>
           </a:p>
@@ -1228,7 +1230,7 @@
             <a:fld id="{87DE6118-2437-4B30-8E3C-4D2BE6020583}" type="datetimeFigureOut">
               <a:rPr lang="en-US" dirty="0"/>
               <a:pPr/>
-              <a:t>12/27/2022</a:t>
+              <a:t>12/28/2022</a:t>
             </a:fld>
             <a:endParaRPr lang="en-US" dirty="0"/>
           </a:p>
@@ -1618,7 +1620,7 @@
           <a:p>
             <a:fld id="{87DE6118-2437-4B30-8E3C-4D2BE6020583}" type="datetimeFigureOut">
               <a:rPr lang="en-US" dirty="0"/>
-              <a:t>12/27/2022</a:t>
+              <a:t>12/28/2022</a:t>
             </a:fld>
             <a:endParaRPr lang="en-US" dirty="0"/>
           </a:p>
@@ -2090,7 +2092,7 @@
           <a:p>
             <a:fld id="{87DE6118-2437-4B30-8E3C-4D2BE6020583}" type="datetimeFigureOut">
               <a:rPr lang="en-US" dirty="0"/>
-              <a:t>12/27/2022</a:t>
+              <a:t>12/28/2022</a:t>
             </a:fld>
             <a:endParaRPr lang="en-US" dirty="0"/>
           </a:p>
@@ -2203,7 +2205,7 @@
           <a:p>
             <a:fld id="{87DE6118-2437-4B30-8E3C-4D2BE6020583}" type="datetimeFigureOut">
               <a:rPr lang="en-US" dirty="0"/>
-              <a:t>12/27/2022</a:t>
+              <a:t>12/28/2022</a:t>
             </a:fld>
             <a:endParaRPr lang="en-US" dirty="0"/>
           </a:p>
@@ -2293,7 +2295,7 @@
           <a:p>
             <a:fld id="{87DE6118-2437-4B30-8E3C-4D2BE6020583}" type="datetimeFigureOut">
               <a:rPr lang="en-US" dirty="0"/>
-              <a:t>12/27/2022</a:t>
+              <a:t>12/28/2022</a:t>
             </a:fld>
             <a:endParaRPr lang="en-US" dirty="0"/>
           </a:p>
@@ -2635,7 +2637,7 @@
             <a:fld id="{87DE6118-2437-4B30-8E3C-4D2BE6020583}" type="datetimeFigureOut">
               <a:rPr lang="en-US" dirty="0"/>
               <a:pPr/>
-              <a:t>12/27/2022</a:t>
+              <a:t>12/28/2022</a:t>
             </a:fld>
             <a:endParaRPr lang="en-US" dirty="0"/>
           </a:p>
@@ -3020,7 +3022,7 @@
             <a:fld id="{87DE6118-2437-4B30-8E3C-4D2BE6020583}" type="datetimeFigureOut">
               <a:rPr lang="en-US" dirty="0"/>
               <a:pPr/>
-              <a:t>12/27/2022</a:t>
+              <a:t>12/28/2022</a:t>
             </a:fld>
             <a:endParaRPr lang="en-US" dirty="0"/>
           </a:p>
@@ -3295,7 +3297,7 @@
             <a:fld id="{87DE6118-2437-4B30-8E3C-4D2BE6020583}" type="datetimeFigureOut">
               <a:rPr lang="en-US" dirty="0"/>
               <a:pPr/>
-              <a:t>12/27/2022</a:t>
+              <a:t>12/28/2022</a:t>
             </a:fld>
             <a:endParaRPr lang="en-US" dirty="0"/>
           </a:p>
@@ -3854,6 +3856,416 @@
 </p:sld>
 </file>
 
+<file path=ppt/slides/slide10.xml><?xml version="1.0" encoding="utf-8"?>
+<p:sld xmlns:a="http://schemas.openxmlformats.org/drawingml/2006/main" xmlns:r="http://schemas.openxmlformats.org/officeDocument/2006/relationships" xmlns:p="http://schemas.openxmlformats.org/presentationml/2006/main">
+  <p:cSld>
+    <p:spTree>
+      <p:nvGrpSpPr>
+        <p:cNvPr id="1" name=""/>
+        <p:cNvGrpSpPr/>
+        <p:nvPr/>
+      </p:nvGrpSpPr>
+      <p:grpSpPr>
+        <a:xfrm>
+          <a:off x="0" y="0"/>
+          <a:ext cx="0" cy="0"/>
+          <a:chOff x="0" y="0"/>
+          <a:chExt cx="0" cy="0"/>
+        </a:xfrm>
+      </p:grpSpPr>
+      <p:sp>
+        <p:nvSpPr>
+          <p:cNvPr id="2" name="제목 1"/>
+          <p:cNvSpPr>
+            <a:spLocks noGrp="1"/>
+          </p:cNvSpPr>
+          <p:nvPr>
+            <p:ph type="title"/>
+          </p:nvPr>
+        </p:nvSpPr>
+        <p:spPr>
+          <a:xfrm>
+            <a:off x="730666" y="0"/>
+            <a:ext cx="9601200" cy="1485900"/>
+          </a:xfrm>
+        </p:spPr>
+        <p:txBody>
+          <a:bodyPr/>
+          <a:lstStyle/>
+          <a:p>
+            <a:r>
+              <a:rPr lang="en-US" altLang="ko-KR" dirty="0" smtClean="0"/>
+              <a:t>Admin Notice List </a:t>
+            </a:r>
+            <a:r>
+              <a:rPr lang="ko-KR" altLang="en-US" dirty="0" smtClean="0"/>
+              <a:t>기능</a:t>
+            </a:r>
+            <a:endParaRPr lang="ko-KR" altLang="en-US" dirty="0"/>
+          </a:p>
+        </p:txBody>
+      </p:sp>
+      <p:sp>
+        <p:nvSpPr>
+          <p:cNvPr id="6" name="TextBox 5"/>
+          <p:cNvSpPr txBox="1"/>
+          <p:nvPr/>
+        </p:nvSpPr>
+        <p:spPr>
+          <a:xfrm>
+            <a:off x="8460065" y="117693"/>
+            <a:ext cx="3153398" cy="6740307"/>
+          </a:xfrm>
+          <a:prstGeom prst="rect">
+            <a:avLst/>
+          </a:prstGeom>
+          <a:noFill/>
+        </p:spPr>
+        <p:txBody>
+          <a:bodyPr wrap="square" rtlCol="0">
+            <a:spAutoFit/>
+          </a:bodyPr>
+          <a:lstStyle/>
+          <a:p>
+            <a:r>
+              <a:rPr lang="ko-KR" altLang="en-US" sz="1600" dirty="0" smtClean="0"/>
+              <a:t>기능 설명</a:t>
+            </a:r>
+            <a:endParaRPr lang="en-US" altLang="ko-KR" sz="1600" dirty="0" smtClean="0"/>
+          </a:p>
+          <a:p>
+            <a:pPr marL="342900" indent="-342900">
+              <a:buFont typeface="+mj-lt"/>
+              <a:buAutoNum type="arabicPeriod"/>
+            </a:pPr>
+            <a:r>
+              <a:rPr lang="ko-KR" altLang="en-US" sz="1600" dirty="0" smtClean="0"/>
+              <a:t>고객센터 메뉴</a:t>
+            </a:r>
+            <a:r>
+              <a:rPr lang="en-US" altLang="ko-KR" sz="1600" dirty="0"/>
+              <a:t> </a:t>
+            </a:r>
+            <a:endParaRPr lang="en-US" altLang="ko-KR" sz="1600" dirty="0" smtClean="0"/>
+          </a:p>
+          <a:p>
+            <a:pPr marL="285750" indent="-285750">
+              <a:buFontTx/>
+              <a:buChar char="-"/>
+            </a:pPr>
+            <a:r>
+              <a:rPr lang="ko-KR" altLang="en-US" sz="1600" dirty="0" smtClean="0"/>
+              <a:t>공지사항을 </a:t>
+            </a:r>
+            <a:r>
+              <a:rPr lang="ko-KR" altLang="en-US" sz="1600" dirty="0"/>
+              <a:t>등록</a:t>
+            </a:r>
+            <a:r>
+              <a:rPr lang="en-US" altLang="ko-KR" sz="1600" dirty="0"/>
+              <a:t>, </a:t>
+            </a:r>
+            <a:r>
+              <a:rPr lang="ko-KR" altLang="en-US" sz="1600" dirty="0"/>
+              <a:t>수정</a:t>
+            </a:r>
+            <a:r>
+              <a:rPr lang="en-US" altLang="ko-KR" sz="1600" dirty="0"/>
+              <a:t>, </a:t>
+            </a:r>
+            <a:r>
+              <a:rPr lang="ko-KR" altLang="en-US" sz="1600" dirty="0"/>
+              <a:t>삭제하는 관리 메뉴 </a:t>
+            </a:r>
+            <a:endParaRPr lang="en-US" altLang="ko-KR" sz="1600" dirty="0" smtClean="0"/>
+          </a:p>
+          <a:p>
+            <a:endParaRPr lang="en-US" altLang="ko-KR" sz="1600" dirty="0" smtClean="0"/>
+          </a:p>
+          <a:p>
+            <a:pPr marL="342900" indent="-342900">
+              <a:buAutoNum type="arabicPeriod" startAt="2"/>
+            </a:pPr>
+            <a:r>
+              <a:rPr lang="ko-KR" altLang="en-US" sz="1600" dirty="0"/>
+              <a:t>공지사항 </a:t>
+            </a:r>
+            <a:r>
+              <a:rPr lang="ko-KR" altLang="en-US" sz="1600" dirty="0" smtClean="0"/>
+              <a:t>유형 선택 </a:t>
+            </a:r>
+            <a:endParaRPr lang="en-US" altLang="ko-KR" sz="1600" dirty="0" smtClean="0"/>
+          </a:p>
+          <a:p>
+            <a:pPr marL="285750" indent="-285750">
+              <a:buFontTx/>
+              <a:buChar char="-"/>
+            </a:pPr>
+            <a:r>
+              <a:rPr lang="ko-KR" altLang="en-US" sz="1600" dirty="0"/>
+              <a:t>공지사항 유형별 목록 출력하기</a:t>
+            </a:r>
+            <a:endParaRPr lang="en-US" altLang="ko-KR" sz="1600" dirty="0" smtClean="0"/>
+          </a:p>
+          <a:p>
+            <a:pPr marL="285750" indent="-285750">
+              <a:buFontTx/>
+              <a:buChar char="-"/>
+            </a:pPr>
+            <a:r>
+              <a:rPr lang="ko-KR" altLang="en-US" sz="1600" dirty="0" smtClean="0"/>
+              <a:t>공지사항 </a:t>
+            </a:r>
+            <a:r>
+              <a:rPr lang="ko-KR" altLang="en-US" sz="1600" dirty="0"/>
+              <a:t>유형 선택할 때 마다 목록 갱신 됨 </a:t>
+            </a:r>
+            <a:endParaRPr lang="en-US" altLang="ko-KR" sz="1600" dirty="0" smtClean="0"/>
+          </a:p>
+          <a:p>
+            <a:endParaRPr lang="en-US" altLang="ko-KR" sz="1600" dirty="0" smtClean="0"/>
+          </a:p>
+          <a:p>
+            <a:r>
+              <a:rPr lang="en-US" altLang="ko-KR" sz="1600" dirty="0" smtClean="0"/>
+              <a:t>3.  </a:t>
+            </a:r>
+            <a:r>
+              <a:rPr lang="ko-KR" altLang="en-US" sz="1600" dirty="0" smtClean="0"/>
+              <a:t>선택 삭제 </a:t>
+            </a:r>
+            <a:endParaRPr lang="en-US" altLang="ko-KR" sz="1600" dirty="0" smtClean="0"/>
+          </a:p>
+          <a:p>
+            <a:pPr marL="285750" indent="-285750">
+              <a:buFontTx/>
+              <a:buChar char="-"/>
+            </a:pPr>
+            <a:r>
+              <a:rPr lang="ko-KR" altLang="en-US" sz="1600" dirty="0" smtClean="0"/>
+              <a:t>체크박스 </a:t>
+            </a:r>
+            <a:r>
+              <a:rPr lang="ko-KR" altLang="en-US" sz="1600" dirty="0"/>
+              <a:t>선택한 글 </a:t>
+            </a:r>
+            <a:r>
+              <a:rPr lang="ko-KR" altLang="en-US" sz="1600" dirty="0" smtClean="0"/>
+              <a:t>선택 삭제</a:t>
+            </a:r>
+            <a:endParaRPr lang="en-US" altLang="ko-KR" sz="1600" dirty="0" smtClean="0"/>
+          </a:p>
+          <a:p>
+            <a:endParaRPr lang="en-US" altLang="ko-KR" sz="1600" dirty="0" smtClean="0"/>
+          </a:p>
+          <a:p>
+            <a:r>
+              <a:rPr lang="en-US" altLang="ko-KR" sz="1600" dirty="0" smtClean="0"/>
+              <a:t>4.  </a:t>
+            </a:r>
+            <a:r>
+              <a:rPr lang="ko-KR" altLang="en-US" sz="1600" dirty="0" smtClean="0"/>
+              <a:t>공지사항 </a:t>
+            </a:r>
+            <a:r>
+              <a:rPr lang="ko-KR" altLang="en-US" sz="1600" dirty="0"/>
+              <a:t>제목 </a:t>
+            </a:r>
+            <a:endParaRPr lang="en-US" altLang="ko-KR" sz="1600" dirty="0" smtClean="0"/>
+          </a:p>
+          <a:p>
+            <a:r>
+              <a:rPr lang="en-US" altLang="ko-KR" sz="1600" dirty="0" smtClean="0"/>
+              <a:t>-    </a:t>
+            </a:r>
+            <a:r>
+              <a:rPr lang="ko-KR" altLang="en-US" sz="1600" dirty="0" smtClean="0"/>
+              <a:t>제목 클릭 시 글 보기 </a:t>
+            </a:r>
+            <a:r>
+              <a:rPr lang="ko-KR" altLang="en-US" sz="1600" dirty="0"/>
+              <a:t>이동 </a:t>
+            </a:r>
+            <a:endParaRPr lang="en-US" altLang="ko-KR" sz="1600" dirty="0"/>
+          </a:p>
+          <a:p>
+            <a:endParaRPr lang="en-US" altLang="ko-KR" sz="1600" dirty="0" smtClean="0"/>
+          </a:p>
+          <a:p>
+            <a:r>
+              <a:rPr lang="en-US" altLang="ko-KR" sz="1600" dirty="0" smtClean="0"/>
+              <a:t>5. </a:t>
+            </a:r>
+            <a:r>
+              <a:rPr lang="ko-KR" altLang="en-US" sz="1600" dirty="0"/>
+              <a:t>관리 </a:t>
+            </a:r>
+            <a:endParaRPr lang="en-US" altLang="ko-KR" sz="1600" dirty="0" smtClean="0"/>
+          </a:p>
+          <a:p>
+            <a:pPr marL="285750" indent="-285750">
+              <a:buFontTx/>
+              <a:buChar char="-"/>
+            </a:pPr>
+            <a:r>
+              <a:rPr lang="ko-KR" altLang="en-US" sz="1600" dirty="0" smtClean="0"/>
+              <a:t>삭제 </a:t>
+            </a:r>
+            <a:r>
+              <a:rPr lang="en-US" altLang="ko-KR" sz="1600" dirty="0"/>
+              <a:t>: </a:t>
+            </a:r>
+            <a:r>
+              <a:rPr lang="ko-KR" altLang="en-US" sz="1600" dirty="0"/>
+              <a:t>확인 대화상자 </a:t>
+            </a:r>
+            <a:r>
+              <a:rPr lang="ko-KR" altLang="en-US" sz="1600" dirty="0" smtClean="0"/>
+              <a:t>출력 후 </a:t>
+            </a:r>
+            <a:r>
+              <a:rPr lang="ko-KR" altLang="en-US" sz="1600" dirty="0"/>
+              <a:t>삭제 </a:t>
+            </a:r>
+            <a:endParaRPr lang="en-US" altLang="ko-KR" sz="1600" dirty="0" smtClean="0"/>
+          </a:p>
+          <a:p>
+            <a:pPr marL="285750" indent="-285750">
+              <a:buFontTx/>
+              <a:buChar char="-"/>
+            </a:pPr>
+            <a:r>
+              <a:rPr lang="ko-KR" altLang="en-US" sz="1600" dirty="0" smtClean="0"/>
+              <a:t>수정 </a:t>
+            </a:r>
+            <a:r>
+              <a:rPr lang="en-US" altLang="ko-KR" sz="1600" dirty="0"/>
+              <a:t>: </a:t>
+            </a:r>
+            <a:r>
+              <a:rPr lang="ko-KR" altLang="en-US" sz="1600" dirty="0" smtClean="0"/>
+              <a:t>글 수정 </a:t>
+            </a:r>
+            <a:r>
+              <a:rPr lang="ko-KR" altLang="en-US" sz="1600" dirty="0"/>
+              <a:t>화면으로 </a:t>
+            </a:r>
+            <a:r>
+              <a:rPr lang="ko-KR" altLang="en-US" sz="1600" dirty="0" smtClean="0"/>
+              <a:t>이동</a:t>
+            </a:r>
+            <a:endParaRPr lang="en-US" altLang="ko-KR" sz="1600" dirty="0" smtClean="0"/>
+          </a:p>
+          <a:p>
+            <a:endParaRPr lang="en-US" altLang="ko-KR" sz="1600" dirty="0"/>
+          </a:p>
+          <a:p>
+            <a:r>
+              <a:rPr lang="en-US" altLang="ko-KR" sz="1600" dirty="0"/>
+              <a:t>6 </a:t>
+            </a:r>
+            <a:r>
+              <a:rPr lang="en-US" altLang="ko-KR" sz="1600" dirty="0" smtClean="0"/>
+              <a:t>. </a:t>
+            </a:r>
+            <a:r>
+              <a:rPr lang="ko-KR" altLang="en-US" sz="1600" dirty="0" smtClean="0"/>
+              <a:t>페이지 </a:t>
+            </a:r>
+            <a:r>
+              <a:rPr lang="ko-KR" altLang="en-US" sz="1600" dirty="0"/>
+              <a:t>번호 </a:t>
+            </a:r>
+            <a:endParaRPr lang="en-US" altLang="ko-KR" sz="1600" dirty="0" smtClean="0"/>
+          </a:p>
+          <a:p>
+            <a:r>
+              <a:rPr lang="en-US" altLang="ko-KR" sz="1600" dirty="0" smtClean="0"/>
+              <a:t>-     10</a:t>
+            </a:r>
+            <a:r>
+              <a:rPr lang="ko-KR" altLang="en-US" sz="1600" dirty="0"/>
+              <a:t>개씩 공지사항 출력</a:t>
+            </a:r>
+            <a:endParaRPr lang="en-US" altLang="ko-KR" sz="1600" dirty="0" smtClean="0"/>
+          </a:p>
+          <a:p>
+            <a:pPr marL="342900" indent="-342900">
+              <a:buFont typeface="+mj-lt"/>
+              <a:buAutoNum type="arabicPeriod"/>
+            </a:pPr>
+            <a:endParaRPr lang="en-US" altLang="ko-KR" sz="1600" dirty="0" smtClean="0"/>
+          </a:p>
+          <a:p>
+            <a:pPr marL="342900" indent="-342900">
+              <a:buAutoNum type="arabicPeriod" startAt="7"/>
+            </a:pPr>
+            <a:r>
+              <a:rPr lang="ko-KR" altLang="en-US" sz="1600" dirty="0" smtClean="0"/>
+              <a:t>작성하기 </a:t>
+            </a:r>
+            <a:endParaRPr lang="en-US" altLang="ko-KR" sz="1600" dirty="0" smtClean="0"/>
+          </a:p>
+          <a:p>
+            <a:pPr marL="285750" indent="-285750">
+              <a:buFontTx/>
+              <a:buChar char="-"/>
+            </a:pPr>
+            <a:r>
+              <a:rPr lang="ko-KR" altLang="en-US" sz="1600" dirty="0" smtClean="0"/>
+              <a:t>작성하기 </a:t>
+            </a:r>
+            <a:r>
+              <a:rPr lang="ko-KR" altLang="en-US" sz="1600" dirty="0"/>
+              <a:t>페이지로 이동</a:t>
+            </a:r>
+            <a:endParaRPr lang="en-US" altLang="ko-KR" sz="1600" dirty="0" smtClean="0"/>
+          </a:p>
+        </p:txBody>
+      </p:sp>
+      <p:pic>
+        <p:nvPicPr>
+          <p:cNvPr id="3" name="그림 2"/>
+          <p:cNvPicPr>
+            <a:picLocks noChangeAspect="1"/>
+          </p:cNvPicPr>
+          <p:nvPr/>
+        </p:nvPicPr>
+        <p:blipFill>
+          <a:blip r:embed="rId2">
+            <a:extLst>
+              <a:ext uri="{28A0092B-C50C-407E-A947-70E740481C1C}">
+                <a14:useLocalDpi xmlns:a14="http://schemas.microsoft.com/office/drawing/2010/main" val="0"/>
+              </a:ext>
+            </a:extLst>
+          </a:blip>
+          <a:stretch>
+            <a:fillRect/>
+          </a:stretch>
+        </p:blipFill>
+        <p:spPr>
+          <a:xfrm>
+            <a:off x="923050" y="948690"/>
+            <a:ext cx="7344631" cy="4562648"/>
+          </a:xfrm>
+          <a:prstGeom prst="rect">
+            <a:avLst/>
+          </a:prstGeom>
+        </p:spPr>
+      </p:pic>
+    </p:spTree>
+    <p:extLst>
+      <p:ext uri="{BB962C8B-B14F-4D97-AF65-F5344CB8AC3E}">
+        <p14:creationId xmlns:p14="http://schemas.microsoft.com/office/powerpoint/2010/main" val="2503265829"/>
+      </p:ext>
+    </p:extLst>
+  </p:cSld>
+  <p:clrMapOvr>
+    <a:masterClrMapping/>
+  </p:clrMapOvr>
+</p:sld>
+</file>
+
 <file path=ppt/slides/slide2.xml><?xml version="1.0" encoding="utf-8"?>
 <p:sld xmlns:a="http://schemas.openxmlformats.org/drawingml/2006/main" xmlns:r="http://schemas.openxmlformats.org/officeDocument/2006/relationships" xmlns:p="http://schemas.openxmlformats.org/presentationml/2006/main">
   <p:cSld>
@@ -4024,7 +4436,7 @@
         <p:spPr>
           <a:xfrm>
             <a:off x="730666" y="0"/>
-            <a:ext cx="9601200" cy="1485900"/>
+            <a:ext cx="9601200" cy="709301"/>
           </a:xfrm>
         </p:spPr>
         <p:txBody>
@@ -4033,123 +4445,119 @@
           <a:p>
             <a:r>
               <a:rPr lang="en-US" altLang="ko-KR" dirty="0" smtClean="0"/>
-              <a:t>Main index list </a:t>
-            </a:r>
-            <a:r>
-              <a:rPr lang="ko-KR" altLang="en-US" dirty="0" smtClean="0"/>
-              <a:t>기능</a:t>
+              <a:t>4. </a:t>
+            </a:r>
+            <a:r>
+              <a:rPr lang="ko-KR" altLang="en-US" dirty="0" err="1" smtClean="0"/>
+              <a:t>작업내역</a:t>
+            </a:r>
+            <a:r>
+              <a:rPr lang="en-US" altLang="ko-KR" dirty="0" smtClean="0"/>
+              <a:t>(View)</a:t>
             </a:r>
             <a:endParaRPr lang="ko-KR" altLang="en-US" dirty="0"/>
           </a:p>
         </p:txBody>
       </p:sp>
-      <p:sp>
-        <p:nvSpPr>
-          <p:cNvPr id="6" name="TextBox 5"/>
-          <p:cNvSpPr txBox="1"/>
+      <p:pic>
+        <p:nvPicPr>
+          <p:cNvPr id="3" name="그림 2"/>
+          <p:cNvPicPr>
+            <a:picLocks noChangeAspect="1"/>
+          </p:cNvPicPr>
           <p:nvPr/>
-        </p:nvSpPr>
-        <p:spPr>
-          <a:xfrm>
-            <a:off x="8511611" y="1517799"/>
-            <a:ext cx="3153398" cy="3693319"/>
+        </p:nvPicPr>
+        <p:blipFill>
+          <a:blip r:embed="rId2">
+            <a:extLst>
+              <a:ext uri="{28A0092B-C50C-407E-A947-70E740481C1C}">
+                <a14:useLocalDpi xmlns:a14="http://schemas.microsoft.com/office/drawing/2010/main" val="0"/>
+              </a:ext>
+            </a:extLst>
+          </a:blip>
+          <a:stretch>
+            <a:fillRect/>
+          </a:stretch>
+        </p:blipFill>
+        <p:spPr>
+          <a:xfrm>
+            <a:off x="1399386" y="645971"/>
+            <a:ext cx="5001414" cy="6103963"/>
           </a:xfrm>
           <a:prstGeom prst="rect">
             <a:avLst/>
           </a:prstGeom>
-          <a:noFill/>
-        </p:spPr>
-        <p:txBody>
-          <a:bodyPr wrap="square" rtlCol="0">
-            <a:spAutoFit/>
-          </a:bodyPr>
+        </p:spPr>
+      </p:pic>
+    </p:spTree>
+    <p:extLst>
+      <p:ext uri="{BB962C8B-B14F-4D97-AF65-F5344CB8AC3E}">
+        <p14:creationId xmlns:p14="http://schemas.microsoft.com/office/powerpoint/2010/main" val="1074714863"/>
+      </p:ext>
+    </p:extLst>
+  </p:cSld>
+  <p:clrMapOvr>
+    <a:masterClrMapping/>
+  </p:clrMapOvr>
+  <p:timing>
+    <p:tnLst>
+      <p:par>
+        <p:cTn id="1" dur="indefinite" restart="never" nodeType="tmRoot"/>
+      </p:par>
+    </p:tnLst>
+  </p:timing>
+</p:sld>
+</file>
+
+<file path=ppt/slides/slide4.xml><?xml version="1.0" encoding="utf-8"?>
+<p:sld xmlns:a="http://schemas.openxmlformats.org/drawingml/2006/main" xmlns:r="http://schemas.openxmlformats.org/officeDocument/2006/relationships" xmlns:p="http://schemas.openxmlformats.org/presentationml/2006/main">
+  <p:cSld>
+    <p:spTree>
+      <p:nvGrpSpPr>
+        <p:cNvPr id="1" name=""/>
+        <p:cNvGrpSpPr/>
+        <p:nvPr/>
+      </p:nvGrpSpPr>
+      <p:grpSpPr>
+        <a:xfrm>
+          <a:off x="0" y="0"/>
+          <a:ext cx="0" cy="0"/>
+          <a:chOff x="0" y="0"/>
+          <a:chExt cx="0" cy="0"/>
+        </a:xfrm>
+      </p:grpSpPr>
+      <p:sp>
+        <p:nvSpPr>
+          <p:cNvPr id="2" name="제목 1"/>
+          <p:cNvSpPr>
+            <a:spLocks noGrp="1"/>
+          </p:cNvSpPr>
+          <p:nvPr>
+            <p:ph type="title"/>
+          </p:nvPr>
+        </p:nvSpPr>
+        <p:spPr>
+          <a:xfrm>
+            <a:off x="730666" y="0"/>
+            <a:ext cx="9601200" cy="709301"/>
+          </a:xfrm>
+        </p:spPr>
+        <p:txBody>
+          <a:bodyPr/>
           <a:lstStyle/>
           <a:p>
             <a:r>
-              <a:rPr lang="ko-KR" altLang="en-US" dirty="0" smtClean="0"/>
-              <a:t>기능 </a:t>
-            </a:r>
-            <a:r>
-              <a:rPr lang="ko-KR" altLang="en-US" dirty="0" smtClean="0"/>
-              <a:t>설명</a:t>
-            </a:r>
-            <a:endParaRPr lang="en-US" altLang="ko-KR" dirty="0" smtClean="0"/>
-          </a:p>
-          <a:p>
-            <a:pPr marL="285750" indent="-285750">
-              <a:buFont typeface="Arial" panose="020B0604020202020204" pitchFamily="34" charset="0"/>
-              <a:buChar char="•"/>
-            </a:pPr>
-            <a:r>
-              <a:rPr lang="ko-KR" altLang="en-US" dirty="0" smtClean="0"/>
-              <a:t>상품별 </a:t>
-            </a:r>
-            <a:r>
               <a:rPr lang="en-US" altLang="ko-KR" dirty="0" smtClean="0"/>
-              <a:t>list </a:t>
-            </a:r>
-            <a:r>
-              <a:rPr lang="ko-KR" altLang="en-US" dirty="0" smtClean="0"/>
-              <a:t>출력</a:t>
-            </a:r>
-            <a:endParaRPr lang="en-US" altLang="ko-KR" dirty="0" smtClean="0"/>
-          </a:p>
-          <a:p>
-            <a:pPr marL="285750" indent="-285750">
-              <a:buFont typeface="Arial" panose="020B0604020202020204" pitchFamily="34" charset="0"/>
-              <a:buChar char="•"/>
-            </a:pPr>
-            <a:r>
-              <a:rPr lang="ko-KR" altLang="en-US" dirty="0"/>
-              <a:t>상품별 스크롤 </a:t>
-            </a:r>
-            <a:r>
-              <a:rPr lang="ko-KR" altLang="en-US" dirty="0" err="1"/>
-              <a:t>이동링크</a:t>
-            </a:r>
-            <a:endParaRPr lang="en-US" altLang="ko-KR" dirty="0"/>
-          </a:p>
-          <a:p>
-            <a:pPr marL="285750" indent="-285750">
-              <a:buFont typeface="Arial" panose="020B0604020202020204" pitchFamily="34" charset="0"/>
-              <a:buChar char="•"/>
-            </a:pPr>
-            <a:r>
-              <a:rPr lang="ko-KR" altLang="en-US" dirty="0"/>
-              <a:t>해당 상품 클릭 시 뷰로 이동</a:t>
-            </a:r>
-            <a:endParaRPr lang="en-US" altLang="ko-KR" dirty="0"/>
-          </a:p>
-          <a:p>
-            <a:pPr marL="285750" indent="-285750">
-              <a:buFont typeface="Arial" panose="020B0604020202020204" pitchFamily="34" charset="0"/>
-              <a:buChar char="•"/>
-            </a:pPr>
-            <a:endParaRPr lang="en-US" altLang="ko-KR" dirty="0" smtClean="0"/>
-          </a:p>
-          <a:p>
-            <a:pPr marL="285750" indent="-285750">
-              <a:buFont typeface="Arial" panose="020B0604020202020204" pitchFamily="34" charset="0"/>
-              <a:buChar char="•"/>
-            </a:pPr>
-            <a:endParaRPr lang="en-US" altLang="ko-KR" dirty="0" smtClean="0"/>
-          </a:p>
-          <a:p>
-            <a:endParaRPr lang="en-US" altLang="ko-KR" dirty="0"/>
-          </a:p>
-          <a:p>
-            <a:endParaRPr lang="en-US" altLang="ko-KR" dirty="0" smtClean="0"/>
-          </a:p>
-          <a:p>
-            <a:endParaRPr lang="en-US" altLang="ko-KR" dirty="0"/>
-          </a:p>
-          <a:p>
-            <a:endParaRPr lang="en-US" altLang="ko-KR" dirty="0" smtClean="0"/>
-          </a:p>
-          <a:p>
-            <a:endParaRPr lang="en-US" altLang="ko-KR" dirty="0"/>
-          </a:p>
-          <a:p>
+              <a:t>4. </a:t>
+            </a:r>
+            <a:r>
+              <a:rPr lang="ko-KR" altLang="en-US" dirty="0" err="1" smtClean="0"/>
+              <a:t>작업내역</a:t>
+            </a:r>
+            <a:r>
+              <a:rPr lang="en-US" altLang="ko-KR" dirty="0" smtClean="0"/>
+              <a:t>(Class)</a:t>
+            </a:r>
             <a:endParaRPr lang="ko-KR" altLang="en-US" dirty="0"/>
           </a:p>
         </p:txBody>
@@ -4176,327 +4584,24 @@
         </p:blipFill>
         <p:spPr>
           <a:xfrm>
-            <a:off x="988255" y="1127051"/>
-            <a:ext cx="7332316" cy="4861706"/>
+            <a:off x="871982" y="709301"/>
+            <a:ext cx="5337381" cy="4752811"/>
           </a:xfrm>
           <a:prstGeom prst="rect">
             <a:avLst/>
           </a:prstGeom>
         </p:spPr>
       </p:pic>
-    </p:spTree>
-    <p:extLst>
-      <p:ext uri="{BB962C8B-B14F-4D97-AF65-F5344CB8AC3E}">
-        <p14:creationId xmlns:p14="http://schemas.microsoft.com/office/powerpoint/2010/main" val="2660499720"/>
-      </p:ext>
-    </p:extLst>
-  </p:cSld>
-  <p:clrMapOvr>
-    <a:masterClrMapping/>
-  </p:clrMapOvr>
-</p:sld>
-</file>
-
-<file path=ppt/slides/slide4.xml><?xml version="1.0" encoding="utf-8"?>
-<p:sld xmlns:a="http://schemas.openxmlformats.org/drawingml/2006/main" xmlns:r="http://schemas.openxmlformats.org/officeDocument/2006/relationships" xmlns:p="http://schemas.openxmlformats.org/presentationml/2006/main">
-  <p:cSld>
-    <p:spTree>
-      <p:nvGrpSpPr>
-        <p:cNvPr id="1" name=""/>
-        <p:cNvGrpSpPr/>
-        <p:nvPr/>
-      </p:nvGrpSpPr>
-      <p:grpSpPr>
-        <a:xfrm>
-          <a:off x="0" y="0"/>
-          <a:ext cx="0" cy="0"/>
-          <a:chOff x="0" y="0"/>
-          <a:chExt cx="0" cy="0"/>
-        </a:xfrm>
-      </p:grpSpPr>
-      <p:sp>
-        <p:nvSpPr>
-          <p:cNvPr id="2" name="제목 1"/>
-          <p:cNvSpPr>
-            <a:spLocks noGrp="1"/>
-          </p:cNvSpPr>
-          <p:nvPr>
-            <p:ph type="title"/>
-          </p:nvPr>
-        </p:nvSpPr>
-        <p:spPr>
-          <a:xfrm>
-            <a:off x="730666" y="0"/>
-            <a:ext cx="9601200" cy="1485900"/>
-          </a:xfrm>
-        </p:spPr>
-        <p:txBody>
-          <a:bodyPr/>
-          <a:lstStyle/>
-          <a:p>
-            <a:r>
-              <a:rPr lang="en-US" altLang="ko-KR" dirty="0" smtClean="0"/>
-              <a:t>CS index </a:t>
-            </a:r>
-            <a:r>
-              <a:rPr lang="ko-KR" altLang="en-US" dirty="0" smtClean="0"/>
-              <a:t>기능</a:t>
-            </a:r>
-            <a:endParaRPr lang="ko-KR" altLang="en-US" dirty="0"/>
-          </a:p>
-        </p:txBody>
-      </p:sp>
-      <p:sp>
-        <p:nvSpPr>
-          <p:cNvPr id="6" name="TextBox 5"/>
-          <p:cNvSpPr txBox="1"/>
-          <p:nvPr/>
-        </p:nvSpPr>
-        <p:spPr>
-          <a:xfrm>
-            <a:off x="8511611" y="1517799"/>
-            <a:ext cx="3153398" cy="5355312"/>
-          </a:xfrm>
-          <a:prstGeom prst="rect">
-            <a:avLst/>
-          </a:prstGeom>
-          <a:noFill/>
-        </p:spPr>
-        <p:txBody>
-          <a:bodyPr wrap="square" rtlCol="0">
-            <a:spAutoFit/>
-          </a:bodyPr>
-          <a:lstStyle/>
-          <a:p>
-            <a:r>
-              <a:rPr lang="ko-KR" altLang="en-US" dirty="0" smtClean="0"/>
-              <a:t>기능 설명</a:t>
-            </a:r>
-            <a:endParaRPr lang="en-US" altLang="ko-KR" dirty="0" smtClean="0"/>
-          </a:p>
-          <a:p>
-            <a:r>
-              <a:rPr lang="en-US" altLang="ko-KR" dirty="0"/>
-              <a:t>1 </a:t>
-            </a:r>
-            <a:r>
-              <a:rPr lang="ko-KR" altLang="en-US" dirty="0"/>
-              <a:t>공지사항 </a:t>
-            </a:r>
-            <a:endParaRPr lang="en-US" altLang="ko-KR" dirty="0" smtClean="0"/>
-          </a:p>
-          <a:p>
-            <a:pPr marL="285750" indent="-285750">
-              <a:buFontTx/>
-              <a:buChar char="-"/>
-            </a:pPr>
-            <a:r>
-              <a:rPr lang="ko-KR" altLang="en-US" dirty="0" smtClean="0"/>
-              <a:t>최신 글 </a:t>
-            </a:r>
-            <a:r>
-              <a:rPr lang="ko-KR" altLang="en-US" dirty="0"/>
-              <a:t>리스트 </a:t>
-            </a:r>
-            <a:r>
-              <a:rPr lang="en-US" altLang="ko-KR" dirty="0"/>
-              <a:t>5</a:t>
-            </a:r>
-            <a:r>
-              <a:rPr lang="ko-KR" altLang="en-US" dirty="0"/>
-              <a:t>건 출력 </a:t>
-            </a:r>
-            <a:endParaRPr lang="en-US" altLang="ko-KR" dirty="0" smtClean="0"/>
-          </a:p>
-          <a:p>
-            <a:pPr marL="285750" indent="-285750">
-              <a:buFontTx/>
-              <a:buChar char="-"/>
-            </a:pPr>
-            <a:r>
-              <a:rPr lang="ko-KR" altLang="en-US" dirty="0" smtClean="0"/>
-              <a:t>제목</a:t>
-            </a:r>
-            <a:r>
-              <a:rPr lang="en-US" altLang="ko-KR" dirty="0"/>
-              <a:t>, </a:t>
-            </a:r>
-            <a:r>
-              <a:rPr lang="ko-KR" altLang="en-US" dirty="0"/>
-              <a:t>날짜 출력 </a:t>
-            </a:r>
-            <a:endParaRPr lang="en-US" altLang="ko-KR" dirty="0" smtClean="0"/>
-          </a:p>
-          <a:p>
-            <a:r>
-              <a:rPr lang="en-US" altLang="ko-KR" dirty="0" smtClean="0"/>
-              <a:t>2 </a:t>
-            </a:r>
-            <a:r>
-              <a:rPr lang="ko-KR" altLang="en-US" dirty="0"/>
-              <a:t>자주하는 질문 </a:t>
-            </a:r>
-            <a:endParaRPr lang="en-US" altLang="ko-KR" dirty="0" smtClean="0"/>
-          </a:p>
-          <a:p>
-            <a:pPr marL="285750" indent="-285750">
-              <a:buFontTx/>
-              <a:buChar char="-"/>
-            </a:pPr>
-            <a:r>
-              <a:rPr lang="ko-KR" altLang="en-US" dirty="0" smtClean="0"/>
-              <a:t>카테고리 별 </a:t>
-            </a:r>
-            <a:r>
-              <a:rPr lang="ko-KR" altLang="en-US" dirty="0"/>
-              <a:t>아이콘 출력 </a:t>
-            </a:r>
-            <a:endParaRPr lang="en-US" altLang="ko-KR" dirty="0" smtClean="0"/>
-          </a:p>
-          <a:p>
-            <a:r>
-              <a:rPr lang="en-US" altLang="ko-KR" dirty="0" smtClean="0"/>
-              <a:t>3 </a:t>
-            </a:r>
-            <a:r>
-              <a:rPr lang="ko-KR" altLang="en-US" dirty="0"/>
-              <a:t>문의하기 </a:t>
-            </a:r>
-            <a:endParaRPr lang="en-US" altLang="ko-KR" dirty="0" smtClean="0"/>
-          </a:p>
-          <a:p>
-            <a:pPr marL="285750" indent="-285750">
-              <a:buFontTx/>
-              <a:buChar char="-"/>
-            </a:pPr>
-            <a:r>
-              <a:rPr lang="ko-KR" altLang="en-US" dirty="0" smtClean="0"/>
-              <a:t>최신 글 </a:t>
-            </a:r>
-            <a:r>
-              <a:rPr lang="ko-KR" altLang="en-US" dirty="0"/>
-              <a:t>리스트 </a:t>
-            </a:r>
-            <a:r>
-              <a:rPr lang="en-US" altLang="ko-KR" dirty="0"/>
-              <a:t>5</a:t>
-            </a:r>
-            <a:r>
-              <a:rPr lang="ko-KR" altLang="en-US" dirty="0"/>
-              <a:t>건 출력 </a:t>
-            </a:r>
-            <a:endParaRPr lang="en-US" altLang="ko-KR" dirty="0"/>
-          </a:p>
-          <a:p>
-            <a:r>
-              <a:rPr lang="en-US" altLang="ko-KR" dirty="0" smtClean="0"/>
-              <a:t>-    </a:t>
-            </a:r>
-            <a:r>
-              <a:rPr lang="ko-KR" altLang="en-US" dirty="0" smtClean="0"/>
-              <a:t>제목</a:t>
-            </a:r>
-            <a:r>
-              <a:rPr lang="en-US" altLang="ko-KR" dirty="0"/>
-              <a:t>, </a:t>
-            </a:r>
-            <a:r>
-              <a:rPr lang="ko-KR" altLang="en-US" dirty="0"/>
-              <a:t>계정</a:t>
-            </a:r>
-            <a:r>
-              <a:rPr lang="en-US" altLang="ko-KR" dirty="0"/>
-              <a:t>, </a:t>
-            </a:r>
-            <a:r>
-              <a:rPr lang="ko-KR" altLang="en-US" dirty="0"/>
-              <a:t>날짜 출력 </a:t>
-            </a:r>
-            <a:endParaRPr lang="en-US" altLang="ko-KR" dirty="0" smtClean="0"/>
-          </a:p>
-          <a:p>
-            <a:r>
-              <a:rPr lang="en-US" altLang="ko-KR" dirty="0" smtClean="0"/>
-              <a:t>-    </a:t>
-            </a:r>
-            <a:r>
-              <a:rPr lang="ko-KR" altLang="en-US" dirty="0" smtClean="0"/>
-              <a:t>계정은 </a:t>
-            </a:r>
-            <a:r>
-              <a:rPr lang="ko-KR" altLang="en-US" dirty="0" err="1"/>
-              <a:t>마스킹</a:t>
-            </a:r>
-            <a:r>
-              <a:rPr lang="ko-KR" altLang="en-US" dirty="0"/>
-              <a:t> 처리 </a:t>
-            </a:r>
-            <a:endParaRPr lang="en-US" altLang="ko-KR" dirty="0" smtClean="0"/>
-          </a:p>
-          <a:p>
-            <a:r>
-              <a:rPr lang="en-US" altLang="ko-KR" dirty="0" smtClean="0"/>
-              <a:t>4 </a:t>
-            </a:r>
-            <a:r>
-              <a:rPr lang="ko-KR" altLang="en-US" dirty="0" smtClean="0"/>
-              <a:t>문의 글 </a:t>
-            </a:r>
-            <a:r>
-              <a:rPr lang="ko-KR" altLang="en-US" dirty="0"/>
-              <a:t>작성 </a:t>
-            </a:r>
-            <a:endParaRPr lang="en-US" altLang="ko-KR" dirty="0" smtClean="0"/>
-          </a:p>
-          <a:p>
-            <a:pPr marL="285750" indent="-285750">
-              <a:buFontTx/>
-              <a:buChar char="-"/>
-            </a:pPr>
-            <a:r>
-              <a:rPr lang="ko-KR" altLang="en-US" dirty="0" smtClean="0"/>
-              <a:t>클릭 시 문의 글 </a:t>
-            </a:r>
-            <a:r>
-              <a:rPr lang="ko-KR" altLang="en-US" dirty="0"/>
-              <a:t>작성 화면 이동 </a:t>
-            </a:r>
-            <a:r>
-              <a:rPr lang="ko-KR" altLang="en-US" dirty="0" smtClean="0"/>
-              <a:t> </a:t>
-            </a:r>
-            <a:endParaRPr lang="en-US" altLang="ko-KR" dirty="0" smtClean="0"/>
-          </a:p>
-          <a:p>
-            <a:endParaRPr lang="en-US" altLang="ko-KR" dirty="0" smtClean="0"/>
-          </a:p>
-          <a:p>
-            <a:endParaRPr lang="en-US" altLang="ko-KR" dirty="0" smtClean="0"/>
-          </a:p>
-          <a:p>
-            <a:endParaRPr lang="en-US" altLang="ko-KR" dirty="0" smtClean="0"/>
-          </a:p>
-          <a:p>
-            <a:endParaRPr lang="en-US" altLang="ko-KR" dirty="0" smtClean="0"/>
-          </a:p>
-          <a:p>
-            <a:endParaRPr lang="en-US" altLang="ko-KR" dirty="0" smtClean="0"/>
-          </a:p>
-          <a:p>
-            <a:endParaRPr lang="ko-KR" altLang="en-US" dirty="0"/>
-          </a:p>
-        </p:txBody>
-      </p:sp>
       <p:pic>
         <p:nvPicPr>
-          <p:cNvPr id="3" name="그림 2"/>
+          <p:cNvPr id="5" name="그림 4"/>
           <p:cNvPicPr>
             <a:picLocks noChangeAspect="1"/>
           </p:cNvPicPr>
           <p:nvPr/>
         </p:nvPicPr>
         <p:blipFill>
-          <a:blip r:embed="rId2">
+          <a:blip r:embed="rId3">
             <a:extLst>
               <a:ext uri="{28A0092B-C50C-407E-A947-70E740481C1C}">
                 <a14:useLocalDpi xmlns:a14="http://schemas.microsoft.com/office/drawing/2010/main" val="0"/>
@@ -4509,8 +4614,8 @@
         </p:blipFill>
         <p:spPr>
           <a:xfrm>
-            <a:off x="956357" y="1023981"/>
-            <a:ext cx="7059709" cy="4680953"/>
+            <a:off x="6545304" y="709301"/>
+            <a:ext cx="4760005" cy="6099012"/>
           </a:xfrm>
           <a:prstGeom prst="rect">
             <a:avLst/>
@@ -4520,13 +4625,20 @@
     </p:spTree>
     <p:extLst>
       <p:ext uri="{BB962C8B-B14F-4D97-AF65-F5344CB8AC3E}">
-        <p14:creationId xmlns:p14="http://schemas.microsoft.com/office/powerpoint/2010/main" val="2788399761"/>
+        <p14:creationId xmlns:p14="http://schemas.microsoft.com/office/powerpoint/2010/main" val="679413851"/>
       </p:ext>
     </p:extLst>
   </p:cSld>
   <p:clrMapOvr>
     <a:masterClrMapping/>
   </p:clrMapOvr>
+  <p:timing>
+    <p:tnLst>
+      <p:par>
+        <p:cTn id="1" dur="indefinite" restart="never" nodeType="tmRoot"/>
+      </p:par>
+    </p:tnLst>
+  </p:timing>
 </p:sld>
 </file>
 
@@ -4569,15 +4681,7 @@
           <a:p>
             <a:r>
               <a:rPr lang="en-US" altLang="ko-KR" dirty="0" smtClean="0"/>
-              <a:t>CS </a:t>
-            </a:r>
-            <a:r>
-              <a:rPr lang="en-US" altLang="ko-KR" dirty="0" err="1" smtClean="0"/>
-              <a:t>Qna</a:t>
-            </a:r>
-            <a:r>
-              <a:rPr lang="en-US" altLang="ko-KR" dirty="0" smtClean="0"/>
-              <a:t> List </a:t>
+              <a:t>Main index list </a:t>
             </a:r>
             <a:r>
               <a:rPr lang="ko-KR" altLang="en-US" dirty="0" smtClean="0"/>
@@ -4595,8 +4699,8 @@
         </p:nvSpPr>
         <p:spPr>
           <a:xfrm>
-            <a:off x="8490346" y="237756"/>
-            <a:ext cx="3153398" cy="7571303"/>
+            <a:off x="8511611" y="1517799"/>
+            <a:ext cx="3153398" cy="3693319"/>
           </a:xfrm>
           <a:prstGeom prst="rect">
             <a:avLst/>
@@ -4616,311 +4720,81 @@
             <a:endParaRPr lang="en-US" altLang="ko-KR" dirty="0" smtClean="0"/>
           </a:p>
           <a:p>
-            <a:pPr marL="342900" indent="-342900">
-              <a:buFont typeface="+mj-lt"/>
-              <a:buAutoNum type="arabicPeriod"/>
+            <a:pPr marL="285750" indent="-285750">
+              <a:buFont typeface="Arial" panose="020B0604020202020204" pitchFamily="34" charset="0"/>
+              <a:buChar char="•"/>
             </a:pPr>
             <a:r>
+              <a:rPr lang="ko-KR" altLang="en-US" dirty="0" smtClean="0"/>
+              <a:t>상품별 </a:t>
+            </a:r>
+            <a:r>
+              <a:rPr lang="en-US" altLang="ko-KR" dirty="0" smtClean="0"/>
+              <a:t>list </a:t>
+            </a:r>
+            <a:r>
+              <a:rPr lang="ko-KR" altLang="en-US" dirty="0" smtClean="0"/>
+              <a:t>출력</a:t>
+            </a:r>
+            <a:endParaRPr lang="en-US" altLang="ko-KR" dirty="0" smtClean="0"/>
+          </a:p>
+          <a:p>
+            <a:pPr marL="285750" indent="-285750">
+              <a:buFont typeface="Arial" panose="020B0604020202020204" pitchFamily="34" charset="0"/>
+              <a:buChar char="•"/>
+            </a:pPr>
+            <a:r>
               <a:rPr lang="ko-KR" altLang="en-US" dirty="0"/>
-              <a:t>문의하기 메뉴 </a:t>
-            </a:r>
-            <a:endParaRPr lang="en-US" altLang="ko-KR" dirty="0" smtClean="0"/>
+              <a:t>상품별 스크롤 </a:t>
+            </a:r>
+            <a:r>
+              <a:rPr lang="ko-KR" altLang="en-US" dirty="0" err="1"/>
+              <a:t>이동링크</a:t>
+            </a:r>
+            <a:endParaRPr lang="en-US" altLang="ko-KR" dirty="0"/>
           </a:p>
           <a:p>
             <a:pPr marL="285750" indent="-285750">
-              <a:buFontTx/>
-              <a:buChar char="-"/>
+              <a:buFont typeface="Arial" panose="020B0604020202020204" pitchFamily="34" charset="0"/>
+              <a:buChar char="•"/>
             </a:pPr>
             <a:r>
-              <a:rPr lang="en-US" altLang="ko-KR" dirty="0" smtClean="0"/>
-              <a:t>1</a:t>
-            </a:r>
-            <a:r>
               <a:rPr lang="ko-KR" altLang="en-US" dirty="0"/>
-              <a:t>차 메뉴 출력 </a:t>
-            </a:r>
-            <a:endParaRPr lang="en-US" altLang="ko-KR" dirty="0" smtClean="0"/>
+              <a:t>해당 상품 클릭 시 뷰로 이동</a:t>
+            </a:r>
+            <a:endParaRPr lang="en-US" altLang="ko-KR" dirty="0"/>
           </a:p>
           <a:p>
             <a:pPr marL="285750" indent="-285750">
-              <a:buFontTx/>
-              <a:buChar char="-"/>
+              <a:buFont typeface="Arial" panose="020B0604020202020204" pitchFamily="34" charset="0"/>
+              <a:buChar char="•"/>
             </a:pPr>
             <a:endParaRPr lang="en-US" altLang="ko-KR" dirty="0" smtClean="0"/>
           </a:p>
           <a:p>
-            <a:pPr marL="342900" indent="-342900">
-              <a:buAutoNum type="arabicPeriod" startAt="2"/>
+            <a:pPr marL="285750" indent="-285750">
+              <a:buFont typeface="Arial" panose="020B0604020202020204" pitchFamily="34" charset="0"/>
+              <a:buChar char="•"/>
             </a:pPr>
-            <a:r>
-              <a:rPr lang="ko-KR" altLang="en-US" dirty="0" smtClean="0"/>
-              <a:t>문의하기 </a:t>
-            </a:r>
-            <a:r>
-              <a:rPr lang="ko-KR" altLang="en-US" dirty="0"/>
-              <a:t>글 </a:t>
-            </a:r>
-            <a:r>
-              <a:rPr lang="ko-KR" altLang="en-US" dirty="0" smtClean="0"/>
-              <a:t>목록</a:t>
-            </a:r>
-            <a:endParaRPr lang="en-US" altLang="ko-KR" dirty="0" smtClean="0"/>
-          </a:p>
-          <a:p>
-            <a:pPr marL="285750" indent="-285750">
-              <a:buFontTx/>
-              <a:buChar char="-"/>
-            </a:pPr>
-            <a:r>
-              <a:rPr lang="ko-KR" altLang="en-US" dirty="0" smtClean="0"/>
-              <a:t>글 </a:t>
-            </a:r>
-            <a:r>
-              <a:rPr lang="ko-KR" altLang="en-US" dirty="0"/>
-              <a:t>제목 첫머리에 </a:t>
-            </a:r>
-            <a:r>
-              <a:rPr lang="en-US" altLang="ko-KR" dirty="0"/>
-              <a:t>2</a:t>
-            </a:r>
-            <a:r>
-              <a:rPr lang="ko-KR" altLang="en-US" dirty="0"/>
-              <a:t>차 메뉴 유형 부터 출력 </a:t>
-            </a:r>
-            <a:endParaRPr lang="en-US" altLang="ko-KR" dirty="0" smtClean="0"/>
-          </a:p>
-          <a:p>
-            <a:pPr marL="285750" indent="-285750">
-              <a:buFontTx/>
-              <a:buChar char="-"/>
-            </a:pPr>
-            <a:r>
-              <a:rPr lang="ko-KR" altLang="en-US" dirty="0" smtClean="0"/>
-              <a:t>답변이 </a:t>
-            </a:r>
-            <a:r>
-              <a:rPr lang="ko-KR" altLang="en-US" dirty="0"/>
-              <a:t>완료되었으면 ‘</a:t>
-            </a:r>
-            <a:r>
-              <a:rPr lang="ko-KR" altLang="en-US" dirty="0" err="1"/>
-              <a:t>답변완료</a:t>
-            </a:r>
-            <a:r>
-              <a:rPr lang="ko-KR" altLang="en-US" dirty="0"/>
-              <a:t>’ 그렇지 않으면 ‘</a:t>
-            </a:r>
-            <a:r>
-              <a:rPr lang="ko-KR" altLang="en-US" dirty="0" err="1"/>
-              <a:t>검토중</a:t>
-            </a:r>
-            <a:r>
-              <a:rPr lang="ko-KR" altLang="en-US" dirty="0"/>
-              <a:t>’ 출력 </a:t>
-            </a:r>
-            <a:endParaRPr lang="en-US" altLang="ko-KR" dirty="0" smtClean="0"/>
-          </a:p>
-          <a:p>
-            <a:pPr marL="285750" indent="-285750">
-              <a:buFontTx/>
-              <a:buChar char="-"/>
-            </a:pPr>
-            <a:r>
-              <a:rPr lang="ko-KR" altLang="en-US" dirty="0" smtClean="0"/>
-              <a:t>문의한 </a:t>
-            </a:r>
-            <a:r>
-              <a:rPr lang="ko-KR" altLang="en-US" dirty="0"/>
-              <a:t>사용자 </a:t>
-            </a:r>
-            <a:r>
-              <a:rPr lang="ko-KR" altLang="en-US" dirty="0" err="1"/>
-              <a:t>계정명</a:t>
-            </a:r>
-            <a:r>
-              <a:rPr lang="ko-KR" altLang="en-US" dirty="0"/>
-              <a:t> </a:t>
-            </a:r>
-            <a:r>
-              <a:rPr lang="ko-KR" altLang="en-US" dirty="0" err="1"/>
-              <a:t>마스킹</a:t>
-            </a:r>
-            <a:r>
-              <a:rPr lang="ko-KR" altLang="en-US" dirty="0"/>
-              <a:t> 처 리 </a:t>
-            </a:r>
-            <a:endParaRPr lang="en-US" altLang="ko-KR" dirty="0" smtClean="0"/>
-          </a:p>
-          <a:p>
-            <a:pPr marL="285750" indent="-285750">
-              <a:buFontTx/>
-              <a:buChar char="-"/>
-            </a:pPr>
-            <a:r>
-              <a:rPr lang="ko-KR" altLang="en-US" dirty="0" smtClean="0"/>
-              <a:t>날짜는 </a:t>
-            </a:r>
-            <a:r>
-              <a:rPr lang="ko-KR" altLang="en-US" dirty="0"/>
-              <a:t>연</a:t>
-            </a:r>
-            <a:r>
-              <a:rPr lang="en-US" altLang="ko-KR" dirty="0"/>
-              <a:t>/</a:t>
-            </a:r>
-            <a:r>
-              <a:rPr lang="ko-KR" altLang="en-US" dirty="0"/>
-              <a:t>월</a:t>
-            </a:r>
-            <a:r>
-              <a:rPr lang="en-US" altLang="ko-KR" dirty="0"/>
-              <a:t>/</a:t>
-            </a:r>
-            <a:r>
-              <a:rPr lang="ko-KR" altLang="en-US" dirty="0"/>
-              <a:t>일 </a:t>
-            </a:r>
-            <a:r>
-              <a:rPr lang="en-US" altLang="ko-KR" dirty="0"/>
-              <a:t>2</a:t>
-            </a:r>
-            <a:r>
-              <a:rPr lang="ko-KR" altLang="en-US" dirty="0"/>
-              <a:t>자리씩 출력 </a:t>
-            </a:r>
-            <a:endParaRPr lang="en-US" altLang="ko-KR" dirty="0" smtClean="0"/>
-          </a:p>
-          <a:p>
-            <a:pPr marL="285750" indent="-285750">
-              <a:buFontTx/>
-              <a:buChar char="-"/>
-            </a:pPr>
-            <a:r>
-              <a:rPr lang="ko-KR" altLang="en-US" dirty="0" smtClean="0"/>
-              <a:t>최신 </a:t>
-            </a:r>
-            <a:r>
-              <a:rPr lang="ko-KR" altLang="en-US" dirty="0" err="1"/>
-              <a:t>등록순</a:t>
-            </a:r>
-            <a:r>
-              <a:rPr lang="ko-KR" altLang="en-US" dirty="0"/>
-              <a:t> 출력 </a:t>
-            </a:r>
-            <a:endParaRPr lang="en-US" altLang="ko-KR" dirty="0" smtClean="0"/>
-          </a:p>
-          <a:p>
-            <a:pPr marL="285750" indent="-285750">
-              <a:buFontTx/>
-              <a:buChar char="-"/>
-            </a:pPr>
-            <a:endParaRPr lang="en-US" altLang="ko-KR" dirty="0" smtClean="0"/>
-          </a:p>
-          <a:p>
-            <a:r>
-              <a:rPr lang="en-US" altLang="ko-KR" dirty="0" smtClean="0"/>
-              <a:t>3.   </a:t>
-            </a:r>
-            <a:r>
-              <a:rPr lang="ko-KR" altLang="en-US" dirty="0" smtClean="0"/>
-              <a:t>페이지 </a:t>
-            </a:r>
-            <a:r>
-              <a:rPr lang="ko-KR" altLang="en-US" dirty="0"/>
-              <a:t>번호 </a:t>
-            </a:r>
-            <a:endParaRPr lang="en-US" altLang="ko-KR" dirty="0" smtClean="0"/>
-          </a:p>
-          <a:p>
-            <a:pPr marL="285750" indent="-285750">
-              <a:buFontTx/>
-              <a:buChar char="-"/>
-            </a:pPr>
-            <a:r>
-              <a:rPr lang="en-US" altLang="ko-KR" dirty="0" smtClean="0"/>
-              <a:t>10</a:t>
-            </a:r>
-            <a:r>
-              <a:rPr lang="ko-KR" altLang="en-US" dirty="0" smtClean="0"/>
-              <a:t>개씩 출력 </a:t>
-            </a:r>
-            <a:r>
-              <a:rPr lang="ko-KR" altLang="en-US" dirty="0"/>
-              <a:t>되도록 페이지 번호 계산 </a:t>
-            </a:r>
-            <a:r>
-              <a:rPr lang="ko-KR" altLang="en-US" dirty="0" smtClean="0"/>
-              <a:t> </a:t>
-            </a:r>
-            <a:endParaRPr lang="en-US" altLang="ko-KR" dirty="0" smtClean="0"/>
-          </a:p>
-          <a:p>
-            <a:pPr marL="285750" indent="-285750">
-              <a:buFontTx/>
-              <a:buChar char="-"/>
-            </a:pPr>
-            <a:endParaRPr lang="en-US" altLang="ko-KR" dirty="0" smtClean="0"/>
-          </a:p>
-          <a:p>
-            <a:r>
-              <a:rPr lang="en-US" altLang="ko-KR" dirty="0"/>
-              <a:t>4 </a:t>
-            </a:r>
-            <a:r>
-              <a:rPr lang="en-US" altLang="ko-KR" dirty="0" smtClean="0"/>
-              <a:t>.  </a:t>
-            </a:r>
-            <a:r>
-              <a:rPr lang="ko-KR" altLang="en-US" dirty="0" smtClean="0"/>
-              <a:t>문의하기 </a:t>
-            </a:r>
-            <a:endParaRPr lang="en-US" altLang="ko-KR" dirty="0" smtClean="0"/>
-          </a:p>
-          <a:p>
-            <a:pPr marL="285750" indent="-285750">
-              <a:buFontTx/>
-              <a:buChar char="-"/>
-            </a:pPr>
-            <a:r>
-              <a:rPr lang="ko-KR" altLang="en-US" dirty="0" smtClean="0"/>
-              <a:t>문의하기 </a:t>
-            </a:r>
-            <a:r>
-              <a:rPr lang="ko-KR" altLang="en-US" dirty="0"/>
-              <a:t>페이지로 </a:t>
-            </a:r>
-            <a:r>
-              <a:rPr lang="ko-KR" altLang="en-US" dirty="0" smtClean="0"/>
-              <a:t>이동</a:t>
-            </a:r>
-            <a:endParaRPr lang="en-US" altLang="ko-KR" dirty="0" smtClean="0"/>
-          </a:p>
-          <a:p>
-            <a:pPr marL="285750" indent="-285750">
-              <a:buFontTx/>
-              <a:buChar char="-"/>
-            </a:pPr>
+            <a:endParaRPr lang="en-US" altLang="ko-KR" dirty="0" smtClean="0"/>
+          </a:p>
+          <a:p>
             <a:endParaRPr lang="en-US" altLang="ko-KR" dirty="0"/>
           </a:p>
           <a:p>
             <a:endParaRPr lang="en-US" altLang="ko-KR" dirty="0" smtClean="0"/>
           </a:p>
           <a:p>
-            <a:endParaRPr lang="en-US" altLang="ko-KR" dirty="0" smtClean="0"/>
-          </a:p>
-          <a:p>
-            <a:pPr marL="342900" indent="-342900">
-              <a:buFont typeface="+mj-lt"/>
-              <a:buAutoNum type="arabicPeriod"/>
-            </a:pPr>
-            <a:endParaRPr lang="en-US" altLang="ko-KR" dirty="0" smtClean="0"/>
-          </a:p>
-          <a:p>
-            <a:pPr marL="342900" indent="-342900">
-              <a:buFont typeface="+mj-lt"/>
-              <a:buAutoNum type="arabicPeriod"/>
-            </a:pPr>
-            <a:endParaRPr lang="en-US" altLang="ko-KR" dirty="0" smtClean="0"/>
+            <a:endParaRPr lang="en-US" altLang="ko-KR" dirty="0"/>
+          </a:p>
+          <a:p>
+            <a:endParaRPr lang="en-US" altLang="ko-KR" dirty="0" smtClean="0"/>
+          </a:p>
+          <a:p>
+            <a:endParaRPr lang="en-US" altLang="ko-KR" dirty="0"/>
+          </a:p>
+          <a:p>
+            <a:endParaRPr lang="ko-KR" altLang="en-US" dirty="0"/>
           </a:p>
         </p:txBody>
       </p:sp>
@@ -4946,8 +4820,8 @@
         </p:blipFill>
         <p:spPr>
           <a:xfrm>
-            <a:off x="977622" y="1233377"/>
-            <a:ext cx="6979529" cy="4627790"/>
+            <a:off x="988255" y="1127051"/>
+            <a:ext cx="7332316" cy="4861706"/>
           </a:xfrm>
           <a:prstGeom prst="rect">
             <a:avLst/>
@@ -4957,7 +4831,7 @@
     </p:spTree>
     <p:extLst>
       <p:ext uri="{BB962C8B-B14F-4D97-AF65-F5344CB8AC3E}">
-        <p14:creationId xmlns:p14="http://schemas.microsoft.com/office/powerpoint/2010/main" val="2173585253"/>
+        <p14:creationId xmlns:p14="http://schemas.microsoft.com/office/powerpoint/2010/main" val="2660499720"/>
       </p:ext>
     </p:extLst>
   </p:cSld>
@@ -5006,15 +4880,7 @@
           <a:p>
             <a:r>
               <a:rPr lang="en-US" altLang="ko-KR" dirty="0" smtClean="0"/>
-              <a:t>CS </a:t>
-            </a:r>
-            <a:r>
-              <a:rPr lang="en-US" altLang="ko-KR" dirty="0" err="1" smtClean="0"/>
-              <a:t>Qna</a:t>
-            </a:r>
-            <a:r>
-              <a:rPr lang="en-US" altLang="ko-KR" dirty="0" smtClean="0"/>
-              <a:t> View </a:t>
+              <a:t>CS index </a:t>
             </a:r>
             <a:r>
               <a:rPr lang="ko-KR" altLang="en-US" dirty="0" smtClean="0"/>
@@ -5032,8 +4898,8 @@
         </p:nvSpPr>
         <p:spPr>
           <a:xfrm>
-            <a:off x="8497999" y="948690"/>
-            <a:ext cx="3153398" cy="5909310"/>
+            <a:off x="8511611" y="1517799"/>
+            <a:ext cx="3153398" cy="5355312"/>
           </a:xfrm>
           <a:prstGeom prst="rect">
             <a:avLst/>
@@ -5053,13 +4919,13 @@
             <a:endParaRPr lang="en-US" altLang="ko-KR" dirty="0" smtClean="0"/>
           </a:p>
           <a:p>
-            <a:pPr marL="342900" indent="-342900">
-              <a:buFont typeface="+mj-lt"/>
-              <a:buAutoNum type="arabicPeriod"/>
-            </a:pPr>
-            <a:r>
-              <a:rPr lang="ko-KR" altLang="en-US" dirty="0" smtClean="0"/>
-              <a:t>문의하기 글 보기 </a:t>
+            <a:r>
+              <a:rPr lang="en-US" altLang="ko-KR" dirty="0"/>
+              <a:t>1 </a:t>
+            </a:r>
+            <a:r>
+              <a:rPr lang="ko-KR" altLang="en-US" dirty="0"/>
+              <a:t>공지사항 </a:t>
             </a:r>
             <a:endParaRPr lang="en-US" altLang="ko-KR" dirty="0" smtClean="0"/>
           </a:p>
@@ -5070,11 +4936,19 @@
             </a:pPr>
             <a:r>
               <a:rPr lang="ko-KR" altLang="en-US" dirty="0" smtClean="0"/>
-              <a:t>목록에서 </a:t>
+              <a:t>최신 글 </a:t>
             </a:r>
             <a:r>
               <a:rPr lang="ko-KR" altLang="en-US" dirty="0"/>
-              <a:t>선택한 글 상세보기 </a:t>
+              <a:t>리스트 </a:t>
+            </a:r>
+            <a:r>
+              <a:rPr lang="en-US" altLang="ko-KR" dirty="0"/>
+              <a:t>5</a:t>
+            </a:r>
+            <a:r>
+              <a:rPr lang="ko-KR" altLang="en-US" dirty="0"/>
+              <a:t>건 출력 </a:t>
             </a:r>
             <a:endParaRPr lang="en-US" altLang="ko-KR" dirty="0" smtClean="0"/>
           </a:p>
@@ -5083,15 +4957,28 @@
               <a:buFontTx/>
               <a:buChar char="-"/>
             </a:pPr>
-            <a:endParaRPr lang="en-US" altLang="ko-KR" dirty="0" smtClean="0"/>
-          </a:p>
-          <a:p>
-            <a:pPr marL="342900" indent="-342900">
-              <a:buAutoNum type="arabicPeriod" startAt="2"/>
-            </a:pPr>
             <a:r>
               <a:rPr lang="ko-KR" altLang="en-US" dirty="0" smtClean="0"/>
-              <a:t>문의하기 글 답변</a:t>
+              <a:t>제목</a:t>
+            </a:r>
+            <a:r>
+              <a:rPr lang="en-US" altLang="ko-KR" dirty="0"/>
+              <a:t>, </a:t>
+            </a:r>
+            <a:r>
+              <a:rPr lang="ko-KR" altLang="en-US" dirty="0"/>
+              <a:t>날짜 출력 </a:t>
+            </a:r>
+            <a:endParaRPr lang="en-US" altLang="ko-KR" dirty="0" smtClean="0"/>
+          </a:p>
+          <a:p>
+            <a:r>
+              <a:rPr lang="en-US" altLang="ko-KR" dirty="0" smtClean="0"/>
+              <a:t>2 </a:t>
+            </a:r>
+            <a:r>
+              <a:rPr lang="ko-KR" altLang="en-US" dirty="0"/>
+              <a:t>자주하는 질문 </a:t>
             </a:r>
             <a:endParaRPr lang="en-US" altLang="ko-KR" dirty="0" smtClean="0"/>
           </a:p>
@@ -5102,7 +4989,22 @@
             </a:pPr>
             <a:r>
               <a:rPr lang="ko-KR" altLang="en-US" dirty="0" smtClean="0"/>
-              <a:t>답변이 완료된 글이면 답변 내용 출력 </a:t>
+              <a:t>카테고리 별 </a:t>
+            </a:r>
+            <a:r>
+              <a:rPr lang="ko-KR" altLang="en-US" dirty="0"/>
+              <a:t>아이콘 출력 </a:t>
+            </a:r>
+            <a:endParaRPr lang="en-US" altLang="ko-KR" dirty="0" smtClean="0"/>
+          </a:p>
+          <a:p>
+            <a:r>
+              <a:rPr lang="en-US" altLang="ko-KR" dirty="0" smtClean="0"/>
+              <a:t>3 </a:t>
+            </a:r>
+            <a:r>
+              <a:rPr lang="ko-KR" altLang="en-US" dirty="0"/>
+              <a:t>문의하기 </a:t>
             </a:r>
             <a:endParaRPr lang="en-US" altLang="ko-KR" dirty="0" smtClean="0"/>
           </a:p>
@@ -5113,55 +5015,95 @@
             </a:pPr>
             <a:r>
               <a:rPr lang="ko-KR" altLang="en-US" dirty="0" smtClean="0"/>
-              <a:t>답변이 </a:t>
+              <a:t>최신 글 </a:t>
             </a:r>
             <a:r>
               <a:rPr lang="ko-KR" altLang="en-US" dirty="0"/>
-              <a:t>없으면 출력 </a:t>
-            </a:r>
+              <a:t>리스트 </a:t>
+            </a:r>
+            <a:r>
+              <a:rPr lang="en-US" altLang="ko-KR" dirty="0"/>
+              <a:t>5</a:t>
+            </a:r>
+            <a:r>
+              <a:rPr lang="ko-KR" altLang="en-US" dirty="0"/>
+              <a:t>건 출력 </a:t>
+            </a:r>
+            <a:endParaRPr lang="en-US" altLang="ko-KR" dirty="0"/>
+          </a:p>
+          <a:p>
             <a:r>
               <a:rPr lang="en-US" altLang="ko-KR" dirty="0" smtClean="0"/>
-              <a:t>X</a:t>
-            </a:r>
+              <a:t>-    </a:t>
+            </a:r>
+            <a:r>
+              <a:rPr lang="ko-KR" altLang="en-US" dirty="0" smtClean="0"/>
+              <a:t>제목</a:t>
+            </a:r>
+            <a:r>
+              <a:rPr lang="en-US" altLang="ko-KR" dirty="0"/>
+              <a:t>, </a:t>
+            </a:r>
+            <a:r>
+              <a:rPr lang="ko-KR" altLang="en-US" dirty="0"/>
+              <a:t>계정</a:t>
+            </a:r>
+            <a:r>
+              <a:rPr lang="en-US" altLang="ko-KR" dirty="0"/>
+              <a:t>, </a:t>
+            </a:r>
+            <a:r>
+              <a:rPr lang="ko-KR" altLang="en-US" dirty="0"/>
+              <a:t>날짜 출력 </a:t>
+            </a:r>
+            <a:endParaRPr lang="en-US" altLang="ko-KR" dirty="0" smtClean="0"/>
+          </a:p>
+          <a:p>
+            <a:r>
+              <a:rPr lang="en-US" altLang="ko-KR" dirty="0" smtClean="0"/>
+              <a:t>-    </a:t>
+            </a:r>
+            <a:r>
+              <a:rPr lang="ko-KR" altLang="en-US" dirty="0" smtClean="0"/>
+              <a:t>계정은 </a:t>
+            </a:r>
+            <a:r>
+              <a:rPr lang="ko-KR" altLang="en-US" dirty="0" err="1"/>
+              <a:t>마스킹</a:t>
+            </a:r>
+            <a:r>
+              <a:rPr lang="ko-KR" altLang="en-US" dirty="0"/>
+              <a:t> 처리 </a:t>
+            </a:r>
+            <a:endParaRPr lang="en-US" altLang="ko-KR" dirty="0" smtClean="0"/>
+          </a:p>
+          <a:p>
+            <a:r>
+              <a:rPr lang="en-US" altLang="ko-KR" dirty="0" smtClean="0"/>
+              <a:t>4 </a:t>
+            </a:r>
+            <a:r>
+              <a:rPr lang="ko-KR" altLang="en-US" dirty="0" smtClean="0"/>
+              <a:t>문의 글 </a:t>
+            </a:r>
+            <a:r>
+              <a:rPr lang="ko-KR" altLang="en-US" dirty="0"/>
+              <a:t>작성 </a:t>
+            </a:r>
+            <a:endParaRPr lang="en-US" altLang="ko-KR" dirty="0" smtClean="0"/>
           </a:p>
           <a:p>
             <a:pPr marL="285750" indent="-285750">
               <a:buFontTx/>
               <a:buChar char="-"/>
             </a:pPr>
-            <a:endParaRPr lang="en-US" altLang="ko-KR" dirty="0" smtClean="0"/>
-          </a:p>
-          <a:p>
-            <a:r>
-              <a:rPr lang="en-US" altLang="ko-KR" dirty="0" smtClean="0"/>
-              <a:t>3.   </a:t>
-            </a:r>
             <a:r>
               <a:rPr lang="ko-KR" altLang="en-US" dirty="0" smtClean="0"/>
-              <a:t>페이지 </a:t>
+              <a:t>클릭 시 문의 글 </a:t>
             </a:r>
             <a:r>
               <a:rPr lang="ko-KR" altLang="en-US" dirty="0"/>
-              <a:t>번호 </a:t>
-            </a:r>
-            <a:endParaRPr lang="en-US" altLang="ko-KR" dirty="0" smtClean="0"/>
-          </a:p>
-          <a:p>
-            <a:pPr marL="285750" indent="-285750">
-              <a:buFontTx/>
-              <a:buChar char="-"/>
-            </a:pPr>
-            <a:r>
-              <a:rPr lang="en-US" altLang="ko-KR" dirty="0" smtClean="0"/>
-              <a:t>10</a:t>
-            </a:r>
-            <a:r>
-              <a:rPr lang="ko-KR" altLang="en-US" dirty="0" smtClean="0"/>
-              <a:t>개씩 출력 </a:t>
-            </a:r>
-            <a:r>
-              <a:rPr lang="ko-KR" altLang="en-US" dirty="0"/>
-              <a:t>되도록 페이지 번호 계산 </a:t>
+              <a:t>작성 화면 이동 </a:t>
             </a:r>
             <a:r>
               <a:rPr lang="ko-KR" altLang="en-US" dirty="0" smtClean="0"/>
@@ -5170,88 +5112,22 @@
             <a:endParaRPr lang="en-US" altLang="ko-KR" dirty="0" smtClean="0"/>
           </a:p>
           <a:p>
-            <a:pPr marL="285750" indent="-285750">
-              <a:buFontTx/>
-              <a:buChar char="-"/>
-            </a:pPr>
-            <a:endParaRPr lang="en-US" altLang="ko-KR" dirty="0" smtClean="0"/>
-          </a:p>
-          <a:p>
-            <a:r>
-              <a:rPr lang="en-US" altLang="ko-KR" dirty="0"/>
-              <a:t>4 </a:t>
-            </a:r>
-            <a:r>
-              <a:rPr lang="en-US" altLang="ko-KR" dirty="0" smtClean="0"/>
-              <a:t>. </a:t>
-            </a:r>
-            <a:r>
-              <a:rPr lang="ko-KR" altLang="en-US" dirty="0" err="1"/>
-              <a:t>목록버튼</a:t>
-            </a:r>
-            <a:r>
-              <a:rPr lang="ko-KR" altLang="en-US" dirty="0"/>
-              <a:t> </a:t>
-            </a:r>
-            <a:endParaRPr lang="en-US" altLang="ko-KR" dirty="0" smtClean="0"/>
-          </a:p>
-          <a:p>
-            <a:pPr marL="285750" indent="-285750">
-              <a:buFontTx/>
-              <a:buChar char="-"/>
-            </a:pPr>
-            <a:r>
-              <a:rPr lang="ko-KR" altLang="en-US" dirty="0" smtClean="0"/>
-              <a:t>글 목록으로 </a:t>
-            </a:r>
-            <a:r>
-              <a:rPr lang="ko-KR" altLang="en-US" dirty="0"/>
-              <a:t>이동 </a:t>
-            </a:r>
-            <a:endParaRPr lang="en-US" altLang="ko-KR" dirty="0" smtClean="0"/>
-          </a:p>
-          <a:p>
-            <a:pPr marL="285750" indent="-285750">
-              <a:buFontTx/>
-              <a:buChar char="-"/>
-            </a:pPr>
-            <a:r>
-              <a:rPr lang="ko-KR" altLang="en-US" dirty="0" smtClean="0"/>
-              <a:t>메뉴에 </a:t>
-            </a:r>
-            <a:r>
-              <a:rPr lang="ko-KR" altLang="en-US" dirty="0"/>
-              <a:t>맞는 </a:t>
-            </a:r>
-            <a:r>
-              <a:rPr lang="ko-KR" altLang="en-US" dirty="0" smtClean="0"/>
-              <a:t>글 목록 </a:t>
-            </a:r>
-            <a:r>
-              <a:rPr lang="ko-KR" altLang="en-US" dirty="0"/>
-              <a:t>이동 </a:t>
-            </a:r>
-            <a:endParaRPr lang="en-US" altLang="ko-KR" dirty="0"/>
-          </a:p>
-          <a:p>
-            <a:endParaRPr lang="en-US" altLang="ko-KR" dirty="0" smtClean="0"/>
-          </a:p>
-          <a:p>
-            <a:endParaRPr lang="en-US" altLang="ko-KR" dirty="0" smtClean="0"/>
-          </a:p>
-          <a:p>
-            <a:pPr marL="342900" indent="-342900">
-              <a:buFont typeface="+mj-lt"/>
-              <a:buAutoNum type="arabicPeriod"/>
-            </a:pPr>
-            <a:endParaRPr lang="en-US" altLang="ko-KR" dirty="0" smtClean="0"/>
-          </a:p>
-          <a:p>
-            <a:pPr marL="342900" indent="-342900">
-              <a:buFont typeface="+mj-lt"/>
-              <a:buAutoNum type="arabicPeriod"/>
-            </a:pPr>
-            <a:endParaRPr lang="en-US" altLang="ko-KR" dirty="0" smtClean="0"/>
+            <a:endParaRPr lang="en-US" altLang="ko-KR" dirty="0" smtClean="0"/>
+          </a:p>
+          <a:p>
+            <a:endParaRPr lang="en-US" altLang="ko-KR" dirty="0" smtClean="0"/>
+          </a:p>
+          <a:p>
+            <a:endParaRPr lang="en-US" altLang="ko-KR" dirty="0" smtClean="0"/>
+          </a:p>
+          <a:p>
+            <a:endParaRPr lang="en-US" altLang="ko-KR" dirty="0" smtClean="0"/>
+          </a:p>
+          <a:p>
+            <a:endParaRPr lang="en-US" altLang="ko-KR" dirty="0" smtClean="0"/>
+          </a:p>
+          <a:p>
+            <a:endParaRPr lang="ko-KR" altLang="en-US" dirty="0"/>
           </a:p>
         </p:txBody>
       </p:sp>
@@ -5277,8 +5153,8 @@
         </p:blipFill>
         <p:spPr>
           <a:xfrm>
-            <a:off x="904259" y="850604"/>
-            <a:ext cx="7412495" cy="4914869"/>
+            <a:off x="956357" y="1023981"/>
+            <a:ext cx="7059709" cy="4680953"/>
           </a:xfrm>
           <a:prstGeom prst="rect">
             <a:avLst/>
@@ -5288,7 +5164,7 @@
     </p:spTree>
     <p:extLst>
       <p:ext uri="{BB962C8B-B14F-4D97-AF65-F5344CB8AC3E}">
-        <p14:creationId xmlns:p14="http://schemas.microsoft.com/office/powerpoint/2010/main" val="4085126444"/>
+        <p14:creationId xmlns:p14="http://schemas.microsoft.com/office/powerpoint/2010/main" val="2788399761"/>
       </p:ext>
     </p:extLst>
   </p:cSld>
@@ -5345,7 +5221,7 @@
             </a:r>
             <a:r>
               <a:rPr lang="en-US" altLang="ko-KR" dirty="0" smtClean="0"/>
-              <a:t> View </a:t>
+              <a:t> List </a:t>
             </a:r>
             <a:r>
               <a:rPr lang="ko-KR" altLang="en-US" dirty="0" smtClean="0"/>
@@ -5363,8 +5239,8 @@
         </p:nvSpPr>
         <p:spPr>
           <a:xfrm>
-            <a:off x="8497999" y="948690"/>
-            <a:ext cx="3153398" cy="5355312"/>
+            <a:off x="8490346" y="237756"/>
+            <a:ext cx="3153398" cy="7571303"/>
           </a:xfrm>
           <a:prstGeom prst="rect">
             <a:avLst/>
@@ -5389,8 +5265,8 @@
               <a:buAutoNum type="arabicPeriod"/>
             </a:pPr>
             <a:r>
-              <a:rPr lang="ko-KR" altLang="en-US" dirty="0" smtClean="0"/>
-              <a:t>문의하기 글 작성</a:t>
+              <a:rPr lang="ko-KR" altLang="en-US" dirty="0"/>
+              <a:t>문의하기 메뉴 </a:t>
             </a:r>
             <a:endParaRPr lang="en-US" altLang="ko-KR" dirty="0" smtClean="0"/>
           </a:p>
@@ -5400,8 +5276,12 @@
               <a:buChar char="-"/>
             </a:pPr>
             <a:r>
-              <a:rPr lang="ko-KR" altLang="en-US" dirty="0" smtClean="0"/>
-              <a:t>문의하기 글 작성 화면</a:t>
+              <a:rPr lang="en-US" altLang="ko-KR" dirty="0" smtClean="0"/>
+              <a:t>1</a:t>
+            </a:r>
+            <a:r>
+              <a:rPr lang="ko-KR" altLang="en-US" dirty="0"/>
+              <a:t>차 메뉴 출력 </a:t>
             </a:r>
             <a:endParaRPr lang="en-US" altLang="ko-KR" dirty="0" smtClean="0"/>
           </a:p>
@@ -5418,7 +5298,15 @@
             </a:pPr>
             <a:r>
               <a:rPr lang="ko-KR" altLang="en-US" dirty="0" smtClean="0"/>
-              <a:t>문의 유형</a:t>
+              <a:t>문의하기 </a:t>
+            </a:r>
+            <a:r>
+              <a:rPr lang="ko-KR" altLang="en-US" dirty="0"/>
+              <a:t>글 </a:t>
+            </a:r>
+            <a:r>
+              <a:rPr lang="ko-KR" altLang="en-US" dirty="0" smtClean="0"/>
+              <a:t>목록</a:t>
             </a:r>
             <a:endParaRPr lang="en-US" altLang="ko-KR" dirty="0" smtClean="0"/>
           </a:p>
@@ -5428,12 +5316,12 @@
               <a:buChar char="-"/>
             </a:pPr>
             <a:r>
-              <a:rPr lang="en-US" altLang="ko-KR" dirty="0" smtClean="0"/>
-              <a:t>1</a:t>
-            </a:r>
-            <a:r>
               <a:rPr lang="ko-KR" altLang="en-US" dirty="0" smtClean="0"/>
-              <a:t>차 문의 유형과 </a:t>
+              <a:t>글 </a:t>
+            </a:r>
+            <a:r>
+              <a:rPr lang="ko-KR" altLang="en-US" dirty="0"/>
+              <a:t>제목 첫머리에 </a:t>
             </a:r>
             <a:r>
               <a:rPr lang="en-US" altLang="ko-KR" dirty="0"/>
@@ -5441,27 +5329,7 @@
             </a:r>
             <a:r>
               <a:rPr lang="ko-KR" altLang="en-US" dirty="0"/>
-              <a:t>차 </a:t>
-            </a:r>
-            <a:r>
-              <a:rPr lang="ko-KR" altLang="en-US" dirty="0" smtClean="0"/>
-              <a:t>문의 유형</a:t>
-            </a:r>
-            <a:r>
-              <a:rPr lang="en-US" altLang="ko-KR" dirty="0"/>
-              <a:t>(</a:t>
-            </a:r>
-            <a:r>
-              <a:rPr lang="ko-KR" altLang="en-US" dirty="0" smtClean="0"/>
-              <a:t>상세 유형</a:t>
-            </a:r>
-            <a:r>
-              <a:rPr lang="en-US" altLang="ko-KR" dirty="0"/>
-              <a:t>) </a:t>
-            </a:r>
-            <a:r>
-              <a:rPr lang="ko-KR" altLang="en-US" dirty="0" smtClean="0"/>
-              <a:t>선택</a:t>
+              <a:t>차 메뉴 유형 부터 출력 </a:t>
             </a:r>
             <a:endParaRPr lang="en-US" altLang="ko-KR" dirty="0" smtClean="0"/>
           </a:p>
@@ -5472,29 +5340,27 @@
             </a:pPr>
             <a:r>
               <a:rPr lang="ko-KR" altLang="en-US" dirty="0" smtClean="0"/>
-              <a:t>제목</a:t>
-            </a:r>
-            <a:r>
-              <a:rPr lang="en-US" altLang="ko-KR" dirty="0"/>
-              <a:t>, </a:t>
+              <a:t>답변이 </a:t>
             </a:r>
             <a:r>
               <a:rPr lang="ko-KR" altLang="en-US" dirty="0"/>
-              <a:t>내용 입력 </a:t>
-            </a:r>
-            <a:endParaRPr lang="en-US" altLang="ko-KR" dirty="0" smtClean="0"/>
-          </a:p>
-          <a:p>
-            <a:endParaRPr lang="en-US" altLang="ko-KR" dirty="0" smtClean="0"/>
-          </a:p>
-          <a:p>
-            <a:r>
-              <a:rPr lang="en-US" altLang="ko-KR" dirty="0" smtClean="0"/>
-              <a:t>3.   </a:t>
-            </a:r>
-            <a:r>
-              <a:rPr lang="ko-KR" altLang="en-US" dirty="0" smtClean="0"/>
-              <a:t>취소하기 </a:t>
+              <a:t>완료되었으면 ‘</a:t>
+            </a:r>
+            <a:r>
+              <a:rPr lang="ko-KR" altLang="en-US" dirty="0" err="1"/>
+              <a:t>답변완료</a:t>
+            </a:r>
+            <a:r>
+              <a:rPr lang="ko-KR" altLang="en-US" dirty="0"/>
+              <a:t>’ 그렇지 않으면 ‘</a:t>
+            </a:r>
+            <a:r>
+              <a:rPr lang="ko-KR" altLang="en-US" dirty="0" err="1"/>
+              <a:t>검토중</a:t>
+            </a:r>
+            <a:r>
+              <a:rPr lang="ko-KR" altLang="en-US" dirty="0"/>
+              <a:t>’ 출력 </a:t>
             </a:r>
             <a:endParaRPr lang="en-US" altLang="ko-KR" dirty="0" smtClean="0"/>
           </a:p>
@@ -5505,11 +5371,27 @@
             </a:pPr>
             <a:r>
               <a:rPr lang="ko-KR" altLang="en-US" dirty="0" smtClean="0"/>
-              <a:t>문의하기 </a:t>
+              <a:t>문의한 </a:t>
             </a:r>
             <a:r>
               <a:rPr lang="ko-KR" altLang="en-US" dirty="0"/>
-              <a:t>목록으로 이동 </a:t>
+              <a:t>사용자 </a:t>
+            </a:r>
+            <a:r>
+              <a:rPr lang="ko-KR" altLang="en-US" dirty="0" err="1"/>
+              <a:t>계정명</a:t>
+            </a:r>
+            <a:r>
+              <a:rPr lang="ko-KR" altLang="en-US" dirty="0"/>
+              <a:t> </a:t>
+            </a:r>
+            <a:r>
+              <a:rPr lang="ko-KR" altLang="en-US" dirty="0" err="1"/>
+              <a:t>마스킹</a:t>
+            </a:r>
+            <a:r>
+              <a:rPr lang="ko-KR" altLang="en-US" dirty="0"/>
+              <a:t> 처 리 </a:t>
             </a:r>
             <a:endParaRPr lang="en-US" altLang="ko-KR" dirty="0" smtClean="0"/>
           </a:p>
@@ -5520,33 +5402,35 @@
             </a:pPr>
             <a:r>
               <a:rPr lang="ko-KR" altLang="en-US" dirty="0" smtClean="0"/>
-              <a:t>메뉴에 </a:t>
+              <a:t>날짜는 </a:t>
             </a:r>
             <a:r>
               <a:rPr lang="ko-KR" altLang="en-US" dirty="0"/>
-              <a:t>맞는 </a:t>
-            </a:r>
-            <a:r>
-              <a:rPr lang="ko-KR" altLang="en-US" dirty="0" smtClean="0"/>
-              <a:t>글 목록 이동</a:t>
-            </a:r>
-            <a:endParaRPr lang="en-US" altLang="ko-KR" dirty="0" smtClean="0"/>
-          </a:p>
-          <a:p>
-            <a:endParaRPr lang="en-US" altLang="ko-KR" dirty="0" smtClean="0"/>
-          </a:p>
-          <a:p>
+              <a:t>연</a:t>
+            </a:r>
             <a:r>
               <a:rPr lang="en-US" altLang="ko-KR" dirty="0"/>
-              <a:t>4 </a:t>
-            </a:r>
-            <a:r>
-              <a:rPr lang="en-US" altLang="ko-KR" dirty="0" smtClean="0"/>
-              <a:t>. </a:t>
+              <a:t>/</a:t>
             </a:r>
             <a:r>
               <a:rPr lang="ko-KR" altLang="en-US" dirty="0"/>
-              <a:t>등록하기 </a:t>
+              <a:t>월</a:t>
+            </a:r>
+            <a:r>
+              <a:rPr lang="en-US" altLang="ko-KR" dirty="0"/>
+              <a:t>/</a:t>
+            </a:r>
+            <a:r>
+              <a:rPr lang="ko-KR" altLang="en-US" dirty="0"/>
+              <a:t>일 </a:t>
+            </a:r>
+            <a:r>
+              <a:rPr lang="en-US" altLang="ko-KR" dirty="0"/>
+              <a:t>2</a:t>
+            </a:r>
+            <a:r>
+              <a:rPr lang="ko-KR" altLang="en-US" dirty="0"/>
+              <a:t>자리씩 출력 </a:t>
             </a:r>
             <a:endParaRPr lang="en-US" altLang="ko-KR" dirty="0" smtClean="0"/>
           </a:p>
@@ -5557,15 +5441,15 @@
             </a:pPr>
             <a:r>
               <a:rPr lang="ko-KR" altLang="en-US" dirty="0" smtClean="0"/>
-              <a:t>문의하기 </a:t>
+              <a:t>최신 </a:t>
+            </a:r>
+            <a:r>
+              <a:rPr lang="ko-KR" altLang="en-US" dirty="0" err="1"/>
+              <a:t>등록순</a:t>
             </a:r>
             <a:r>
               <a:rPr lang="ko-KR" altLang="en-US" dirty="0"/>
-              <a:t>테이블 </a:t>
-            </a:r>
-            <a:r>
-              <a:rPr lang="en-US" altLang="ko-KR" dirty="0"/>
-              <a:t>INSERT </a:t>
+              <a:t> 출력 </a:t>
             </a:r>
             <a:endParaRPr lang="en-US" altLang="ko-KR" dirty="0" smtClean="0"/>
           </a:p>
@@ -5574,14 +5458,95 @@
               <a:buFontTx/>
               <a:buChar char="-"/>
             </a:pPr>
+            <a:endParaRPr lang="en-US" altLang="ko-KR" dirty="0" smtClean="0"/>
+          </a:p>
+          <a:p>
+            <a:r>
+              <a:rPr lang="en-US" altLang="ko-KR" dirty="0" smtClean="0"/>
+              <a:t>3.   </a:t>
+            </a:r>
             <a:r>
               <a:rPr lang="ko-KR" altLang="en-US" dirty="0" smtClean="0"/>
-              <a:t>등록 </a:t>
+              <a:t>페이지 </a:t>
             </a:r>
             <a:r>
               <a:rPr lang="ko-KR" altLang="en-US" dirty="0"/>
-              <a:t>후 목록 이동 </a:t>
-            </a:r>
+              <a:t>번호 </a:t>
+            </a:r>
+            <a:endParaRPr lang="en-US" altLang="ko-KR" dirty="0" smtClean="0"/>
+          </a:p>
+          <a:p>
+            <a:pPr marL="285750" indent="-285750">
+              <a:buFontTx/>
+              <a:buChar char="-"/>
+            </a:pPr>
+            <a:r>
+              <a:rPr lang="en-US" altLang="ko-KR" dirty="0" smtClean="0"/>
+              <a:t>10</a:t>
+            </a:r>
+            <a:r>
+              <a:rPr lang="ko-KR" altLang="en-US" dirty="0" smtClean="0"/>
+              <a:t>개씩 출력 </a:t>
+            </a:r>
+            <a:r>
+              <a:rPr lang="ko-KR" altLang="en-US" dirty="0"/>
+              <a:t>되도록 페이지 번호 계산 </a:t>
+            </a:r>
+            <a:r>
+              <a:rPr lang="ko-KR" altLang="en-US" dirty="0" smtClean="0"/>
+              <a:t> </a:t>
+            </a:r>
+            <a:endParaRPr lang="en-US" altLang="ko-KR" dirty="0" smtClean="0"/>
+          </a:p>
+          <a:p>
+            <a:pPr marL="285750" indent="-285750">
+              <a:buFontTx/>
+              <a:buChar char="-"/>
+            </a:pPr>
+            <a:endParaRPr lang="en-US" altLang="ko-KR" dirty="0" smtClean="0"/>
+          </a:p>
+          <a:p>
+            <a:r>
+              <a:rPr lang="en-US" altLang="ko-KR" dirty="0"/>
+              <a:t>4 </a:t>
+            </a:r>
+            <a:r>
+              <a:rPr lang="en-US" altLang="ko-KR" dirty="0" smtClean="0"/>
+              <a:t>.  </a:t>
+            </a:r>
+            <a:r>
+              <a:rPr lang="ko-KR" altLang="en-US" dirty="0" smtClean="0"/>
+              <a:t>문의하기 </a:t>
+            </a:r>
+            <a:endParaRPr lang="en-US" altLang="ko-KR" dirty="0" smtClean="0"/>
+          </a:p>
+          <a:p>
+            <a:pPr marL="285750" indent="-285750">
+              <a:buFontTx/>
+              <a:buChar char="-"/>
+            </a:pPr>
+            <a:r>
+              <a:rPr lang="ko-KR" altLang="en-US" dirty="0" smtClean="0"/>
+              <a:t>문의하기 </a:t>
+            </a:r>
+            <a:r>
+              <a:rPr lang="ko-KR" altLang="en-US" dirty="0"/>
+              <a:t>페이지로 </a:t>
+            </a:r>
+            <a:r>
+              <a:rPr lang="ko-KR" altLang="en-US" dirty="0" smtClean="0"/>
+              <a:t>이동</a:t>
+            </a:r>
+            <a:endParaRPr lang="en-US" altLang="ko-KR" dirty="0" smtClean="0"/>
+          </a:p>
+          <a:p>
+            <a:pPr marL="285750" indent="-285750">
+              <a:buFontTx/>
+              <a:buChar char="-"/>
+            </a:pPr>
+            <a:endParaRPr lang="en-US" altLang="ko-KR" dirty="0"/>
+          </a:p>
+          <a:p>
             <a:endParaRPr lang="en-US" altLang="ko-KR" dirty="0" smtClean="0"/>
           </a:p>
           <a:p>
@@ -5625,8 +5590,8 @@
         </p:blipFill>
         <p:spPr>
           <a:xfrm>
-            <a:off x="884031" y="861237"/>
-            <a:ext cx="7460603" cy="4946767"/>
+            <a:off x="977622" y="1233377"/>
+            <a:ext cx="6979529" cy="4627790"/>
           </a:xfrm>
           <a:prstGeom prst="rect">
             <a:avLst/>
@@ -5636,7 +5601,7 @@
     </p:spTree>
     <p:extLst>
       <p:ext uri="{BB962C8B-B14F-4D97-AF65-F5344CB8AC3E}">
-        <p14:creationId xmlns:p14="http://schemas.microsoft.com/office/powerpoint/2010/main" val="1264442755"/>
+        <p14:creationId xmlns:p14="http://schemas.microsoft.com/office/powerpoint/2010/main" val="2173585253"/>
       </p:ext>
     </p:extLst>
   </p:cSld>
@@ -5685,7 +5650,15 @@
           <a:p>
             <a:r>
               <a:rPr lang="en-US" altLang="ko-KR" dirty="0" smtClean="0"/>
-              <a:t>Admin Notice List </a:t>
+              <a:t>CS </a:t>
+            </a:r>
+            <a:r>
+              <a:rPr lang="en-US" altLang="ko-KR" dirty="0" err="1" smtClean="0"/>
+              <a:t>Qna</a:t>
+            </a:r>
+            <a:r>
+              <a:rPr lang="en-US" altLang="ko-KR" dirty="0" smtClean="0"/>
+              <a:t> View </a:t>
             </a:r>
             <a:r>
               <a:rPr lang="ko-KR" altLang="en-US" dirty="0" smtClean="0"/>
@@ -5703,8 +5676,8 @@
         </p:nvSpPr>
         <p:spPr>
           <a:xfrm>
-            <a:off x="8460065" y="117693"/>
-            <a:ext cx="3153398" cy="6740307"/>
+            <a:off x="8497999" y="948690"/>
+            <a:ext cx="3153398" cy="5909310"/>
           </a:xfrm>
           <a:prstGeom prst="rect">
             <a:avLst/>
@@ -5718,10 +5691,10 @@
           <a:lstStyle/>
           <a:p>
             <a:r>
-              <a:rPr lang="ko-KR" altLang="en-US" sz="1600" dirty="0" smtClean="0"/>
+              <a:rPr lang="ko-KR" altLang="en-US" dirty="0" smtClean="0"/>
               <a:t>기능 설명</a:t>
             </a:r>
-            <a:endParaRPr lang="en-US" altLang="ko-KR" sz="1600" dirty="0" smtClean="0"/>
+            <a:endParaRPr lang="en-US" altLang="ko-KR" dirty="0" smtClean="0"/>
           </a:p>
           <a:p>
             <a:pPr marL="342900" indent="-342900">
@@ -5729,14 +5702,10 @@
               <a:buAutoNum type="arabicPeriod"/>
             </a:pPr>
             <a:r>
-              <a:rPr lang="ko-KR" altLang="en-US" sz="1600" dirty="0" smtClean="0"/>
-              <a:t>고객센터 메뉴</a:t>
-            </a:r>
-            <a:r>
-              <a:rPr lang="en-US" altLang="ko-KR" sz="1600" dirty="0"/>
-              <a:t> </a:t>
-            </a:r>
-            <a:endParaRPr lang="en-US" altLang="ko-KR" sz="1600" dirty="0" smtClean="0"/>
+              <a:rPr lang="ko-KR" altLang="en-US" dirty="0" smtClean="0"/>
+              <a:t>문의하기 글 보기 </a:t>
+            </a:r>
+            <a:endParaRPr lang="en-US" altLang="ko-KR" dirty="0" smtClean="0"/>
           </a:p>
           <a:p>
             <a:pPr marL="285750" indent="-285750">
@@ -5744,58 +5713,31 @@
               <a:buChar char="-"/>
             </a:pPr>
             <a:r>
-              <a:rPr lang="ko-KR" altLang="en-US" sz="1600" dirty="0" smtClean="0"/>
-              <a:t>공지사항을 </a:t>
-            </a:r>
-            <a:r>
-              <a:rPr lang="ko-KR" altLang="en-US" sz="1600" dirty="0"/>
-              <a:t>등록</a:t>
-            </a:r>
-            <a:r>
-              <a:rPr lang="en-US" altLang="ko-KR" sz="1600" dirty="0"/>
-              <a:t>, </a:t>
-            </a:r>
-            <a:r>
-              <a:rPr lang="ko-KR" altLang="en-US" sz="1600" dirty="0"/>
-              <a:t>수정</a:t>
-            </a:r>
-            <a:r>
-              <a:rPr lang="en-US" altLang="ko-KR" sz="1600" dirty="0"/>
-              <a:t>, </a:t>
-            </a:r>
-            <a:r>
-              <a:rPr lang="ko-KR" altLang="en-US" sz="1600" dirty="0"/>
-              <a:t>삭제하는 관리 메뉴 </a:t>
-            </a:r>
-            <a:endParaRPr lang="en-US" altLang="ko-KR" sz="1600" dirty="0" smtClean="0"/>
-          </a:p>
-          <a:p>
-            <a:endParaRPr lang="en-US" altLang="ko-KR" sz="1600" dirty="0" smtClean="0"/>
-          </a:p>
-          <a:p>
-            <a:pPr marL="342900" indent="-342900">
-              <a:buAutoNum type="arabicPeriod" startAt="2"/>
-            </a:pPr>
-            <a:r>
-              <a:rPr lang="ko-KR" altLang="en-US" sz="1600" dirty="0"/>
-              <a:t>공지사항 </a:t>
-            </a:r>
-            <a:r>
-              <a:rPr lang="ko-KR" altLang="en-US" sz="1600" dirty="0" smtClean="0"/>
-              <a:t>유형 선택 </a:t>
-            </a:r>
-            <a:endParaRPr lang="en-US" altLang="ko-KR" sz="1600" dirty="0" smtClean="0"/>
+              <a:rPr lang="ko-KR" altLang="en-US" dirty="0" smtClean="0"/>
+              <a:t>목록에서 </a:t>
+            </a:r>
+            <a:r>
+              <a:rPr lang="ko-KR" altLang="en-US" dirty="0"/>
+              <a:t>선택한 글 상세보기 </a:t>
+            </a:r>
+            <a:endParaRPr lang="en-US" altLang="ko-KR" dirty="0" smtClean="0"/>
           </a:p>
           <a:p>
             <a:pPr marL="285750" indent="-285750">
               <a:buFontTx/>
               <a:buChar char="-"/>
             </a:pPr>
-            <a:r>
-              <a:rPr lang="ko-KR" altLang="en-US" sz="1600" dirty="0"/>
-              <a:t>공지사항 유형별 목록 출력하기</a:t>
-            </a:r>
-            <a:endParaRPr lang="en-US" altLang="ko-KR" sz="1600" dirty="0" smtClean="0"/>
+            <a:endParaRPr lang="en-US" altLang="ko-KR" dirty="0" smtClean="0"/>
+          </a:p>
+          <a:p>
+            <a:pPr marL="342900" indent="-342900">
+              <a:buAutoNum type="arabicPeriod" startAt="2"/>
+            </a:pPr>
+            <a:r>
+              <a:rPr lang="ko-KR" altLang="en-US" dirty="0" smtClean="0"/>
+              <a:t>문의하기 글 답변</a:t>
+            </a:r>
+            <a:endParaRPr lang="en-US" altLang="ko-KR" dirty="0" smtClean="0"/>
           </a:p>
           <a:p>
             <a:pPr marL="285750" indent="-285750">
@@ -5803,28 +5745,10 @@
               <a:buChar char="-"/>
             </a:pPr>
             <a:r>
-              <a:rPr lang="ko-KR" altLang="en-US" sz="1600" dirty="0" smtClean="0"/>
-              <a:t>공지사항 </a:t>
-            </a:r>
-            <a:r>
-              <a:rPr lang="ko-KR" altLang="en-US" sz="1600" dirty="0"/>
-              <a:t>유형 선택할 때 마다 목록 갱신 됨 </a:t>
-            </a:r>
-            <a:endParaRPr lang="en-US" altLang="ko-KR" sz="1600" dirty="0" smtClean="0"/>
-          </a:p>
-          <a:p>
-            <a:endParaRPr lang="en-US" altLang="ko-KR" sz="1600" dirty="0" smtClean="0"/>
-          </a:p>
-          <a:p>
-            <a:r>
-              <a:rPr lang="en-US" altLang="ko-KR" sz="1600" dirty="0" smtClean="0"/>
-              <a:t>3.  </a:t>
-            </a:r>
-            <a:r>
-              <a:rPr lang="ko-KR" altLang="en-US" sz="1600" dirty="0" smtClean="0"/>
-              <a:t>선택 삭제 </a:t>
-            </a:r>
-            <a:endParaRPr lang="en-US" altLang="ko-KR" sz="1600" dirty="0" smtClean="0"/>
+              <a:rPr lang="ko-KR" altLang="en-US" dirty="0" smtClean="0"/>
+              <a:t>답변이 완료된 글이면 답변 내용 출력 </a:t>
+            </a:r>
+            <a:endParaRPr lang="en-US" altLang="ko-KR" dirty="0" smtClean="0"/>
           </a:p>
           <a:p>
             <a:pPr marL="285750" indent="-285750">
@@ -5832,92 +5756,39 @@
               <a:buChar char="-"/>
             </a:pPr>
             <a:r>
-              <a:rPr lang="ko-KR" altLang="en-US" sz="1600" dirty="0" smtClean="0"/>
-              <a:t>체크박스 </a:t>
-            </a:r>
-            <a:r>
-              <a:rPr lang="ko-KR" altLang="en-US" sz="1600" dirty="0"/>
-              <a:t>선택한 글 </a:t>
-            </a:r>
-            <a:r>
-              <a:rPr lang="ko-KR" altLang="en-US" sz="1600" dirty="0" smtClean="0"/>
-              <a:t>선택 삭제</a:t>
-            </a:r>
-            <a:endParaRPr lang="en-US" altLang="ko-KR" sz="1600" dirty="0" smtClean="0"/>
-          </a:p>
-          <a:p>
-            <a:endParaRPr lang="en-US" altLang="ko-KR" sz="1600" dirty="0" smtClean="0"/>
-          </a:p>
-          <a:p>
-            <a:r>
-              <a:rPr lang="en-US" altLang="ko-KR" sz="1600" dirty="0" smtClean="0"/>
-              <a:t>4.  </a:t>
-            </a:r>
-            <a:r>
-              <a:rPr lang="ko-KR" altLang="en-US" sz="1600" dirty="0" smtClean="0"/>
-              <a:t>공지사항 </a:t>
-            </a:r>
-            <a:r>
-              <a:rPr lang="ko-KR" altLang="en-US" sz="1600" dirty="0"/>
-              <a:t>제목 </a:t>
-            </a:r>
-            <a:endParaRPr lang="en-US" altLang="ko-KR" sz="1600" dirty="0" smtClean="0"/>
-          </a:p>
-          <a:p>
-            <a:r>
-              <a:rPr lang="en-US" altLang="ko-KR" sz="1600" dirty="0" smtClean="0"/>
-              <a:t>-    </a:t>
-            </a:r>
-            <a:r>
-              <a:rPr lang="ko-KR" altLang="en-US" sz="1600" dirty="0" smtClean="0"/>
-              <a:t>제목 클릭 시 글 보기 </a:t>
-            </a:r>
-            <a:r>
-              <a:rPr lang="ko-KR" altLang="en-US" sz="1600" dirty="0"/>
-              <a:t>이동 </a:t>
-            </a:r>
-            <a:endParaRPr lang="en-US" altLang="ko-KR" sz="1600" dirty="0"/>
-          </a:p>
-          <a:p>
-            <a:endParaRPr lang="en-US" altLang="ko-KR" sz="1600" dirty="0" smtClean="0"/>
-          </a:p>
-          <a:p>
-            <a:r>
-              <a:rPr lang="en-US" altLang="ko-KR" sz="1600" dirty="0" smtClean="0"/>
-              <a:t>5. </a:t>
-            </a:r>
-            <a:r>
-              <a:rPr lang="ko-KR" altLang="en-US" sz="1600" dirty="0"/>
-              <a:t>관리 </a:t>
-            </a:r>
-            <a:endParaRPr lang="en-US" altLang="ko-KR" sz="1600" dirty="0" smtClean="0"/>
+              <a:rPr lang="ko-KR" altLang="en-US" dirty="0" smtClean="0"/>
+              <a:t>답변이 </a:t>
+            </a:r>
+            <a:r>
+              <a:rPr lang="ko-KR" altLang="en-US" dirty="0"/>
+              <a:t>없으면 출력 </a:t>
+            </a:r>
+            <a:r>
+              <a:rPr lang="en-US" altLang="ko-KR" dirty="0" smtClean="0"/>
+              <a:t>X</a:t>
+            </a:r>
           </a:p>
           <a:p>
             <a:pPr marL="285750" indent="-285750">
               <a:buFontTx/>
               <a:buChar char="-"/>
             </a:pPr>
-            <a:r>
-              <a:rPr lang="ko-KR" altLang="en-US" sz="1600" dirty="0" smtClean="0"/>
-              <a:t>삭제 </a:t>
-            </a:r>
-            <a:r>
-              <a:rPr lang="en-US" altLang="ko-KR" sz="1600" dirty="0"/>
-              <a:t>: </a:t>
-            </a:r>
-            <a:r>
-              <a:rPr lang="ko-KR" altLang="en-US" sz="1600" dirty="0"/>
-              <a:t>확인 대화상자 </a:t>
-            </a:r>
-            <a:r>
-              <a:rPr lang="ko-KR" altLang="en-US" sz="1600" dirty="0" smtClean="0"/>
-              <a:t>출력 후 </a:t>
-            </a:r>
-            <a:r>
-              <a:rPr lang="ko-KR" altLang="en-US" sz="1600" dirty="0"/>
-              <a:t>삭제 </a:t>
-            </a:r>
-            <a:endParaRPr lang="en-US" altLang="ko-KR" sz="1600" dirty="0" smtClean="0"/>
+            <a:endParaRPr lang="en-US" altLang="ko-KR" dirty="0" smtClean="0"/>
+          </a:p>
+          <a:p>
+            <a:r>
+              <a:rPr lang="en-US" altLang="ko-KR" dirty="0" smtClean="0"/>
+              <a:t>3.   </a:t>
+            </a:r>
+            <a:r>
+              <a:rPr lang="ko-KR" altLang="en-US" dirty="0" smtClean="0"/>
+              <a:t>페이지 </a:t>
+            </a:r>
+            <a:r>
+              <a:rPr lang="ko-KR" altLang="en-US" dirty="0"/>
+              <a:t>번호 </a:t>
+            </a:r>
+            <a:endParaRPr lang="en-US" altLang="ko-KR" dirty="0" smtClean="0"/>
           </a:p>
           <a:p>
             <a:pPr marL="285750" indent="-285750">
@@ -5925,91 +5796,106 @@
               <a:buChar char="-"/>
             </a:pPr>
             <a:r>
-              <a:rPr lang="ko-KR" altLang="en-US" sz="1600" dirty="0" smtClean="0"/>
-              <a:t>수정 </a:t>
-            </a:r>
-            <a:r>
-              <a:rPr lang="en-US" altLang="ko-KR" sz="1600" dirty="0"/>
-              <a:t>: </a:t>
-            </a:r>
-            <a:r>
-              <a:rPr lang="ko-KR" altLang="en-US" sz="1600" dirty="0" smtClean="0"/>
-              <a:t>글 수정 </a:t>
-            </a:r>
-            <a:r>
-              <a:rPr lang="ko-KR" altLang="en-US" sz="1600" dirty="0"/>
-              <a:t>화면으로 </a:t>
-            </a:r>
-            <a:r>
-              <a:rPr lang="ko-KR" altLang="en-US" sz="1600" dirty="0" smtClean="0"/>
-              <a:t>이동</a:t>
-            </a:r>
-            <a:endParaRPr lang="en-US" altLang="ko-KR" sz="1600" dirty="0" smtClean="0"/>
-          </a:p>
-          <a:p>
-            <a:endParaRPr lang="en-US" altLang="ko-KR" sz="1600" dirty="0"/>
-          </a:p>
-          <a:p>
-            <a:r>
-              <a:rPr lang="en-US" altLang="ko-KR" sz="1600" dirty="0"/>
-              <a:t>6 </a:t>
-            </a:r>
-            <a:r>
-              <a:rPr lang="en-US" altLang="ko-KR" sz="1600" dirty="0" smtClean="0"/>
+              <a:rPr lang="en-US" altLang="ko-KR" dirty="0" smtClean="0"/>
+              <a:t>10</a:t>
+            </a:r>
+            <a:r>
+              <a:rPr lang="ko-KR" altLang="en-US" dirty="0" smtClean="0"/>
+              <a:t>개씩 출력 </a:t>
+            </a:r>
+            <a:r>
+              <a:rPr lang="ko-KR" altLang="en-US" dirty="0"/>
+              <a:t>되도록 페이지 번호 계산 </a:t>
+            </a:r>
+            <a:r>
+              <a:rPr lang="ko-KR" altLang="en-US" dirty="0" smtClean="0"/>
+              <a:t> </a:t>
+            </a:r>
+            <a:endParaRPr lang="en-US" altLang="ko-KR" dirty="0" smtClean="0"/>
+          </a:p>
+          <a:p>
+            <a:pPr marL="285750" indent="-285750">
+              <a:buFontTx/>
+              <a:buChar char="-"/>
+            </a:pPr>
+            <a:endParaRPr lang="en-US" altLang="ko-KR" dirty="0" smtClean="0"/>
+          </a:p>
+          <a:p>
+            <a:r>
+              <a:rPr lang="en-US" altLang="ko-KR" dirty="0"/>
+              <a:t>4 </a:t>
+            </a:r>
+            <a:r>
+              <a:rPr lang="en-US" altLang="ko-KR" dirty="0" smtClean="0"/>
               <a:t>. </a:t>
             </a:r>
             <a:r>
-              <a:rPr lang="ko-KR" altLang="en-US" sz="1600" dirty="0" smtClean="0"/>
-              <a:t>페이지 </a:t>
-            </a:r>
-            <a:r>
-              <a:rPr lang="ko-KR" altLang="en-US" sz="1600" dirty="0"/>
-              <a:t>번호 </a:t>
-            </a:r>
-            <a:endParaRPr lang="en-US" altLang="ko-KR" sz="1600" dirty="0" smtClean="0"/>
-          </a:p>
-          <a:p>
-            <a:r>
-              <a:rPr lang="en-US" altLang="ko-KR" sz="1600" dirty="0" smtClean="0"/>
-              <a:t>-     10</a:t>
-            </a:r>
-            <a:r>
-              <a:rPr lang="ko-KR" altLang="en-US" sz="1600" dirty="0"/>
-              <a:t>개씩 공지사항 출력</a:t>
-            </a:r>
-            <a:endParaRPr lang="en-US" altLang="ko-KR" sz="1600" dirty="0" smtClean="0"/>
+              <a:rPr lang="ko-KR" altLang="en-US" dirty="0" err="1"/>
+              <a:t>목록버튼</a:t>
+            </a:r>
+            <a:r>
+              <a:rPr lang="ko-KR" altLang="en-US" dirty="0"/>
+              <a:t> </a:t>
+            </a:r>
+            <a:endParaRPr lang="en-US" altLang="ko-KR" dirty="0" smtClean="0"/>
+          </a:p>
+          <a:p>
+            <a:pPr marL="285750" indent="-285750">
+              <a:buFontTx/>
+              <a:buChar char="-"/>
+            </a:pPr>
+            <a:r>
+              <a:rPr lang="ko-KR" altLang="en-US" dirty="0" smtClean="0"/>
+              <a:t>글 목록으로 </a:t>
+            </a:r>
+            <a:r>
+              <a:rPr lang="ko-KR" altLang="en-US" dirty="0"/>
+              <a:t>이동 </a:t>
+            </a:r>
+            <a:endParaRPr lang="en-US" altLang="ko-KR" dirty="0" smtClean="0"/>
+          </a:p>
+          <a:p>
+            <a:pPr marL="285750" indent="-285750">
+              <a:buFontTx/>
+              <a:buChar char="-"/>
+            </a:pPr>
+            <a:r>
+              <a:rPr lang="ko-KR" altLang="en-US" dirty="0" smtClean="0"/>
+              <a:t>메뉴에 </a:t>
+            </a:r>
+            <a:r>
+              <a:rPr lang="ko-KR" altLang="en-US" dirty="0"/>
+              <a:t>맞는 </a:t>
+            </a:r>
+            <a:r>
+              <a:rPr lang="ko-KR" altLang="en-US" dirty="0" smtClean="0"/>
+              <a:t>글 목록 </a:t>
+            </a:r>
+            <a:r>
+              <a:rPr lang="ko-KR" altLang="en-US" dirty="0"/>
+              <a:t>이동 </a:t>
+            </a:r>
+            <a:endParaRPr lang="en-US" altLang="ko-KR" dirty="0"/>
+          </a:p>
+          <a:p>
+            <a:endParaRPr lang="en-US" altLang="ko-KR" dirty="0" smtClean="0"/>
+          </a:p>
+          <a:p>
+            <a:endParaRPr lang="en-US" altLang="ko-KR" dirty="0" smtClean="0"/>
           </a:p>
           <a:p>
             <a:pPr marL="342900" indent="-342900">
               <a:buFont typeface="+mj-lt"/>
               <a:buAutoNum type="arabicPeriod"/>
             </a:pPr>
-            <a:endParaRPr lang="en-US" altLang="ko-KR" sz="1600" dirty="0" smtClean="0"/>
+            <a:endParaRPr lang="en-US" altLang="ko-KR" dirty="0" smtClean="0"/>
           </a:p>
           <a:p>
             <a:pPr marL="342900" indent="-342900">
-              <a:buAutoNum type="arabicPeriod" startAt="7"/>
+              <a:buFont typeface="+mj-lt"/>
+              <a:buAutoNum type="arabicPeriod"/>
             </a:pPr>
-            <a:r>
-              <a:rPr lang="ko-KR" altLang="en-US" sz="1600" dirty="0" smtClean="0"/>
-              <a:t>작성하기 </a:t>
-            </a:r>
-            <a:endParaRPr lang="en-US" altLang="ko-KR" sz="1600" dirty="0" smtClean="0"/>
-          </a:p>
-          <a:p>
-            <a:pPr marL="285750" indent="-285750">
-              <a:buFontTx/>
-              <a:buChar char="-"/>
-            </a:pPr>
-            <a:r>
-              <a:rPr lang="ko-KR" altLang="en-US" sz="1600" dirty="0" smtClean="0"/>
-              <a:t>작성하기 </a:t>
-            </a:r>
-            <a:r>
-              <a:rPr lang="ko-KR" altLang="en-US" sz="1600" dirty="0"/>
-              <a:t>페이지로 이동</a:t>
-            </a:r>
-            <a:endParaRPr lang="en-US" altLang="ko-KR" sz="1600" dirty="0" smtClean="0"/>
+            <a:endParaRPr lang="en-US" altLang="ko-KR" dirty="0" smtClean="0"/>
           </a:p>
         </p:txBody>
       </p:sp>
@@ -6035,8 +5921,8 @@
         </p:blipFill>
         <p:spPr>
           <a:xfrm>
-            <a:off x="923050" y="948690"/>
-            <a:ext cx="7344631" cy="4562648"/>
+            <a:off x="904259" y="850604"/>
+            <a:ext cx="7412495" cy="4914869"/>
           </a:xfrm>
           <a:prstGeom prst="rect">
             <a:avLst/>
@@ -6046,7 +5932,355 @@
     </p:spTree>
     <p:extLst>
       <p:ext uri="{BB962C8B-B14F-4D97-AF65-F5344CB8AC3E}">
-        <p14:creationId xmlns:p14="http://schemas.microsoft.com/office/powerpoint/2010/main" val="2503265829"/>
+        <p14:creationId xmlns:p14="http://schemas.microsoft.com/office/powerpoint/2010/main" val="4085126444"/>
+      </p:ext>
+    </p:extLst>
+  </p:cSld>
+  <p:clrMapOvr>
+    <a:masterClrMapping/>
+  </p:clrMapOvr>
+</p:sld>
+</file>
+
+<file path=ppt/slides/slide9.xml><?xml version="1.0" encoding="utf-8"?>
+<p:sld xmlns:a="http://schemas.openxmlformats.org/drawingml/2006/main" xmlns:r="http://schemas.openxmlformats.org/officeDocument/2006/relationships" xmlns:p="http://schemas.openxmlformats.org/presentationml/2006/main">
+  <p:cSld>
+    <p:spTree>
+      <p:nvGrpSpPr>
+        <p:cNvPr id="1" name=""/>
+        <p:cNvGrpSpPr/>
+        <p:nvPr/>
+      </p:nvGrpSpPr>
+      <p:grpSpPr>
+        <a:xfrm>
+          <a:off x="0" y="0"/>
+          <a:ext cx="0" cy="0"/>
+          <a:chOff x="0" y="0"/>
+          <a:chExt cx="0" cy="0"/>
+        </a:xfrm>
+      </p:grpSpPr>
+      <p:sp>
+        <p:nvSpPr>
+          <p:cNvPr id="2" name="제목 1"/>
+          <p:cNvSpPr>
+            <a:spLocks noGrp="1"/>
+          </p:cNvSpPr>
+          <p:nvPr>
+            <p:ph type="title"/>
+          </p:nvPr>
+        </p:nvSpPr>
+        <p:spPr>
+          <a:xfrm>
+            <a:off x="730666" y="0"/>
+            <a:ext cx="9601200" cy="1485900"/>
+          </a:xfrm>
+        </p:spPr>
+        <p:txBody>
+          <a:bodyPr/>
+          <a:lstStyle/>
+          <a:p>
+            <a:r>
+              <a:rPr lang="en-US" altLang="ko-KR" dirty="0" smtClean="0"/>
+              <a:t>CS </a:t>
+            </a:r>
+            <a:r>
+              <a:rPr lang="en-US" altLang="ko-KR" dirty="0" err="1" smtClean="0"/>
+              <a:t>Qna</a:t>
+            </a:r>
+            <a:r>
+              <a:rPr lang="en-US" altLang="ko-KR" dirty="0" smtClean="0"/>
+              <a:t> View </a:t>
+            </a:r>
+            <a:r>
+              <a:rPr lang="ko-KR" altLang="en-US" dirty="0" smtClean="0"/>
+              <a:t>기능</a:t>
+            </a:r>
+            <a:endParaRPr lang="ko-KR" altLang="en-US" dirty="0"/>
+          </a:p>
+        </p:txBody>
+      </p:sp>
+      <p:sp>
+        <p:nvSpPr>
+          <p:cNvPr id="6" name="TextBox 5"/>
+          <p:cNvSpPr txBox="1"/>
+          <p:nvPr/>
+        </p:nvSpPr>
+        <p:spPr>
+          <a:xfrm>
+            <a:off x="8497999" y="948690"/>
+            <a:ext cx="3153398" cy="5355312"/>
+          </a:xfrm>
+          <a:prstGeom prst="rect">
+            <a:avLst/>
+          </a:prstGeom>
+          <a:noFill/>
+        </p:spPr>
+        <p:txBody>
+          <a:bodyPr wrap="square" rtlCol="0">
+            <a:spAutoFit/>
+          </a:bodyPr>
+          <a:lstStyle/>
+          <a:p>
+            <a:r>
+              <a:rPr lang="ko-KR" altLang="en-US" dirty="0" smtClean="0"/>
+              <a:t>기능 설명</a:t>
+            </a:r>
+            <a:endParaRPr lang="en-US" altLang="ko-KR" dirty="0" smtClean="0"/>
+          </a:p>
+          <a:p>
+            <a:pPr marL="342900" indent="-342900">
+              <a:buFont typeface="+mj-lt"/>
+              <a:buAutoNum type="arabicPeriod"/>
+            </a:pPr>
+            <a:r>
+              <a:rPr lang="ko-KR" altLang="en-US" dirty="0" smtClean="0"/>
+              <a:t>문의하기 글 작성</a:t>
+            </a:r>
+            <a:endParaRPr lang="en-US" altLang="ko-KR" dirty="0" smtClean="0"/>
+          </a:p>
+          <a:p>
+            <a:pPr marL="285750" indent="-285750">
+              <a:buFontTx/>
+              <a:buChar char="-"/>
+            </a:pPr>
+            <a:r>
+              <a:rPr lang="ko-KR" altLang="en-US" dirty="0" smtClean="0"/>
+              <a:t>문의하기 글 작성 화면</a:t>
+            </a:r>
+            <a:endParaRPr lang="en-US" altLang="ko-KR" dirty="0" smtClean="0"/>
+          </a:p>
+          <a:p>
+            <a:pPr marL="285750" indent="-285750">
+              <a:buFontTx/>
+              <a:buChar char="-"/>
+            </a:pPr>
+            <a:endParaRPr lang="en-US" altLang="ko-KR" dirty="0" smtClean="0"/>
+          </a:p>
+          <a:p>
+            <a:pPr marL="342900" indent="-342900">
+              <a:buAutoNum type="arabicPeriod" startAt="2"/>
+            </a:pPr>
+            <a:r>
+              <a:rPr lang="ko-KR" altLang="en-US" dirty="0" smtClean="0"/>
+              <a:t>문의 유형</a:t>
+            </a:r>
+            <a:endParaRPr lang="en-US" altLang="ko-KR" dirty="0" smtClean="0"/>
+          </a:p>
+          <a:p>
+            <a:pPr marL="285750" indent="-285750">
+              <a:buFontTx/>
+              <a:buChar char="-"/>
+            </a:pPr>
+            <a:r>
+              <a:rPr lang="en-US" altLang="ko-KR" dirty="0" smtClean="0"/>
+              <a:t>1</a:t>
+            </a:r>
+            <a:r>
+              <a:rPr lang="ko-KR" altLang="en-US" dirty="0" smtClean="0"/>
+              <a:t>차 문의 유형과 </a:t>
+            </a:r>
+            <a:r>
+              <a:rPr lang="en-US" altLang="ko-KR" dirty="0"/>
+              <a:t>2</a:t>
+            </a:r>
+            <a:r>
+              <a:rPr lang="ko-KR" altLang="en-US" dirty="0"/>
+              <a:t>차 </a:t>
+            </a:r>
+            <a:r>
+              <a:rPr lang="ko-KR" altLang="en-US" dirty="0" smtClean="0"/>
+              <a:t>문의 유형</a:t>
+            </a:r>
+            <a:r>
+              <a:rPr lang="en-US" altLang="ko-KR" dirty="0"/>
+              <a:t>(</a:t>
+            </a:r>
+            <a:r>
+              <a:rPr lang="ko-KR" altLang="en-US" dirty="0" smtClean="0"/>
+              <a:t>상세 유형</a:t>
+            </a:r>
+            <a:r>
+              <a:rPr lang="en-US" altLang="ko-KR" dirty="0"/>
+              <a:t>) </a:t>
+            </a:r>
+            <a:r>
+              <a:rPr lang="ko-KR" altLang="en-US" dirty="0" smtClean="0"/>
+              <a:t>선택</a:t>
+            </a:r>
+            <a:endParaRPr lang="en-US" altLang="ko-KR" dirty="0" smtClean="0"/>
+          </a:p>
+          <a:p>
+            <a:pPr marL="285750" indent="-285750">
+              <a:buFontTx/>
+              <a:buChar char="-"/>
+            </a:pPr>
+            <a:r>
+              <a:rPr lang="ko-KR" altLang="en-US" dirty="0" smtClean="0"/>
+              <a:t>제목</a:t>
+            </a:r>
+            <a:r>
+              <a:rPr lang="en-US" altLang="ko-KR" dirty="0"/>
+              <a:t>, </a:t>
+            </a:r>
+            <a:r>
+              <a:rPr lang="ko-KR" altLang="en-US" dirty="0"/>
+              <a:t>내용 입력 </a:t>
+            </a:r>
+            <a:endParaRPr lang="en-US" altLang="ko-KR" dirty="0" smtClean="0"/>
+          </a:p>
+          <a:p>
+            <a:endParaRPr lang="en-US" altLang="ko-KR" dirty="0" smtClean="0"/>
+          </a:p>
+          <a:p>
+            <a:r>
+              <a:rPr lang="en-US" altLang="ko-KR" dirty="0" smtClean="0"/>
+              <a:t>3.   </a:t>
+            </a:r>
+            <a:r>
+              <a:rPr lang="ko-KR" altLang="en-US" dirty="0" smtClean="0"/>
+              <a:t>취소하기 </a:t>
+            </a:r>
+            <a:endParaRPr lang="en-US" altLang="ko-KR" dirty="0" smtClean="0"/>
+          </a:p>
+          <a:p>
+            <a:pPr marL="285750" indent="-285750">
+              <a:buFontTx/>
+              <a:buChar char="-"/>
+            </a:pPr>
+            <a:r>
+              <a:rPr lang="ko-KR" altLang="en-US" dirty="0" smtClean="0"/>
+              <a:t>문의하기 </a:t>
+            </a:r>
+            <a:r>
+              <a:rPr lang="ko-KR" altLang="en-US" dirty="0"/>
+              <a:t>목록으로 이동 </a:t>
+            </a:r>
+            <a:endParaRPr lang="en-US" altLang="ko-KR" dirty="0" smtClean="0"/>
+          </a:p>
+          <a:p>
+            <a:pPr marL="285750" indent="-285750">
+              <a:buFontTx/>
+              <a:buChar char="-"/>
+            </a:pPr>
+            <a:r>
+              <a:rPr lang="ko-KR" altLang="en-US" dirty="0" smtClean="0"/>
+              <a:t>메뉴에 </a:t>
+            </a:r>
+            <a:r>
+              <a:rPr lang="ko-KR" altLang="en-US" dirty="0"/>
+              <a:t>맞는 </a:t>
+            </a:r>
+            <a:r>
+              <a:rPr lang="ko-KR" altLang="en-US" dirty="0" smtClean="0"/>
+              <a:t>글 목록 이동</a:t>
+            </a:r>
+            <a:endParaRPr lang="en-US" altLang="ko-KR" dirty="0" smtClean="0"/>
+          </a:p>
+          <a:p>
+            <a:endParaRPr lang="en-US" altLang="ko-KR" dirty="0" smtClean="0"/>
+          </a:p>
+          <a:p>
+            <a:r>
+              <a:rPr lang="en-US" altLang="ko-KR" dirty="0"/>
+              <a:t>4 </a:t>
+            </a:r>
+            <a:r>
+              <a:rPr lang="en-US" altLang="ko-KR" dirty="0" smtClean="0"/>
+              <a:t>. </a:t>
+            </a:r>
+            <a:r>
+              <a:rPr lang="ko-KR" altLang="en-US" dirty="0"/>
+              <a:t>등록하기 </a:t>
+            </a:r>
+            <a:endParaRPr lang="en-US" altLang="ko-KR" dirty="0" smtClean="0"/>
+          </a:p>
+          <a:p>
+            <a:pPr marL="285750" indent="-285750">
+              <a:buFontTx/>
+              <a:buChar char="-"/>
+            </a:pPr>
+            <a:r>
+              <a:rPr lang="ko-KR" altLang="en-US" dirty="0" smtClean="0"/>
+              <a:t>문의하기 </a:t>
+            </a:r>
+            <a:r>
+              <a:rPr lang="ko-KR" altLang="en-US" dirty="0"/>
+              <a:t>테이블 </a:t>
+            </a:r>
+            <a:r>
+              <a:rPr lang="en-US" altLang="ko-KR" dirty="0"/>
+              <a:t>INSERT </a:t>
+            </a:r>
+            <a:endParaRPr lang="en-US" altLang="ko-KR" dirty="0" smtClean="0"/>
+          </a:p>
+          <a:p>
+            <a:pPr marL="285750" indent="-285750">
+              <a:buFontTx/>
+              <a:buChar char="-"/>
+            </a:pPr>
+            <a:r>
+              <a:rPr lang="ko-KR" altLang="en-US" dirty="0" smtClean="0"/>
+              <a:t>등록 </a:t>
+            </a:r>
+            <a:r>
+              <a:rPr lang="ko-KR" altLang="en-US" dirty="0"/>
+              <a:t>후 목록 이동 </a:t>
+            </a:r>
+            <a:endParaRPr lang="en-US" altLang="ko-KR" dirty="0" smtClean="0"/>
+          </a:p>
+          <a:p>
+            <a:endParaRPr lang="en-US" altLang="ko-KR" dirty="0" smtClean="0"/>
+          </a:p>
+          <a:p>
+            <a:pPr marL="342900" indent="-342900">
+              <a:buFont typeface="+mj-lt"/>
+              <a:buAutoNum type="arabicPeriod"/>
+            </a:pPr>
+            <a:endParaRPr lang="en-US" altLang="ko-KR" dirty="0" smtClean="0"/>
+          </a:p>
+          <a:p>
+            <a:pPr marL="342900" indent="-342900">
+              <a:buFont typeface="+mj-lt"/>
+              <a:buAutoNum type="arabicPeriod"/>
+            </a:pPr>
+            <a:endParaRPr lang="en-US" altLang="ko-KR" dirty="0" smtClean="0"/>
+          </a:p>
+        </p:txBody>
+      </p:sp>
+      <p:pic>
+        <p:nvPicPr>
+          <p:cNvPr id="4" name="그림 3"/>
+          <p:cNvPicPr>
+            <a:picLocks noChangeAspect="1"/>
+          </p:cNvPicPr>
+          <p:nvPr/>
+        </p:nvPicPr>
+        <p:blipFill>
+          <a:blip r:embed="rId2">
+            <a:extLst>
+              <a:ext uri="{28A0092B-C50C-407E-A947-70E740481C1C}">
+                <a14:useLocalDpi xmlns:a14="http://schemas.microsoft.com/office/drawing/2010/main" val="0"/>
+              </a:ext>
+            </a:extLst>
+          </a:blip>
+          <a:stretch>
+            <a:fillRect/>
+          </a:stretch>
+        </p:blipFill>
+        <p:spPr>
+          <a:xfrm>
+            <a:off x="884031" y="861237"/>
+            <a:ext cx="7460603" cy="4946767"/>
+          </a:xfrm>
+          <a:prstGeom prst="rect">
+            <a:avLst/>
+          </a:prstGeom>
+        </p:spPr>
+      </p:pic>
+    </p:spTree>
+    <p:extLst>
+      <p:ext uri="{BB962C8B-B14F-4D97-AF65-F5344CB8AC3E}">
+        <p14:creationId xmlns:p14="http://schemas.microsoft.com/office/powerpoint/2010/main" val="1264442755"/>
       </p:ext>
     </p:extLst>
   </p:cSld>

</xml_diff>

<commit_message>
2022/12/28 ppt view, class 수정
</commit_message>
<xml_diff>
--- a/보고서/발표보고서 홍민준.pptx
+++ b/보고서/발표보고서 홍민준.pptx
@@ -5988,8 +5988,16 @@
               <a:t>Qna</a:t>
             </a:r>
             <a:r>
-              <a:rPr lang="en-US" altLang="ko-KR" dirty="0" smtClean="0"/>
-              <a:t> View </a:t>
+              <a:rPr lang="en-US" altLang="ko-KR" smtClean="0"/>
+              <a:t> </a:t>
+            </a:r>
+            <a:r>
+              <a:rPr lang="en-US" altLang="ko-KR" dirty="0"/>
+              <a:t>W</a:t>
+            </a:r>
+            <a:r>
+              <a:rPr lang="en-US" altLang="ko-KR" smtClean="0"/>
+              <a:t>rite </a:t>
             </a:r>
             <a:r>
               <a:rPr lang="ko-KR" altLang="en-US" dirty="0" smtClean="0"/>

</xml_diff>

<commit_message>
2022/12/28 ppt admin cs 쪽 추가
</commit_message>
<xml_diff>
--- a/보고서/발표보고서 홍민준.pptx
+++ b/보고서/발표보고서 홍민준.pptx
@@ -15,6 +15,15 @@
     <p:sldId id="263" r:id="rId9"/>
     <p:sldId id="264" r:id="rId10"/>
     <p:sldId id="265" r:id="rId11"/>
+    <p:sldId id="270" r:id="rId12"/>
+    <p:sldId id="271" r:id="rId13"/>
+    <p:sldId id="272" r:id="rId14"/>
+    <p:sldId id="273" r:id="rId15"/>
+    <p:sldId id="274" r:id="rId16"/>
+    <p:sldId id="275" r:id="rId17"/>
+    <p:sldId id="276" r:id="rId18"/>
+    <p:sldId id="277" r:id="rId19"/>
+    <p:sldId id="278" r:id="rId20"/>
   </p:sldIdLst>
   <p:sldSz cx="12192000" cy="6858000"/>
   <p:notesSz cx="6858000" cy="9144000"/>
@@ -4266,6 +4275,2974 @@
 </p:sld>
 </file>
 
+<file path=ppt/slides/slide11.xml><?xml version="1.0" encoding="utf-8"?>
+<p:sld xmlns:a="http://schemas.openxmlformats.org/drawingml/2006/main" xmlns:r="http://schemas.openxmlformats.org/officeDocument/2006/relationships" xmlns:p="http://schemas.openxmlformats.org/presentationml/2006/main">
+  <p:cSld>
+    <p:spTree>
+      <p:nvGrpSpPr>
+        <p:cNvPr id="1" name=""/>
+        <p:cNvGrpSpPr/>
+        <p:nvPr/>
+      </p:nvGrpSpPr>
+      <p:grpSpPr>
+        <a:xfrm>
+          <a:off x="0" y="0"/>
+          <a:ext cx="0" cy="0"/>
+          <a:chOff x="0" y="0"/>
+          <a:chExt cx="0" cy="0"/>
+        </a:xfrm>
+      </p:grpSpPr>
+      <p:sp>
+        <p:nvSpPr>
+          <p:cNvPr id="2" name="제목 1"/>
+          <p:cNvSpPr>
+            <a:spLocks noGrp="1"/>
+          </p:cNvSpPr>
+          <p:nvPr>
+            <p:ph type="title"/>
+          </p:nvPr>
+        </p:nvSpPr>
+        <p:spPr>
+          <a:xfrm>
+            <a:off x="730666" y="0"/>
+            <a:ext cx="9601200" cy="1485900"/>
+          </a:xfrm>
+        </p:spPr>
+        <p:txBody>
+          <a:bodyPr/>
+          <a:lstStyle/>
+          <a:p>
+            <a:r>
+              <a:rPr lang="en-US" altLang="ko-KR" dirty="0" smtClean="0"/>
+              <a:t>Admin Notice </a:t>
+            </a:r>
+            <a:r>
+              <a:rPr lang="en-US" altLang="ko-KR" dirty="0" smtClean="0"/>
+              <a:t>View </a:t>
+            </a:r>
+            <a:r>
+              <a:rPr lang="ko-KR" altLang="en-US" dirty="0" smtClean="0"/>
+              <a:t>기능</a:t>
+            </a:r>
+            <a:endParaRPr lang="ko-KR" altLang="en-US" dirty="0"/>
+          </a:p>
+        </p:txBody>
+      </p:sp>
+      <p:sp>
+        <p:nvSpPr>
+          <p:cNvPr id="6" name="TextBox 5"/>
+          <p:cNvSpPr txBox="1"/>
+          <p:nvPr/>
+        </p:nvSpPr>
+        <p:spPr>
+          <a:xfrm>
+            <a:off x="8302123" y="889462"/>
+            <a:ext cx="3153398" cy="3539430"/>
+          </a:xfrm>
+          <a:prstGeom prst="rect">
+            <a:avLst/>
+          </a:prstGeom>
+          <a:noFill/>
+        </p:spPr>
+        <p:txBody>
+          <a:bodyPr wrap="square" rtlCol="0">
+            <a:spAutoFit/>
+          </a:bodyPr>
+          <a:lstStyle/>
+          <a:p>
+            <a:r>
+              <a:rPr lang="ko-KR" altLang="en-US" sz="1600" dirty="0" smtClean="0"/>
+              <a:t>기능 </a:t>
+            </a:r>
+            <a:r>
+              <a:rPr lang="ko-KR" altLang="en-US" sz="1600" dirty="0" smtClean="0"/>
+              <a:t>설명</a:t>
+            </a:r>
+            <a:endParaRPr lang="en-US" altLang="ko-KR" sz="1600" dirty="0" smtClean="0"/>
+          </a:p>
+          <a:p>
+            <a:r>
+              <a:rPr lang="en-US" altLang="ko-KR" sz="1600" dirty="0" smtClean="0"/>
+              <a:t>1.   </a:t>
+            </a:r>
+            <a:r>
+              <a:rPr lang="ko-KR" altLang="en-US" sz="1600" dirty="0" smtClean="0"/>
+              <a:t>공지사항 </a:t>
+            </a:r>
+            <a:r>
+              <a:rPr lang="ko-KR" altLang="en-US" sz="1600" dirty="0"/>
+              <a:t>보기 </a:t>
+            </a:r>
+            <a:endParaRPr lang="en-US" altLang="ko-KR" sz="1600" dirty="0" smtClean="0"/>
+          </a:p>
+          <a:p>
+            <a:pPr marL="285750" indent="-285750">
+              <a:buFontTx/>
+              <a:buChar char="-"/>
+            </a:pPr>
+            <a:r>
+              <a:rPr lang="ko-KR" altLang="en-US" sz="1600" dirty="0" smtClean="0"/>
+              <a:t>목록에서 </a:t>
+            </a:r>
+            <a:r>
+              <a:rPr lang="ko-KR" altLang="en-US" sz="1600" dirty="0"/>
+              <a:t>선택한 공지사항 내용 출력 </a:t>
+            </a:r>
+            <a:endParaRPr lang="en-US" altLang="ko-KR" sz="1600" dirty="0" smtClean="0"/>
+          </a:p>
+          <a:p>
+            <a:endParaRPr lang="en-US" altLang="ko-KR" sz="1600" dirty="0" smtClean="0"/>
+          </a:p>
+          <a:p>
+            <a:r>
+              <a:rPr lang="en-US" altLang="ko-KR" sz="1600" dirty="0" smtClean="0"/>
+              <a:t>2.  </a:t>
+            </a:r>
+            <a:r>
+              <a:rPr lang="en-US" altLang="ko-KR" sz="1600" dirty="0" smtClean="0"/>
+              <a:t> </a:t>
+            </a:r>
+            <a:r>
+              <a:rPr lang="ko-KR" altLang="en-US" sz="1600" dirty="0" smtClean="0"/>
+              <a:t>삭제</a:t>
+            </a:r>
+            <a:endParaRPr lang="en-US" altLang="ko-KR" sz="1600" dirty="0" smtClean="0"/>
+          </a:p>
+          <a:p>
+            <a:pPr marL="285750" indent="-285750">
+              <a:buFontTx/>
+              <a:buChar char="-"/>
+            </a:pPr>
+            <a:r>
+              <a:rPr lang="ko-KR" altLang="en-US" sz="1600" dirty="0" smtClean="0"/>
+              <a:t>해당 </a:t>
+            </a:r>
+            <a:r>
+              <a:rPr lang="ko-KR" altLang="en-US" sz="1600" dirty="0"/>
+              <a:t>공지사항 삭제 </a:t>
+            </a:r>
+            <a:endParaRPr lang="en-US" altLang="ko-KR" sz="1600" dirty="0" smtClean="0"/>
+          </a:p>
+          <a:p>
+            <a:pPr marL="285750" indent="-285750">
+              <a:buFontTx/>
+              <a:buChar char="-"/>
+            </a:pPr>
+            <a:r>
+              <a:rPr lang="ko-KR" altLang="en-US" sz="1600" dirty="0" smtClean="0"/>
+              <a:t>사용자 </a:t>
+            </a:r>
+            <a:r>
+              <a:rPr lang="ko-KR" altLang="en-US" sz="1600" dirty="0"/>
+              <a:t>확인 대화상자 </a:t>
+            </a:r>
+            <a:r>
+              <a:rPr lang="ko-KR" altLang="en-US" sz="1600" dirty="0" smtClean="0"/>
+              <a:t>출력</a:t>
+            </a:r>
+            <a:endParaRPr lang="en-US" altLang="ko-KR" sz="1600" dirty="0" smtClean="0"/>
+          </a:p>
+          <a:p>
+            <a:endParaRPr lang="en-US" altLang="ko-KR" sz="1600" dirty="0" smtClean="0"/>
+          </a:p>
+          <a:p>
+            <a:r>
+              <a:rPr lang="en-US" altLang="ko-KR" sz="1600" dirty="0"/>
+              <a:t>3</a:t>
+            </a:r>
+            <a:r>
+              <a:rPr lang="en-US" altLang="ko-KR" sz="1600" dirty="0" smtClean="0"/>
+              <a:t>. </a:t>
+            </a:r>
+            <a:r>
+              <a:rPr lang="ko-KR" altLang="en-US" sz="1600" dirty="0" smtClean="0"/>
+              <a:t>수정 </a:t>
+            </a:r>
+            <a:endParaRPr lang="en-US" altLang="ko-KR" sz="1600" dirty="0" smtClean="0"/>
+          </a:p>
+          <a:p>
+            <a:pPr marL="285750" indent="-285750">
+              <a:buFontTx/>
+              <a:buChar char="-"/>
+            </a:pPr>
+            <a:r>
+              <a:rPr lang="ko-KR" altLang="en-US" sz="1600" dirty="0" smtClean="0"/>
+              <a:t>공지사항 수정 화면 </a:t>
+            </a:r>
+            <a:r>
+              <a:rPr lang="ko-KR" altLang="en-US" sz="1600" dirty="0"/>
+              <a:t>이동 </a:t>
+            </a:r>
+            <a:endParaRPr lang="en-US" altLang="ko-KR" sz="1600" dirty="0" smtClean="0"/>
+          </a:p>
+          <a:p>
+            <a:pPr marL="285750" indent="-285750">
+              <a:buFontTx/>
+              <a:buChar char="-"/>
+            </a:pPr>
+            <a:endParaRPr lang="en-US" altLang="ko-KR" sz="1600" dirty="0"/>
+          </a:p>
+          <a:p>
+            <a:r>
+              <a:rPr lang="en-US" altLang="ko-KR" sz="1600" dirty="0"/>
+              <a:t>4</a:t>
+            </a:r>
+            <a:r>
+              <a:rPr lang="en-US" altLang="ko-KR" sz="1600" dirty="0" smtClean="0"/>
+              <a:t> </a:t>
+            </a:r>
+            <a:r>
+              <a:rPr lang="en-US" altLang="ko-KR" sz="1600" dirty="0" smtClean="0"/>
+              <a:t>. </a:t>
+            </a:r>
+            <a:r>
+              <a:rPr lang="ko-KR" altLang="en-US" sz="1600" dirty="0" smtClean="0"/>
+              <a:t>목록</a:t>
+            </a:r>
+            <a:endParaRPr lang="en-US" altLang="ko-KR" sz="1600" dirty="0" smtClean="0"/>
+          </a:p>
+          <a:p>
+            <a:r>
+              <a:rPr lang="en-US" altLang="ko-KR" sz="1600" dirty="0" smtClean="0"/>
+              <a:t>-     </a:t>
+            </a:r>
+            <a:r>
+              <a:rPr lang="ko-KR" altLang="en-US" sz="1600" dirty="0" smtClean="0"/>
+              <a:t>공지사항 </a:t>
+            </a:r>
+            <a:r>
+              <a:rPr lang="ko-KR" altLang="en-US" sz="1600" dirty="0"/>
+              <a:t>목록 </a:t>
+            </a:r>
+            <a:r>
+              <a:rPr lang="ko-KR" altLang="en-US" sz="1600" dirty="0" smtClean="0"/>
+              <a:t>이동</a:t>
+            </a:r>
+            <a:endParaRPr lang="en-US" altLang="ko-KR" sz="1600" dirty="0" smtClean="0"/>
+          </a:p>
+        </p:txBody>
+      </p:sp>
+      <p:pic>
+        <p:nvPicPr>
+          <p:cNvPr id="4" name="그림 3"/>
+          <p:cNvPicPr>
+            <a:picLocks noChangeAspect="1"/>
+          </p:cNvPicPr>
+          <p:nvPr/>
+        </p:nvPicPr>
+        <p:blipFill>
+          <a:blip r:embed="rId2">
+            <a:extLst>
+              <a:ext uri="{28A0092B-C50C-407E-A947-70E740481C1C}">
+                <a14:useLocalDpi xmlns:a14="http://schemas.microsoft.com/office/drawing/2010/main" val="0"/>
+              </a:ext>
+            </a:extLst>
+          </a:blip>
+          <a:stretch>
+            <a:fillRect/>
+          </a:stretch>
+        </p:blipFill>
+        <p:spPr>
+          <a:xfrm>
+            <a:off x="662151" y="889462"/>
+            <a:ext cx="6873676" cy="4252155"/>
+          </a:xfrm>
+          <a:prstGeom prst="rect">
+            <a:avLst/>
+          </a:prstGeom>
+        </p:spPr>
+      </p:pic>
+    </p:spTree>
+    <p:extLst>
+      <p:ext uri="{BB962C8B-B14F-4D97-AF65-F5344CB8AC3E}">
+        <p14:creationId xmlns:p14="http://schemas.microsoft.com/office/powerpoint/2010/main" val="4161492605"/>
+      </p:ext>
+    </p:extLst>
+  </p:cSld>
+  <p:clrMapOvr>
+    <a:masterClrMapping/>
+  </p:clrMapOvr>
+</p:sld>
+</file>
+
+<file path=ppt/slides/slide12.xml><?xml version="1.0" encoding="utf-8"?>
+<p:sld xmlns:a="http://schemas.openxmlformats.org/drawingml/2006/main" xmlns:r="http://schemas.openxmlformats.org/officeDocument/2006/relationships" xmlns:p="http://schemas.openxmlformats.org/presentationml/2006/main">
+  <p:cSld>
+    <p:spTree>
+      <p:nvGrpSpPr>
+        <p:cNvPr id="1" name=""/>
+        <p:cNvGrpSpPr/>
+        <p:nvPr/>
+      </p:nvGrpSpPr>
+      <p:grpSpPr>
+        <a:xfrm>
+          <a:off x="0" y="0"/>
+          <a:ext cx="0" cy="0"/>
+          <a:chOff x="0" y="0"/>
+          <a:chExt cx="0" cy="0"/>
+        </a:xfrm>
+      </p:grpSpPr>
+      <p:sp>
+        <p:nvSpPr>
+          <p:cNvPr id="2" name="제목 1"/>
+          <p:cNvSpPr>
+            <a:spLocks noGrp="1"/>
+          </p:cNvSpPr>
+          <p:nvPr>
+            <p:ph type="title"/>
+          </p:nvPr>
+        </p:nvSpPr>
+        <p:spPr>
+          <a:xfrm>
+            <a:off x="730666" y="0"/>
+            <a:ext cx="9601200" cy="1485900"/>
+          </a:xfrm>
+        </p:spPr>
+        <p:txBody>
+          <a:bodyPr/>
+          <a:lstStyle/>
+          <a:p>
+            <a:r>
+              <a:rPr lang="en-US" altLang="ko-KR" dirty="0" smtClean="0"/>
+              <a:t>Admin Notice </a:t>
+            </a:r>
+            <a:r>
+              <a:rPr lang="en-US" altLang="ko-KR" dirty="0" smtClean="0"/>
+              <a:t>Write</a:t>
+            </a:r>
+            <a:r>
+              <a:rPr lang="ko-KR" altLang="en-US" dirty="0" smtClean="0"/>
+              <a:t>기능</a:t>
+            </a:r>
+            <a:endParaRPr lang="ko-KR" altLang="en-US" dirty="0"/>
+          </a:p>
+        </p:txBody>
+      </p:sp>
+      <p:sp>
+        <p:nvSpPr>
+          <p:cNvPr id="6" name="TextBox 5"/>
+          <p:cNvSpPr txBox="1"/>
+          <p:nvPr/>
+        </p:nvSpPr>
+        <p:spPr>
+          <a:xfrm>
+            <a:off x="8320509" y="822960"/>
+            <a:ext cx="3153398" cy="3046988"/>
+          </a:xfrm>
+          <a:prstGeom prst="rect">
+            <a:avLst/>
+          </a:prstGeom>
+          <a:noFill/>
+        </p:spPr>
+        <p:txBody>
+          <a:bodyPr wrap="square" rtlCol="0">
+            <a:spAutoFit/>
+          </a:bodyPr>
+          <a:lstStyle/>
+          <a:p>
+            <a:r>
+              <a:rPr lang="ko-KR" altLang="en-US" sz="1600" dirty="0" smtClean="0"/>
+              <a:t>기능 </a:t>
+            </a:r>
+            <a:r>
+              <a:rPr lang="ko-KR" altLang="en-US" sz="1600" dirty="0" smtClean="0"/>
+              <a:t>설명</a:t>
+            </a:r>
+            <a:endParaRPr lang="en-US" altLang="ko-KR" sz="1600" dirty="0" smtClean="0"/>
+          </a:p>
+          <a:p>
+            <a:r>
+              <a:rPr lang="en-US" altLang="ko-KR" sz="1600" dirty="0" smtClean="0"/>
+              <a:t>1.  </a:t>
+            </a:r>
+            <a:r>
+              <a:rPr lang="ko-KR" altLang="en-US" sz="1600" dirty="0" smtClean="0"/>
+              <a:t>공지사항 </a:t>
+            </a:r>
+            <a:r>
+              <a:rPr lang="ko-KR" altLang="en-US" sz="1600" dirty="0"/>
+              <a:t>작성  </a:t>
+            </a:r>
+            <a:endParaRPr lang="en-US" altLang="ko-KR" sz="1600" dirty="0" smtClean="0"/>
+          </a:p>
+          <a:p>
+            <a:pPr marL="285750" indent="-285750">
+              <a:buFontTx/>
+              <a:buChar char="-"/>
+            </a:pPr>
+            <a:r>
+              <a:rPr lang="ko-KR" altLang="en-US" sz="1600" dirty="0" smtClean="0"/>
+              <a:t>공지사항 </a:t>
+            </a:r>
+            <a:r>
+              <a:rPr lang="ko-KR" altLang="en-US" sz="1600" dirty="0"/>
+              <a:t>유형 선택 </a:t>
+            </a:r>
+            <a:endParaRPr lang="en-US" altLang="ko-KR" sz="1600" dirty="0" smtClean="0"/>
+          </a:p>
+          <a:p>
+            <a:pPr marL="285750" indent="-285750">
+              <a:buFontTx/>
+              <a:buChar char="-"/>
+            </a:pPr>
+            <a:r>
+              <a:rPr lang="ko-KR" altLang="en-US" sz="1600" dirty="0" smtClean="0"/>
+              <a:t>공지사항 </a:t>
+            </a:r>
+            <a:r>
+              <a:rPr lang="ko-KR" altLang="en-US" sz="1600" dirty="0"/>
+              <a:t>제목 작성 </a:t>
+            </a:r>
+            <a:endParaRPr lang="en-US" altLang="ko-KR" sz="1600" dirty="0" smtClean="0"/>
+          </a:p>
+          <a:p>
+            <a:pPr marL="285750" indent="-285750">
+              <a:buFontTx/>
+              <a:buChar char="-"/>
+            </a:pPr>
+            <a:r>
+              <a:rPr lang="ko-KR" altLang="en-US" sz="1600" dirty="0" smtClean="0"/>
+              <a:t>공지사항 </a:t>
+            </a:r>
+            <a:r>
+              <a:rPr lang="ko-KR" altLang="en-US" sz="1600" dirty="0"/>
+              <a:t>내용 작성 </a:t>
+            </a:r>
+            <a:endParaRPr lang="en-US" altLang="ko-KR" sz="1600" dirty="0" smtClean="0"/>
+          </a:p>
+          <a:p>
+            <a:pPr marL="285750" indent="-285750">
+              <a:buFontTx/>
+              <a:buChar char="-"/>
+            </a:pPr>
+            <a:endParaRPr lang="en-US" altLang="ko-KR" sz="1600" dirty="0" smtClean="0"/>
+          </a:p>
+          <a:p>
+            <a:r>
+              <a:rPr lang="en-US" altLang="ko-KR" sz="1600" dirty="0" smtClean="0"/>
+              <a:t>2.   </a:t>
+            </a:r>
+            <a:r>
+              <a:rPr lang="ko-KR" altLang="en-US" sz="1600" dirty="0" smtClean="0"/>
+              <a:t>취소하기</a:t>
+            </a:r>
+            <a:endParaRPr lang="en-US" altLang="ko-KR" sz="1600" dirty="0" smtClean="0"/>
+          </a:p>
+          <a:p>
+            <a:pPr marL="285750" indent="-285750">
+              <a:buFontTx/>
+              <a:buChar char="-"/>
+            </a:pPr>
+            <a:r>
+              <a:rPr lang="ko-KR" altLang="en-US" sz="1600" dirty="0" smtClean="0"/>
+              <a:t>공지사항 </a:t>
+            </a:r>
+            <a:r>
+              <a:rPr lang="ko-KR" altLang="en-US" sz="1600" dirty="0"/>
+              <a:t>목록 이동 </a:t>
+            </a:r>
+            <a:endParaRPr lang="en-US" altLang="ko-KR" sz="1600" dirty="0" smtClean="0"/>
+          </a:p>
+          <a:p>
+            <a:endParaRPr lang="en-US" altLang="ko-KR" sz="1600" dirty="0" smtClean="0"/>
+          </a:p>
+          <a:p>
+            <a:r>
+              <a:rPr lang="en-US" altLang="ko-KR" sz="1600" dirty="0"/>
+              <a:t>3</a:t>
+            </a:r>
+            <a:r>
+              <a:rPr lang="en-US" altLang="ko-KR" sz="1600" dirty="0" smtClean="0"/>
+              <a:t>.   </a:t>
+            </a:r>
+            <a:r>
+              <a:rPr lang="ko-KR" altLang="en-US" sz="1600" dirty="0" smtClean="0"/>
+              <a:t>등록하기</a:t>
+            </a:r>
+            <a:r>
+              <a:rPr lang="ko-KR" altLang="en-US" sz="1600" dirty="0" smtClean="0"/>
+              <a:t> </a:t>
+            </a:r>
+            <a:endParaRPr lang="en-US" altLang="ko-KR" sz="1600" dirty="0" smtClean="0"/>
+          </a:p>
+          <a:p>
+            <a:pPr marL="285750" indent="-285750">
+              <a:buFontTx/>
+              <a:buChar char="-"/>
+            </a:pPr>
+            <a:r>
+              <a:rPr lang="ko-KR" altLang="en-US" sz="1600" dirty="0" smtClean="0"/>
+              <a:t>공지사항 </a:t>
+            </a:r>
+            <a:r>
+              <a:rPr lang="ko-KR" altLang="en-US" sz="1600" dirty="0"/>
+              <a:t>테이블 </a:t>
+            </a:r>
+            <a:r>
+              <a:rPr lang="en-US" altLang="ko-KR" sz="1600" dirty="0"/>
+              <a:t>INSERT</a:t>
+            </a:r>
+            <a:endParaRPr lang="en-US" altLang="ko-KR" sz="1600" dirty="0"/>
+          </a:p>
+          <a:p>
+            <a:endParaRPr lang="en-US" altLang="ko-KR" sz="1600" dirty="0" smtClean="0"/>
+          </a:p>
+        </p:txBody>
+      </p:sp>
+      <p:pic>
+        <p:nvPicPr>
+          <p:cNvPr id="3" name="그림 2"/>
+          <p:cNvPicPr>
+            <a:picLocks noChangeAspect="1"/>
+          </p:cNvPicPr>
+          <p:nvPr/>
+        </p:nvPicPr>
+        <p:blipFill>
+          <a:blip r:embed="rId2">
+            <a:extLst>
+              <a:ext uri="{28A0092B-C50C-407E-A947-70E740481C1C}">
+                <a14:useLocalDpi xmlns:a14="http://schemas.microsoft.com/office/drawing/2010/main" val="0"/>
+              </a:ext>
+            </a:extLst>
+          </a:blip>
+          <a:stretch>
+            <a:fillRect/>
+          </a:stretch>
+        </p:blipFill>
+        <p:spPr>
+          <a:xfrm>
+            <a:off x="730666" y="822960"/>
+            <a:ext cx="7317119" cy="4526475"/>
+          </a:xfrm>
+          <a:prstGeom prst="rect">
+            <a:avLst/>
+          </a:prstGeom>
+        </p:spPr>
+      </p:pic>
+    </p:spTree>
+    <p:extLst>
+      <p:ext uri="{BB962C8B-B14F-4D97-AF65-F5344CB8AC3E}">
+        <p14:creationId xmlns:p14="http://schemas.microsoft.com/office/powerpoint/2010/main" val="766916985"/>
+      </p:ext>
+    </p:extLst>
+  </p:cSld>
+  <p:clrMapOvr>
+    <a:masterClrMapping/>
+  </p:clrMapOvr>
+</p:sld>
+</file>
+
+<file path=ppt/slides/slide13.xml><?xml version="1.0" encoding="utf-8"?>
+<p:sld xmlns:a="http://schemas.openxmlformats.org/drawingml/2006/main" xmlns:r="http://schemas.openxmlformats.org/officeDocument/2006/relationships" xmlns:p="http://schemas.openxmlformats.org/presentationml/2006/main">
+  <p:cSld>
+    <p:spTree>
+      <p:nvGrpSpPr>
+        <p:cNvPr id="1" name=""/>
+        <p:cNvGrpSpPr/>
+        <p:nvPr/>
+      </p:nvGrpSpPr>
+      <p:grpSpPr>
+        <a:xfrm>
+          <a:off x="0" y="0"/>
+          <a:ext cx="0" cy="0"/>
+          <a:chOff x="0" y="0"/>
+          <a:chExt cx="0" cy="0"/>
+        </a:xfrm>
+      </p:grpSpPr>
+      <p:sp>
+        <p:nvSpPr>
+          <p:cNvPr id="2" name="제목 1"/>
+          <p:cNvSpPr>
+            <a:spLocks noGrp="1"/>
+          </p:cNvSpPr>
+          <p:nvPr>
+            <p:ph type="title"/>
+          </p:nvPr>
+        </p:nvSpPr>
+        <p:spPr>
+          <a:xfrm>
+            <a:off x="730666" y="0"/>
+            <a:ext cx="9601200" cy="1485900"/>
+          </a:xfrm>
+        </p:spPr>
+        <p:txBody>
+          <a:bodyPr/>
+          <a:lstStyle/>
+          <a:p>
+            <a:r>
+              <a:rPr lang="en-US" altLang="ko-KR" dirty="0" smtClean="0"/>
+              <a:t>Admin Notice </a:t>
+            </a:r>
+            <a:r>
+              <a:rPr lang="en-US" altLang="ko-KR" dirty="0" smtClean="0"/>
+              <a:t>Modify</a:t>
+            </a:r>
+            <a:r>
+              <a:rPr lang="ko-KR" altLang="en-US" dirty="0" smtClean="0"/>
+              <a:t>기능</a:t>
+            </a:r>
+            <a:endParaRPr lang="ko-KR" altLang="en-US" dirty="0"/>
+          </a:p>
+        </p:txBody>
+      </p:sp>
+      <p:sp>
+        <p:nvSpPr>
+          <p:cNvPr id="6" name="TextBox 5"/>
+          <p:cNvSpPr txBox="1"/>
+          <p:nvPr/>
+        </p:nvSpPr>
+        <p:spPr>
+          <a:xfrm>
+            <a:off x="8302123" y="889462"/>
+            <a:ext cx="3153398" cy="3293209"/>
+          </a:xfrm>
+          <a:prstGeom prst="rect">
+            <a:avLst/>
+          </a:prstGeom>
+          <a:noFill/>
+        </p:spPr>
+        <p:txBody>
+          <a:bodyPr wrap="square" rtlCol="0">
+            <a:spAutoFit/>
+          </a:bodyPr>
+          <a:lstStyle/>
+          <a:p>
+            <a:r>
+              <a:rPr lang="ko-KR" altLang="en-US" sz="1600" dirty="0" smtClean="0"/>
+              <a:t>기능 </a:t>
+            </a:r>
+            <a:r>
+              <a:rPr lang="ko-KR" altLang="en-US" sz="1600" dirty="0" smtClean="0"/>
+              <a:t>설명</a:t>
+            </a:r>
+            <a:endParaRPr lang="en-US" altLang="ko-KR" sz="1600" dirty="0" smtClean="0"/>
+          </a:p>
+          <a:p>
+            <a:endParaRPr lang="en-US" altLang="ko-KR" sz="1600" dirty="0" smtClean="0"/>
+          </a:p>
+          <a:p>
+            <a:r>
+              <a:rPr lang="en-US" altLang="ko-KR" sz="1600" dirty="0" smtClean="0"/>
+              <a:t>1.  </a:t>
+            </a:r>
+            <a:r>
+              <a:rPr lang="en-US" altLang="ko-KR" sz="1600" dirty="0"/>
+              <a:t> </a:t>
+            </a:r>
+            <a:r>
+              <a:rPr lang="ko-KR" altLang="en-US" sz="1600" dirty="0" smtClean="0"/>
+              <a:t>글 수정</a:t>
+            </a:r>
+            <a:endParaRPr lang="en-US" altLang="ko-KR" sz="1600" dirty="0" smtClean="0"/>
+          </a:p>
+          <a:p>
+            <a:pPr marL="285750" indent="-285750">
+              <a:buFontTx/>
+              <a:buChar char="-"/>
+            </a:pPr>
+            <a:r>
+              <a:rPr lang="ko-KR" altLang="en-US" sz="1600" dirty="0" smtClean="0"/>
+              <a:t>유형 </a:t>
+            </a:r>
+            <a:r>
+              <a:rPr lang="ko-KR" altLang="en-US" sz="1600" dirty="0"/>
+              <a:t>기본 선택 </a:t>
+            </a:r>
+            <a:endParaRPr lang="en-US" altLang="ko-KR" sz="1600" dirty="0" smtClean="0"/>
+          </a:p>
+          <a:p>
+            <a:pPr marL="285750" indent="-285750">
+              <a:buFontTx/>
+              <a:buChar char="-"/>
+            </a:pPr>
+            <a:r>
+              <a:rPr lang="ko-KR" altLang="en-US" sz="1600" dirty="0" smtClean="0"/>
+              <a:t>제목 </a:t>
+            </a:r>
+            <a:r>
+              <a:rPr lang="ko-KR" altLang="en-US" sz="1600" dirty="0"/>
+              <a:t>기본 입력 </a:t>
+            </a:r>
+            <a:endParaRPr lang="en-US" altLang="ko-KR" sz="1600" dirty="0" smtClean="0"/>
+          </a:p>
+          <a:p>
+            <a:pPr marL="285750" indent="-285750">
+              <a:buFontTx/>
+              <a:buChar char="-"/>
+            </a:pPr>
+            <a:r>
+              <a:rPr lang="ko-KR" altLang="en-US" sz="1600" dirty="0" smtClean="0"/>
+              <a:t>내용 </a:t>
+            </a:r>
+            <a:r>
+              <a:rPr lang="ko-KR" altLang="en-US" sz="1600" dirty="0"/>
+              <a:t>기본 입력</a:t>
+            </a:r>
+            <a:r>
+              <a:rPr lang="en-US" altLang="ko-KR" sz="1600" dirty="0" smtClean="0"/>
+              <a:t/>
+            </a:r>
+            <a:br>
+              <a:rPr lang="en-US" altLang="ko-KR" sz="1600" dirty="0" smtClean="0"/>
+            </a:br>
+            <a:endParaRPr lang="en-US" altLang="ko-KR" sz="1600" dirty="0" smtClean="0"/>
+          </a:p>
+          <a:p>
+            <a:r>
+              <a:rPr lang="en-US" altLang="ko-KR" sz="1600" dirty="0" smtClean="0"/>
+              <a:t>2.   </a:t>
+            </a:r>
+            <a:r>
+              <a:rPr lang="ko-KR" altLang="en-US" sz="1600" dirty="0" smtClean="0"/>
+              <a:t>취소하기</a:t>
+            </a:r>
+            <a:endParaRPr lang="en-US" altLang="ko-KR" sz="1600" dirty="0" smtClean="0"/>
+          </a:p>
+          <a:p>
+            <a:pPr marL="285750" indent="-285750">
+              <a:buFontTx/>
+              <a:buChar char="-"/>
+            </a:pPr>
+            <a:r>
+              <a:rPr lang="ko-KR" altLang="en-US" sz="1600" dirty="0" smtClean="0"/>
+              <a:t>공지사항 보기 </a:t>
+            </a:r>
+            <a:r>
+              <a:rPr lang="ko-KR" altLang="en-US" sz="1600" dirty="0"/>
+              <a:t>이동 </a:t>
+            </a:r>
+            <a:endParaRPr lang="en-US" altLang="ko-KR" sz="1600" dirty="0" smtClean="0"/>
+          </a:p>
+          <a:p>
+            <a:endParaRPr lang="en-US" altLang="ko-KR" sz="1600" dirty="0" smtClean="0"/>
+          </a:p>
+          <a:p>
+            <a:r>
+              <a:rPr lang="en-US" altLang="ko-KR" sz="1600" dirty="0"/>
+              <a:t>3</a:t>
+            </a:r>
+            <a:r>
+              <a:rPr lang="en-US" altLang="ko-KR" sz="1600" dirty="0" smtClean="0"/>
+              <a:t>.   </a:t>
+            </a:r>
+            <a:r>
+              <a:rPr lang="ko-KR" altLang="en-US" sz="1600" dirty="0" smtClean="0"/>
+              <a:t>수정하기</a:t>
+            </a:r>
+            <a:r>
+              <a:rPr lang="ko-KR" altLang="en-US" sz="1600" dirty="0" smtClean="0"/>
+              <a:t> </a:t>
+            </a:r>
+            <a:endParaRPr lang="en-US" altLang="ko-KR" sz="1600" dirty="0" smtClean="0"/>
+          </a:p>
+          <a:p>
+            <a:pPr marL="285750" indent="-285750">
+              <a:buFontTx/>
+              <a:buChar char="-"/>
+            </a:pPr>
+            <a:r>
+              <a:rPr lang="ko-KR" altLang="en-US" sz="1600" dirty="0" smtClean="0"/>
+              <a:t>테이블</a:t>
+            </a:r>
+            <a:r>
+              <a:rPr lang="en-US" altLang="ko-KR" sz="1600" dirty="0" smtClean="0"/>
+              <a:t>UPDATE</a:t>
+            </a:r>
+            <a:endParaRPr lang="en-US" altLang="ko-KR" sz="1600" dirty="0"/>
+          </a:p>
+          <a:p>
+            <a:endParaRPr lang="en-US" altLang="ko-KR" sz="1600" dirty="0" smtClean="0"/>
+          </a:p>
+        </p:txBody>
+      </p:sp>
+      <p:pic>
+        <p:nvPicPr>
+          <p:cNvPr id="4" name="그림 3"/>
+          <p:cNvPicPr>
+            <a:picLocks noChangeAspect="1"/>
+          </p:cNvPicPr>
+          <p:nvPr/>
+        </p:nvPicPr>
+        <p:blipFill>
+          <a:blip r:embed="rId2">
+            <a:extLst>
+              <a:ext uri="{28A0092B-C50C-407E-A947-70E740481C1C}">
+                <a14:useLocalDpi xmlns:a14="http://schemas.microsoft.com/office/drawing/2010/main" val="0"/>
+              </a:ext>
+            </a:extLst>
+          </a:blip>
+          <a:stretch>
+            <a:fillRect/>
+          </a:stretch>
+        </p:blipFill>
+        <p:spPr>
+          <a:xfrm>
+            <a:off x="730666" y="742950"/>
+            <a:ext cx="7438056" cy="4601289"/>
+          </a:xfrm>
+          <a:prstGeom prst="rect">
+            <a:avLst/>
+          </a:prstGeom>
+        </p:spPr>
+      </p:pic>
+    </p:spTree>
+    <p:extLst>
+      <p:ext uri="{BB962C8B-B14F-4D97-AF65-F5344CB8AC3E}">
+        <p14:creationId xmlns:p14="http://schemas.microsoft.com/office/powerpoint/2010/main" val="4264306154"/>
+      </p:ext>
+    </p:extLst>
+  </p:cSld>
+  <p:clrMapOvr>
+    <a:masterClrMapping/>
+  </p:clrMapOvr>
+</p:sld>
+</file>
+
+<file path=ppt/slides/slide14.xml><?xml version="1.0" encoding="utf-8"?>
+<p:sld xmlns:a="http://schemas.openxmlformats.org/drawingml/2006/main" xmlns:r="http://schemas.openxmlformats.org/officeDocument/2006/relationships" xmlns:p="http://schemas.openxmlformats.org/presentationml/2006/main">
+  <p:cSld>
+    <p:spTree>
+      <p:nvGrpSpPr>
+        <p:cNvPr id="1" name=""/>
+        <p:cNvGrpSpPr/>
+        <p:nvPr/>
+      </p:nvGrpSpPr>
+      <p:grpSpPr>
+        <a:xfrm>
+          <a:off x="0" y="0"/>
+          <a:ext cx="0" cy="0"/>
+          <a:chOff x="0" y="0"/>
+          <a:chExt cx="0" cy="0"/>
+        </a:xfrm>
+      </p:grpSpPr>
+      <p:sp>
+        <p:nvSpPr>
+          <p:cNvPr id="2" name="제목 1"/>
+          <p:cNvSpPr>
+            <a:spLocks noGrp="1"/>
+          </p:cNvSpPr>
+          <p:nvPr>
+            <p:ph type="title"/>
+          </p:nvPr>
+        </p:nvSpPr>
+        <p:spPr>
+          <a:xfrm>
+            <a:off x="730666" y="0"/>
+            <a:ext cx="9601200" cy="1485900"/>
+          </a:xfrm>
+        </p:spPr>
+        <p:txBody>
+          <a:bodyPr/>
+          <a:lstStyle/>
+          <a:p>
+            <a:r>
+              <a:rPr lang="en-US" altLang="ko-KR" dirty="0" smtClean="0"/>
+              <a:t>Admin </a:t>
+            </a:r>
+            <a:r>
+              <a:rPr lang="en-US" altLang="ko-KR" dirty="0" err="1" smtClean="0"/>
+              <a:t>Faq</a:t>
+            </a:r>
+            <a:r>
+              <a:rPr lang="en-US" altLang="ko-KR" dirty="0" smtClean="0"/>
+              <a:t> List</a:t>
+            </a:r>
+            <a:r>
+              <a:rPr lang="ko-KR" altLang="en-US" dirty="0" smtClean="0"/>
+              <a:t>기능</a:t>
+            </a:r>
+            <a:endParaRPr lang="ko-KR" altLang="en-US" dirty="0"/>
+          </a:p>
+        </p:txBody>
+      </p:sp>
+      <p:pic>
+        <p:nvPicPr>
+          <p:cNvPr id="3" name="그림 2"/>
+          <p:cNvPicPr>
+            <a:picLocks noChangeAspect="1"/>
+          </p:cNvPicPr>
+          <p:nvPr/>
+        </p:nvPicPr>
+        <p:blipFill>
+          <a:blip r:embed="rId2">
+            <a:extLst>
+              <a:ext uri="{28A0092B-C50C-407E-A947-70E740481C1C}">
+                <a14:useLocalDpi xmlns:a14="http://schemas.microsoft.com/office/drawing/2010/main" val="0"/>
+              </a:ext>
+            </a:extLst>
+          </a:blip>
+          <a:stretch>
+            <a:fillRect/>
+          </a:stretch>
+        </p:blipFill>
+        <p:spPr>
+          <a:xfrm>
+            <a:off x="730666" y="742950"/>
+            <a:ext cx="7585193" cy="4692310"/>
+          </a:xfrm>
+          <a:prstGeom prst="rect">
+            <a:avLst/>
+          </a:prstGeom>
+        </p:spPr>
+      </p:pic>
+      <p:sp>
+        <p:nvSpPr>
+          <p:cNvPr id="7" name="TextBox 6"/>
+          <p:cNvSpPr txBox="1"/>
+          <p:nvPr/>
+        </p:nvSpPr>
+        <p:spPr>
+          <a:xfrm>
+            <a:off x="8429893" y="90427"/>
+            <a:ext cx="3153398" cy="6740307"/>
+          </a:xfrm>
+          <a:prstGeom prst="rect">
+            <a:avLst/>
+          </a:prstGeom>
+          <a:noFill/>
+        </p:spPr>
+        <p:txBody>
+          <a:bodyPr wrap="square" rtlCol="0">
+            <a:spAutoFit/>
+          </a:bodyPr>
+          <a:lstStyle/>
+          <a:p>
+            <a:r>
+              <a:rPr lang="ko-KR" altLang="en-US" sz="1600" dirty="0" smtClean="0"/>
+              <a:t>기능 설명</a:t>
+            </a:r>
+            <a:endParaRPr lang="en-US" altLang="ko-KR" sz="1600" dirty="0" smtClean="0"/>
+          </a:p>
+          <a:p>
+            <a:pPr marL="342900" indent="-342900">
+              <a:buFont typeface="+mj-lt"/>
+              <a:buAutoNum type="arabicPeriod"/>
+            </a:pPr>
+            <a:r>
+              <a:rPr lang="ko-KR" altLang="en-US" sz="1600" dirty="0" smtClean="0"/>
+              <a:t>고객센터 메뉴</a:t>
+            </a:r>
+            <a:r>
+              <a:rPr lang="en-US" altLang="ko-KR" sz="1600" dirty="0"/>
+              <a:t> </a:t>
+            </a:r>
+            <a:endParaRPr lang="en-US" altLang="ko-KR" sz="1600" dirty="0" smtClean="0"/>
+          </a:p>
+          <a:p>
+            <a:pPr marL="285750" indent="-285750">
+              <a:buFontTx/>
+              <a:buChar char="-"/>
+            </a:pPr>
+            <a:r>
+              <a:rPr lang="ko-KR" altLang="en-US" sz="1600" dirty="0" smtClean="0"/>
+              <a:t>자주하는 질문</a:t>
+            </a:r>
+            <a:r>
+              <a:rPr lang="ko-KR" altLang="en-US" sz="1600" dirty="0" smtClean="0"/>
+              <a:t>을 </a:t>
+            </a:r>
+            <a:r>
+              <a:rPr lang="ko-KR" altLang="en-US" sz="1600" dirty="0"/>
+              <a:t>등록</a:t>
+            </a:r>
+            <a:r>
+              <a:rPr lang="en-US" altLang="ko-KR" sz="1600" dirty="0"/>
+              <a:t>, </a:t>
+            </a:r>
+            <a:r>
+              <a:rPr lang="ko-KR" altLang="en-US" sz="1600" dirty="0"/>
+              <a:t>수정</a:t>
+            </a:r>
+            <a:r>
+              <a:rPr lang="en-US" altLang="ko-KR" sz="1600" dirty="0"/>
+              <a:t>, </a:t>
+            </a:r>
+            <a:r>
+              <a:rPr lang="ko-KR" altLang="en-US" sz="1600" dirty="0"/>
+              <a:t>삭제하는 관리 메뉴 </a:t>
+            </a:r>
+            <a:endParaRPr lang="en-US" altLang="ko-KR" sz="1600" dirty="0" smtClean="0"/>
+          </a:p>
+          <a:p>
+            <a:endParaRPr lang="en-US" altLang="ko-KR" sz="1600" dirty="0" smtClean="0"/>
+          </a:p>
+          <a:p>
+            <a:pPr marL="342900" indent="-342900">
+              <a:buAutoNum type="arabicPeriod" startAt="2"/>
+            </a:pPr>
+            <a:r>
+              <a:rPr lang="ko-KR" altLang="en-US" sz="1600" dirty="0" smtClean="0"/>
+              <a:t>유형 </a:t>
+            </a:r>
+            <a:r>
+              <a:rPr lang="ko-KR" altLang="en-US" sz="1600" dirty="0" smtClean="0"/>
+              <a:t>선택 </a:t>
+            </a:r>
+            <a:endParaRPr lang="en-US" altLang="ko-KR" sz="1600" dirty="0" smtClean="0"/>
+          </a:p>
+          <a:p>
+            <a:pPr marL="285750" indent="-285750">
+              <a:buFontTx/>
+              <a:buChar char="-"/>
+            </a:pPr>
+            <a:r>
+              <a:rPr lang="ko-KR" altLang="en-US" sz="1600" dirty="0" smtClean="0"/>
+              <a:t>유형별 </a:t>
+            </a:r>
+            <a:r>
+              <a:rPr lang="ko-KR" altLang="en-US" sz="1600" dirty="0"/>
+              <a:t>목록 출력하기</a:t>
+            </a:r>
+            <a:endParaRPr lang="en-US" altLang="ko-KR" sz="1600" dirty="0" smtClean="0"/>
+          </a:p>
+          <a:p>
+            <a:pPr marL="285750" indent="-285750">
+              <a:buFontTx/>
+              <a:buChar char="-"/>
+            </a:pPr>
+            <a:r>
+              <a:rPr lang="ko-KR" altLang="en-US" sz="1600" dirty="0" smtClean="0"/>
+              <a:t>유형 </a:t>
+            </a:r>
+            <a:r>
+              <a:rPr lang="ko-KR" altLang="en-US" sz="1600" dirty="0"/>
+              <a:t>선택할 때 마다 목록 갱신 됨 </a:t>
+            </a:r>
+            <a:endParaRPr lang="en-US" altLang="ko-KR" sz="1600" dirty="0" smtClean="0"/>
+          </a:p>
+          <a:p>
+            <a:endParaRPr lang="en-US" altLang="ko-KR" sz="1600" dirty="0" smtClean="0"/>
+          </a:p>
+          <a:p>
+            <a:r>
+              <a:rPr lang="en-US" altLang="ko-KR" sz="1600" dirty="0" smtClean="0"/>
+              <a:t>3.  </a:t>
+            </a:r>
+            <a:r>
+              <a:rPr lang="ko-KR" altLang="en-US" sz="1600" dirty="0" smtClean="0"/>
+              <a:t>선택 삭제 </a:t>
+            </a:r>
+            <a:endParaRPr lang="en-US" altLang="ko-KR" sz="1600" dirty="0" smtClean="0"/>
+          </a:p>
+          <a:p>
+            <a:pPr marL="285750" indent="-285750">
+              <a:buFontTx/>
+              <a:buChar char="-"/>
+            </a:pPr>
+            <a:r>
+              <a:rPr lang="ko-KR" altLang="en-US" sz="1600" dirty="0" smtClean="0"/>
+              <a:t>체크박스 </a:t>
+            </a:r>
+            <a:r>
+              <a:rPr lang="ko-KR" altLang="en-US" sz="1600" dirty="0"/>
+              <a:t>선택한 글 </a:t>
+            </a:r>
+            <a:r>
+              <a:rPr lang="ko-KR" altLang="en-US" sz="1600" dirty="0" smtClean="0"/>
+              <a:t>선택 삭제</a:t>
+            </a:r>
+            <a:endParaRPr lang="en-US" altLang="ko-KR" sz="1600" dirty="0" smtClean="0"/>
+          </a:p>
+          <a:p>
+            <a:endParaRPr lang="en-US" altLang="ko-KR" sz="1600" dirty="0" smtClean="0"/>
+          </a:p>
+          <a:p>
+            <a:r>
+              <a:rPr lang="en-US" altLang="ko-KR" sz="1600" dirty="0" smtClean="0"/>
+              <a:t>4.  </a:t>
+            </a:r>
+            <a:r>
+              <a:rPr lang="ko-KR" altLang="en-US" sz="1600" dirty="0" smtClean="0"/>
+              <a:t>공지사항 </a:t>
+            </a:r>
+            <a:r>
+              <a:rPr lang="ko-KR" altLang="en-US" sz="1600" dirty="0"/>
+              <a:t>제목 </a:t>
+            </a:r>
+            <a:endParaRPr lang="en-US" altLang="ko-KR" sz="1600" dirty="0" smtClean="0"/>
+          </a:p>
+          <a:p>
+            <a:r>
+              <a:rPr lang="en-US" altLang="ko-KR" sz="1600" dirty="0" smtClean="0"/>
+              <a:t>-    </a:t>
+            </a:r>
+            <a:r>
+              <a:rPr lang="ko-KR" altLang="en-US" sz="1600" dirty="0" smtClean="0"/>
+              <a:t>제목 클릭 시 글 보기 </a:t>
+            </a:r>
+            <a:r>
+              <a:rPr lang="ko-KR" altLang="en-US" sz="1600" dirty="0"/>
+              <a:t>이동 </a:t>
+            </a:r>
+            <a:endParaRPr lang="en-US" altLang="ko-KR" sz="1600" dirty="0"/>
+          </a:p>
+          <a:p>
+            <a:endParaRPr lang="en-US" altLang="ko-KR" sz="1600" dirty="0" smtClean="0"/>
+          </a:p>
+          <a:p>
+            <a:r>
+              <a:rPr lang="en-US" altLang="ko-KR" sz="1600" dirty="0" smtClean="0"/>
+              <a:t>5. </a:t>
+            </a:r>
+            <a:r>
+              <a:rPr lang="ko-KR" altLang="en-US" sz="1600" dirty="0"/>
+              <a:t>관리 </a:t>
+            </a:r>
+            <a:endParaRPr lang="en-US" altLang="ko-KR" sz="1600" dirty="0" smtClean="0"/>
+          </a:p>
+          <a:p>
+            <a:pPr marL="285750" indent="-285750">
+              <a:buFontTx/>
+              <a:buChar char="-"/>
+            </a:pPr>
+            <a:r>
+              <a:rPr lang="ko-KR" altLang="en-US" sz="1600" dirty="0" smtClean="0"/>
+              <a:t>삭제 </a:t>
+            </a:r>
+            <a:r>
+              <a:rPr lang="en-US" altLang="ko-KR" sz="1600" dirty="0"/>
+              <a:t>: </a:t>
+            </a:r>
+            <a:r>
+              <a:rPr lang="ko-KR" altLang="en-US" sz="1600" dirty="0"/>
+              <a:t>확인 대화상자 </a:t>
+            </a:r>
+            <a:r>
+              <a:rPr lang="ko-KR" altLang="en-US" sz="1600" dirty="0" smtClean="0"/>
+              <a:t>출력 후 </a:t>
+            </a:r>
+            <a:r>
+              <a:rPr lang="ko-KR" altLang="en-US" sz="1600" dirty="0"/>
+              <a:t>삭제 </a:t>
+            </a:r>
+            <a:endParaRPr lang="en-US" altLang="ko-KR" sz="1600" dirty="0" smtClean="0"/>
+          </a:p>
+          <a:p>
+            <a:pPr marL="285750" indent="-285750">
+              <a:buFontTx/>
+              <a:buChar char="-"/>
+            </a:pPr>
+            <a:r>
+              <a:rPr lang="ko-KR" altLang="en-US" sz="1600" dirty="0" smtClean="0"/>
+              <a:t>수정 </a:t>
+            </a:r>
+            <a:r>
+              <a:rPr lang="en-US" altLang="ko-KR" sz="1600" dirty="0"/>
+              <a:t>: </a:t>
+            </a:r>
+            <a:r>
+              <a:rPr lang="ko-KR" altLang="en-US" sz="1600" dirty="0" smtClean="0"/>
+              <a:t>글 수정 </a:t>
+            </a:r>
+            <a:r>
+              <a:rPr lang="ko-KR" altLang="en-US" sz="1600" dirty="0"/>
+              <a:t>화면으로 </a:t>
+            </a:r>
+            <a:r>
+              <a:rPr lang="ko-KR" altLang="en-US" sz="1600" dirty="0" smtClean="0"/>
+              <a:t>이동</a:t>
+            </a:r>
+            <a:endParaRPr lang="en-US" altLang="ko-KR" sz="1600" dirty="0" smtClean="0"/>
+          </a:p>
+          <a:p>
+            <a:endParaRPr lang="en-US" altLang="ko-KR" sz="1600" dirty="0"/>
+          </a:p>
+          <a:p>
+            <a:r>
+              <a:rPr lang="en-US" altLang="ko-KR" sz="1600" dirty="0"/>
+              <a:t>6 </a:t>
+            </a:r>
+            <a:r>
+              <a:rPr lang="en-US" altLang="ko-KR" sz="1600" dirty="0" smtClean="0"/>
+              <a:t>. </a:t>
+            </a:r>
+            <a:r>
+              <a:rPr lang="ko-KR" altLang="en-US" sz="1600" dirty="0" smtClean="0"/>
+              <a:t>페이지 </a:t>
+            </a:r>
+            <a:r>
+              <a:rPr lang="ko-KR" altLang="en-US" sz="1600" dirty="0"/>
+              <a:t>번호 </a:t>
+            </a:r>
+            <a:endParaRPr lang="en-US" altLang="ko-KR" sz="1600" dirty="0" smtClean="0"/>
+          </a:p>
+          <a:p>
+            <a:r>
+              <a:rPr lang="en-US" altLang="ko-KR" sz="1600" dirty="0" smtClean="0"/>
+              <a:t>-     10</a:t>
+            </a:r>
+            <a:r>
+              <a:rPr lang="ko-KR" altLang="en-US" sz="1600" dirty="0"/>
+              <a:t>개씩 공지사항 출력</a:t>
+            </a:r>
+            <a:endParaRPr lang="en-US" altLang="ko-KR" sz="1600" dirty="0" smtClean="0"/>
+          </a:p>
+          <a:p>
+            <a:pPr marL="342900" indent="-342900">
+              <a:buFont typeface="+mj-lt"/>
+              <a:buAutoNum type="arabicPeriod"/>
+            </a:pPr>
+            <a:endParaRPr lang="en-US" altLang="ko-KR" sz="1600" dirty="0" smtClean="0"/>
+          </a:p>
+          <a:p>
+            <a:pPr marL="342900" indent="-342900">
+              <a:buAutoNum type="arabicPeriod" startAt="7"/>
+            </a:pPr>
+            <a:r>
+              <a:rPr lang="ko-KR" altLang="en-US" sz="1600" dirty="0" smtClean="0"/>
+              <a:t>작성하기 </a:t>
+            </a:r>
+            <a:endParaRPr lang="en-US" altLang="ko-KR" sz="1600" dirty="0" smtClean="0"/>
+          </a:p>
+          <a:p>
+            <a:pPr marL="285750" indent="-285750">
+              <a:buFontTx/>
+              <a:buChar char="-"/>
+            </a:pPr>
+            <a:r>
+              <a:rPr lang="ko-KR" altLang="en-US" sz="1600" dirty="0" smtClean="0"/>
+              <a:t>작성하기 </a:t>
+            </a:r>
+            <a:r>
+              <a:rPr lang="ko-KR" altLang="en-US" sz="1600" dirty="0"/>
+              <a:t>페이지로 이동</a:t>
+            </a:r>
+            <a:endParaRPr lang="en-US" altLang="ko-KR" sz="1600" dirty="0" smtClean="0"/>
+          </a:p>
+        </p:txBody>
+      </p:sp>
+    </p:spTree>
+    <p:extLst>
+      <p:ext uri="{BB962C8B-B14F-4D97-AF65-F5344CB8AC3E}">
+        <p14:creationId xmlns:p14="http://schemas.microsoft.com/office/powerpoint/2010/main" val="673061413"/>
+      </p:ext>
+    </p:extLst>
+  </p:cSld>
+  <p:clrMapOvr>
+    <a:masterClrMapping/>
+  </p:clrMapOvr>
+</p:sld>
+</file>
+
+<file path=ppt/slides/slide15.xml><?xml version="1.0" encoding="utf-8"?>
+<p:sld xmlns:a="http://schemas.openxmlformats.org/drawingml/2006/main" xmlns:r="http://schemas.openxmlformats.org/officeDocument/2006/relationships" xmlns:p="http://schemas.openxmlformats.org/presentationml/2006/main">
+  <p:cSld>
+    <p:spTree>
+      <p:nvGrpSpPr>
+        <p:cNvPr id="1" name=""/>
+        <p:cNvGrpSpPr/>
+        <p:nvPr/>
+      </p:nvGrpSpPr>
+      <p:grpSpPr>
+        <a:xfrm>
+          <a:off x="0" y="0"/>
+          <a:ext cx="0" cy="0"/>
+          <a:chOff x="0" y="0"/>
+          <a:chExt cx="0" cy="0"/>
+        </a:xfrm>
+      </p:grpSpPr>
+      <p:sp>
+        <p:nvSpPr>
+          <p:cNvPr id="2" name="제목 1"/>
+          <p:cNvSpPr>
+            <a:spLocks noGrp="1"/>
+          </p:cNvSpPr>
+          <p:nvPr>
+            <p:ph type="title"/>
+          </p:nvPr>
+        </p:nvSpPr>
+        <p:spPr>
+          <a:xfrm>
+            <a:off x="730666" y="0"/>
+            <a:ext cx="9601200" cy="1485900"/>
+          </a:xfrm>
+        </p:spPr>
+        <p:txBody>
+          <a:bodyPr/>
+          <a:lstStyle/>
+          <a:p>
+            <a:r>
+              <a:rPr lang="en-US" altLang="ko-KR" dirty="0" smtClean="0"/>
+              <a:t>Admin </a:t>
+            </a:r>
+            <a:r>
+              <a:rPr lang="en-US" altLang="ko-KR" dirty="0" err="1" smtClean="0"/>
+              <a:t>Faq</a:t>
+            </a:r>
+            <a:r>
+              <a:rPr lang="en-US" altLang="ko-KR" dirty="0" smtClean="0"/>
+              <a:t> View</a:t>
+            </a:r>
+            <a:r>
+              <a:rPr lang="ko-KR" altLang="en-US" dirty="0" smtClean="0"/>
+              <a:t>기능</a:t>
+            </a:r>
+            <a:endParaRPr lang="ko-KR" altLang="en-US" dirty="0"/>
+          </a:p>
+        </p:txBody>
+      </p:sp>
+      <p:pic>
+        <p:nvPicPr>
+          <p:cNvPr id="4" name="그림 3"/>
+          <p:cNvPicPr>
+            <a:picLocks noChangeAspect="1"/>
+          </p:cNvPicPr>
+          <p:nvPr/>
+        </p:nvPicPr>
+        <p:blipFill>
+          <a:blip r:embed="rId2">
+            <a:extLst>
+              <a:ext uri="{28A0092B-C50C-407E-A947-70E740481C1C}">
+                <a14:useLocalDpi xmlns:a14="http://schemas.microsoft.com/office/drawing/2010/main" val="0"/>
+              </a:ext>
+            </a:extLst>
+          </a:blip>
+          <a:stretch>
+            <a:fillRect/>
+          </a:stretch>
+        </p:blipFill>
+        <p:spPr>
+          <a:xfrm>
+            <a:off x="730666" y="721129"/>
+            <a:ext cx="7656419" cy="4736371"/>
+          </a:xfrm>
+          <a:prstGeom prst="rect">
+            <a:avLst/>
+          </a:prstGeom>
+        </p:spPr>
+      </p:pic>
+      <p:sp>
+        <p:nvSpPr>
+          <p:cNvPr id="6" name="TextBox 5"/>
+          <p:cNvSpPr txBox="1"/>
+          <p:nvPr/>
+        </p:nvSpPr>
+        <p:spPr>
+          <a:xfrm>
+            <a:off x="8609694" y="721129"/>
+            <a:ext cx="3153398" cy="3293209"/>
+          </a:xfrm>
+          <a:prstGeom prst="rect">
+            <a:avLst/>
+          </a:prstGeom>
+          <a:noFill/>
+        </p:spPr>
+        <p:txBody>
+          <a:bodyPr wrap="square" rtlCol="0">
+            <a:spAutoFit/>
+          </a:bodyPr>
+          <a:lstStyle/>
+          <a:p>
+            <a:r>
+              <a:rPr lang="ko-KR" altLang="en-US" sz="1600" dirty="0" smtClean="0"/>
+              <a:t>기능 </a:t>
+            </a:r>
+            <a:r>
+              <a:rPr lang="ko-KR" altLang="en-US" sz="1600" dirty="0" smtClean="0"/>
+              <a:t>설명</a:t>
+            </a:r>
+            <a:endParaRPr lang="en-US" altLang="ko-KR" sz="1600" dirty="0" smtClean="0"/>
+          </a:p>
+          <a:p>
+            <a:r>
+              <a:rPr lang="en-US" altLang="ko-KR" sz="1600" dirty="0" smtClean="0"/>
+              <a:t>1.   </a:t>
+            </a:r>
+            <a:r>
+              <a:rPr lang="en-US" altLang="ko-KR" sz="1600" dirty="0" err="1" smtClean="0"/>
+              <a:t>Faq</a:t>
+            </a:r>
+            <a:r>
+              <a:rPr lang="en-US" altLang="ko-KR" sz="1600" dirty="0" smtClean="0"/>
+              <a:t> </a:t>
+            </a:r>
+            <a:r>
+              <a:rPr lang="ko-KR" altLang="en-US" sz="1600" dirty="0" smtClean="0"/>
+              <a:t>보기 </a:t>
+            </a:r>
+            <a:endParaRPr lang="en-US" altLang="ko-KR" sz="1600" dirty="0" smtClean="0"/>
+          </a:p>
+          <a:p>
+            <a:pPr marL="285750" indent="-285750">
+              <a:buFontTx/>
+              <a:buChar char="-"/>
+            </a:pPr>
+            <a:r>
+              <a:rPr lang="ko-KR" altLang="en-US" sz="1600" dirty="0" smtClean="0"/>
+              <a:t>목록에서 </a:t>
+            </a:r>
+            <a:r>
+              <a:rPr lang="ko-KR" altLang="en-US" sz="1600" dirty="0"/>
+              <a:t>선택한 </a:t>
+            </a:r>
+            <a:r>
+              <a:rPr lang="ko-KR" altLang="en-US" sz="1600" dirty="0" smtClean="0"/>
+              <a:t>내용 </a:t>
+            </a:r>
+            <a:r>
+              <a:rPr lang="ko-KR" altLang="en-US" sz="1600" dirty="0"/>
+              <a:t>출력 </a:t>
+            </a:r>
+            <a:endParaRPr lang="en-US" altLang="ko-KR" sz="1600" dirty="0" smtClean="0"/>
+          </a:p>
+          <a:p>
+            <a:endParaRPr lang="en-US" altLang="ko-KR" sz="1600" dirty="0" smtClean="0"/>
+          </a:p>
+          <a:p>
+            <a:r>
+              <a:rPr lang="en-US" altLang="ko-KR" sz="1600" dirty="0" smtClean="0"/>
+              <a:t>2.  </a:t>
+            </a:r>
+            <a:r>
+              <a:rPr lang="en-US" altLang="ko-KR" sz="1600" dirty="0" smtClean="0"/>
+              <a:t> </a:t>
+            </a:r>
+            <a:r>
+              <a:rPr lang="ko-KR" altLang="en-US" sz="1600" dirty="0" smtClean="0"/>
+              <a:t>삭제</a:t>
+            </a:r>
+            <a:endParaRPr lang="en-US" altLang="ko-KR" sz="1600" dirty="0" smtClean="0"/>
+          </a:p>
+          <a:p>
+            <a:pPr marL="285750" indent="-285750">
+              <a:buFontTx/>
+              <a:buChar char="-"/>
+            </a:pPr>
+            <a:r>
+              <a:rPr lang="ko-KR" altLang="en-US" sz="1600" dirty="0" smtClean="0"/>
+              <a:t>해당 </a:t>
+            </a:r>
+            <a:r>
+              <a:rPr lang="ko-KR" altLang="en-US" sz="1600" dirty="0"/>
+              <a:t>글</a:t>
+            </a:r>
+            <a:r>
+              <a:rPr lang="ko-KR" altLang="en-US" sz="1600" dirty="0" smtClean="0"/>
+              <a:t> </a:t>
+            </a:r>
+            <a:r>
+              <a:rPr lang="ko-KR" altLang="en-US" sz="1600" dirty="0"/>
+              <a:t>삭제 </a:t>
+            </a:r>
+            <a:endParaRPr lang="en-US" altLang="ko-KR" sz="1600" dirty="0" smtClean="0"/>
+          </a:p>
+          <a:p>
+            <a:pPr marL="285750" indent="-285750">
+              <a:buFontTx/>
+              <a:buChar char="-"/>
+            </a:pPr>
+            <a:r>
+              <a:rPr lang="ko-KR" altLang="en-US" sz="1600" dirty="0" smtClean="0"/>
+              <a:t>사용자 </a:t>
+            </a:r>
+            <a:r>
+              <a:rPr lang="ko-KR" altLang="en-US" sz="1600" dirty="0"/>
+              <a:t>확인 대화상자 </a:t>
+            </a:r>
+            <a:r>
+              <a:rPr lang="ko-KR" altLang="en-US" sz="1600" dirty="0" smtClean="0"/>
+              <a:t>출력</a:t>
+            </a:r>
+            <a:endParaRPr lang="en-US" altLang="ko-KR" sz="1600" dirty="0" smtClean="0"/>
+          </a:p>
+          <a:p>
+            <a:endParaRPr lang="en-US" altLang="ko-KR" sz="1600" dirty="0" smtClean="0"/>
+          </a:p>
+          <a:p>
+            <a:r>
+              <a:rPr lang="en-US" altLang="ko-KR" sz="1600" dirty="0"/>
+              <a:t>3</a:t>
+            </a:r>
+            <a:r>
+              <a:rPr lang="en-US" altLang="ko-KR" sz="1600" dirty="0" smtClean="0"/>
+              <a:t>. </a:t>
+            </a:r>
+            <a:r>
+              <a:rPr lang="ko-KR" altLang="en-US" sz="1600" dirty="0" smtClean="0"/>
+              <a:t>수정 </a:t>
+            </a:r>
+            <a:endParaRPr lang="en-US" altLang="ko-KR" sz="1600" dirty="0" smtClean="0"/>
+          </a:p>
+          <a:p>
+            <a:pPr marL="285750" indent="-285750">
+              <a:buFontTx/>
+              <a:buChar char="-"/>
+            </a:pPr>
+            <a:r>
+              <a:rPr lang="en-US" altLang="ko-KR" sz="1600" dirty="0" err="1"/>
+              <a:t>Faq</a:t>
+            </a:r>
+            <a:r>
+              <a:rPr lang="ko-KR" altLang="en-US" sz="1600" dirty="0" smtClean="0"/>
+              <a:t> 글 수정 화면 </a:t>
+            </a:r>
+            <a:r>
+              <a:rPr lang="ko-KR" altLang="en-US" sz="1600" dirty="0"/>
+              <a:t>이동 </a:t>
+            </a:r>
+            <a:endParaRPr lang="en-US" altLang="ko-KR" sz="1600" dirty="0" smtClean="0"/>
+          </a:p>
+          <a:p>
+            <a:pPr marL="285750" indent="-285750">
+              <a:buFontTx/>
+              <a:buChar char="-"/>
+            </a:pPr>
+            <a:endParaRPr lang="en-US" altLang="ko-KR" sz="1600" dirty="0"/>
+          </a:p>
+          <a:p>
+            <a:r>
+              <a:rPr lang="en-US" altLang="ko-KR" sz="1600" dirty="0"/>
+              <a:t>4</a:t>
+            </a:r>
+            <a:r>
+              <a:rPr lang="en-US" altLang="ko-KR" sz="1600" dirty="0" smtClean="0"/>
+              <a:t> </a:t>
+            </a:r>
+            <a:r>
+              <a:rPr lang="en-US" altLang="ko-KR" sz="1600" dirty="0" smtClean="0"/>
+              <a:t>. </a:t>
+            </a:r>
+            <a:r>
+              <a:rPr lang="ko-KR" altLang="en-US" sz="1600" dirty="0" smtClean="0"/>
+              <a:t>목록</a:t>
+            </a:r>
+            <a:endParaRPr lang="en-US" altLang="ko-KR" sz="1600" dirty="0" smtClean="0"/>
+          </a:p>
+          <a:p>
+            <a:r>
+              <a:rPr lang="en-US" altLang="ko-KR" sz="1600" dirty="0"/>
+              <a:t>-  </a:t>
+            </a:r>
+            <a:r>
+              <a:rPr lang="en-US" altLang="ko-KR" sz="1600" dirty="0" smtClean="0"/>
+              <a:t>   </a:t>
+            </a:r>
+            <a:r>
+              <a:rPr lang="en-US" altLang="ko-KR" sz="1600" dirty="0" err="1" smtClean="0"/>
+              <a:t>Faq</a:t>
+            </a:r>
+            <a:r>
+              <a:rPr lang="en-US" altLang="ko-KR" sz="1600" dirty="0" smtClean="0"/>
+              <a:t> </a:t>
+            </a:r>
+            <a:r>
+              <a:rPr lang="ko-KR" altLang="en-US" sz="1600" dirty="0" smtClean="0"/>
+              <a:t>글 </a:t>
+            </a:r>
+            <a:r>
+              <a:rPr lang="ko-KR" altLang="en-US" sz="1600" dirty="0" smtClean="0"/>
+              <a:t>목록 이동</a:t>
+            </a:r>
+            <a:endParaRPr lang="en-US" altLang="ko-KR" sz="1600" dirty="0" smtClean="0"/>
+          </a:p>
+        </p:txBody>
+      </p:sp>
+    </p:spTree>
+    <p:extLst>
+      <p:ext uri="{BB962C8B-B14F-4D97-AF65-F5344CB8AC3E}">
+        <p14:creationId xmlns:p14="http://schemas.microsoft.com/office/powerpoint/2010/main" val="1160840315"/>
+      </p:ext>
+    </p:extLst>
+  </p:cSld>
+  <p:clrMapOvr>
+    <a:masterClrMapping/>
+  </p:clrMapOvr>
+</p:sld>
+</file>
+
+<file path=ppt/slides/slide16.xml><?xml version="1.0" encoding="utf-8"?>
+<p:sld xmlns:a="http://schemas.openxmlformats.org/drawingml/2006/main" xmlns:r="http://schemas.openxmlformats.org/officeDocument/2006/relationships" xmlns:p="http://schemas.openxmlformats.org/presentationml/2006/main">
+  <p:cSld>
+    <p:spTree>
+      <p:nvGrpSpPr>
+        <p:cNvPr id="1" name=""/>
+        <p:cNvGrpSpPr/>
+        <p:nvPr/>
+      </p:nvGrpSpPr>
+      <p:grpSpPr>
+        <a:xfrm>
+          <a:off x="0" y="0"/>
+          <a:ext cx="0" cy="0"/>
+          <a:chOff x="0" y="0"/>
+          <a:chExt cx="0" cy="0"/>
+        </a:xfrm>
+      </p:grpSpPr>
+      <p:sp>
+        <p:nvSpPr>
+          <p:cNvPr id="2" name="제목 1"/>
+          <p:cNvSpPr>
+            <a:spLocks noGrp="1"/>
+          </p:cNvSpPr>
+          <p:nvPr>
+            <p:ph type="title"/>
+          </p:nvPr>
+        </p:nvSpPr>
+        <p:spPr>
+          <a:xfrm>
+            <a:off x="730666" y="0"/>
+            <a:ext cx="9601200" cy="1485900"/>
+          </a:xfrm>
+        </p:spPr>
+        <p:txBody>
+          <a:bodyPr/>
+          <a:lstStyle/>
+          <a:p>
+            <a:r>
+              <a:rPr lang="en-US" altLang="ko-KR" dirty="0" smtClean="0"/>
+              <a:t>Admin </a:t>
+            </a:r>
+            <a:r>
+              <a:rPr lang="en-US" altLang="ko-KR" dirty="0" err="1" smtClean="0"/>
+              <a:t>Faq</a:t>
+            </a:r>
+            <a:r>
+              <a:rPr lang="en-US" altLang="ko-KR" dirty="0" smtClean="0"/>
+              <a:t> Write</a:t>
+            </a:r>
+            <a:r>
+              <a:rPr lang="ko-KR" altLang="en-US" dirty="0" smtClean="0"/>
+              <a:t>기능</a:t>
+            </a:r>
+            <a:endParaRPr lang="ko-KR" altLang="en-US" dirty="0"/>
+          </a:p>
+        </p:txBody>
+      </p:sp>
+      <p:pic>
+        <p:nvPicPr>
+          <p:cNvPr id="3" name="그림 2"/>
+          <p:cNvPicPr>
+            <a:picLocks noChangeAspect="1"/>
+          </p:cNvPicPr>
+          <p:nvPr/>
+        </p:nvPicPr>
+        <p:blipFill>
+          <a:blip r:embed="rId2">
+            <a:extLst>
+              <a:ext uri="{28A0092B-C50C-407E-A947-70E740481C1C}">
+                <a14:useLocalDpi xmlns:a14="http://schemas.microsoft.com/office/drawing/2010/main" val="0"/>
+              </a:ext>
+            </a:extLst>
+          </a:blip>
+          <a:stretch>
+            <a:fillRect/>
+          </a:stretch>
+        </p:blipFill>
+        <p:spPr>
+          <a:xfrm>
+            <a:off x="730666" y="742950"/>
+            <a:ext cx="7817949" cy="4836296"/>
+          </a:xfrm>
+          <a:prstGeom prst="rect">
+            <a:avLst/>
+          </a:prstGeom>
+        </p:spPr>
+      </p:pic>
+      <p:sp>
+        <p:nvSpPr>
+          <p:cNvPr id="7" name="TextBox 6"/>
+          <p:cNvSpPr txBox="1"/>
+          <p:nvPr/>
+        </p:nvSpPr>
+        <p:spPr>
+          <a:xfrm>
+            <a:off x="8755167" y="742950"/>
+            <a:ext cx="3153398" cy="3539430"/>
+          </a:xfrm>
+          <a:prstGeom prst="rect">
+            <a:avLst/>
+          </a:prstGeom>
+          <a:noFill/>
+        </p:spPr>
+        <p:txBody>
+          <a:bodyPr wrap="square" rtlCol="0">
+            <a:spAutoFit/>
+          </a:bodyPr>
+          <a:lstStyle/>
+          <a:p>
+            <a:r>
+              <a:rPr lang="ko-KR" altLang="en-US" sz="1600" dirty="0" smtClean="0"/>
+              <a:t>기능 </a:t>
+            </a:r>
+            <a:r>
+              <a:rPr lang="ko-KR" altLang="en-US" sz="1600" dirty="0" smtClean="0"/>
+              <a:t>설명</a:t>
+            </a:r>
+            <a:endParaRPr lang="en-US" altLang="ko-KR" sz="1600" dirty="0" smtClean="0"/>
+          </a:p>
+          <a:p>
+            <a:r>
+              <a:rPr lang="en-US" altLang="ko-KR" sz="1600" dirty="0" smtClean="0"/>
+              <a:t>1.  </a:t>
+            </a:r>
+            <a:r>
+              <a:rPr lang="ko-KR" altLang="en-US" sz="1600" dirty="0" smtClean="0"/>
+              <a:t>공지사항 </a:t>
+            </a:r>
+            <a:r>
+              <a:rPr lang="ko-KR" altLang="en-US" sz="1600" dirty="0"/>
+              <a:t>작성  </a:t>
+            </a:r>
+            <a:endParaRPr lang="en-US" altLang="ko-KR" sz="1600" dirty="0" smtClean="0"/>
+          </a:p>
+          <a:p>
+            <a:pPr marL="285750" indent="-285750">
+              <a:buFontTx/>
+              <a:buChar char="-"/>
+            </a:pPr>
+            <a:r>
+              <a:rPr lang="en-US" altLang="ko-KR" sz="1600" dirty="0" err="1"/>
+              <a:t>Faq</a:t>
+            </a:r>
+            <a:r>
+              <a:rPr lang="ko-KR" altLang="en-US" sz="1600" dirty="0" smtClean="0"/>
+              <a:t> </a:t>
+            </a:r>
+            <a:r>
+              <a:rPr lang="ko-KR" altLang="en-US" sz="1600" dirty="0"/>
+              <a:t>유형 선택 </a:t>
+            </a:r>
+            <a:endParaRPr lang="en-US" altLang="ko-KR" sz="1600" dirty="0" smtClean="0"/>
+          </a:p>
+          <a:p>
+            <a:pPr marL="285750" indent="-285750">
+              <a:buFontTx/>
+              <a:buChar char="-"/>
+            </a:pPr>
+            <a:r>
+              <a:rPr lang="en-US" altLang="ko-KR" sz="1600" dirty="0" err="1"/>
+              <a:t>Faq</a:t>
+            </a:r>
+            <a:r>
+              <a:rPr lang="ko-KR" altLang="en-US" sz="1600" dirty="0" smtClean="0"/>
+              <a:t> </a:t>
+            </a:r>
+            <a:r>
+              <a:rPr lang="ko-KR" altLang="en-US" sz="1600" dirty="0"/>
+              <a:t>제목 작성 </a:t>
+            </a:r>
+            <a:endParaRPr lang="en-US" altLang="ko-KR" sz="1600" dirty="0" smtClean="0"/>
+          </a:p>
+          <a:p>
+            <a:pPr marL="285750" indent="-285750">
+              <a:buFontTx/>
+              <a:buChar char="-"/>
+            </a:pPr>
+            <a:r>
+              <a:rPr lang="en-US" altLang="ko-KR" sz="1600" dirty="0" err="1"/>
+              <a:t>Faq</a:t>
+            </a:r>
+            <a:r>
+              <a:rPr lang="ko-KR" altLang="en-US" sz="1600" dirty="0" smtClean="0"/>
+              <a:t> </a:t>
+            </a:r>
+            <a:r>
+              <a:rPr lang="ko-KR" altLang="en-US" sz="1600" dirty="0"/>
+              <a:t>내용 작성 </a:t>
+            </a:r>
+            <a:endParaRPr lang="en-US" altLang="ko-KR" sz="1600" dirty="0" smtClean="0"/>
+          </a:p>
+          <a:p>
+            <a:pPr marL="285750" indent="-285750">
+              <a:buFontTx/>
+              <a:buChar char="-"/>
+            </a:pPr>
+            <a:endParaRPr lang="en-US" altLang="ko-KR" sz="1600" dirty="0" smtClean="0"/>
+          </a:p>
+          <a:p>
+            <a:r>
+              <a:rPr lang="en-US" altLang="ko-KR" sz="1600" dirty="0" smtClean="0"/>
+              <a:t>2.   </a:t>
+            </a:r>
+            <a:r>
+              <a:rPr lang="ko-KR" altLang="en-US" sz="1600" dirty="0" smtClean="0"/>
+              <a:t>취소하기</a:t>
+            </a:r>
+            <a:endParaRPr lang="en-US" altLang="ko-KR" sz="1600" dirty="0" smtClean="0"/>
+          </a:p>
+          <a:p>
+            <a:pPr marL="285750" indent="-285750">
+              <a:buFontTx/>
+              <a:buChar char="-"/>
+            </a:pPr>
+            <a:r>
+              <a:rPr lang="en-US" altLang="ko-KR" sz="1600" dirty="0" err="1" smtClean="0"/>
+              <a:t>Faq</a:t>
+            </a:r>
+            <a:r>
+              <a:rPr lang="ko-KR" altLang="en-US" sz="1600" dirty="0" smtClean="0"/>
+              <a:t> </a:t>
+            </a:r>
+            <a:r>
+              <a:rPr lang="ko-KR" altLang="en-US" sz="1600" dirty="0"/>
+              <a:t>목록 이동 </a:t>
+            </a:r>
+            <a:endParaRPr lang="en-US" altLang="ko-KR" sz="1600" dirty="0" smtClean="0"/>
+          </a:p>
+          <a:p>
+            <a:endParaRPr lang="en-US" altLang="ko-KR" sz="1600" dirty="0" smtClean="0"/>
+          </a:p>
+          <a:p>
+            <a:r>
+              <a:rPr lang="en-US" altLang="ko-KR" sz="1600" dirty="0"/>
+              <a:t>3</a:t>
+            </a:r>
+            <a:r>
+              <a:rPr lang="en-US" altLang="ko-KR" sz="1600" dirty="0" smtClean="0"/>
+              <a:t>.   </a:t>
+            </a:r>
+            <a:r>
+              <a:rPr lang="ko-KR" altLang="en-US" sz="1600" dirty="0" smtClean="0"/>
+              <a:t>등록하기</a:t>
+            </a:r>
+            <a:r>
+              <a:rPr lang="ko-KR" altLang="en-US" sz="1600" dirty="0" smtClean="0"/>
+              <a:t> </a:t>
+            </a:r>
+            <a:endParaRPr lang="en-US" altLang="ko-KR" sz="1600" dirty="0" smtClean="0"/>
+          </a:p>
+          <a:p>
+            <a:pPr marL="285750" indent="-285750">
+              <a:buFontTx/>
+              <a:buChar char="-"/>
+            </a:pPr>
+            <a:r>
+              <a:rPr lang="en-US" altLang="ko-KR" sz="1600" dirty="0" err="1" smtClean="0"/>
+              <a:t>Faq</a:t>
+            </a:r>
+            <a:r>
+              <a:rPr lang="en-US" altLang="ko-KR" sz="1600" dirty="0" smtClean="0"/>
+              <a:t> </a:t>
+            </a:r>
+            <a:r>
+              <a:rPr lang="ko-KR" altLang="en-US" sz="1600" dirty="0" smtClean="0"/>
+              <a:t>테이블 </a:t>
+            </a:r>
+            <a:r>
+              <a:rPr lang="en-US" altLang="ko-KR" sz="1600" dirty="0" smtClean="0"/>
+              <a:t>INSERT</a:t>
+            </a:r>
+          </a:p>
+          <a:p>
+            <a:pPr marL="285750" indent="-285750">
+              <a:buFontTx/>
+              <a:buChar char="-"/>
+            </a:pPr>
+            <a:r>
+              <a:rPr lang="en-US" altLang="ko-KR" sz="1600" dirty="0" err="1" smtClean="0"/>
+              <a:t>Faq</a:t>
+            </a:r>
+            <a:r>
+              <a:rPr lang="en-US" altLang="ko-KR" sz="1600" dirty="0" smtClean="0"/>
+              <a:t> </a:t>
+            </a:r>
+            <a:r>
+              <a:rPr lang="ko-KR" altLang="en-US" sz="1600" dirty="0" smtClean="0"/>
+              <a:t>은 </a:t>
+            </a:r>
+            <a:r>
+              <a:rPr lang="en-US" altLang="ko-KR" sz="1600" dirty="0"/>
+              <a:t>2</a:t>
+            </a:r>
+            <a:r>
+              <a:rPr lang="ko-KR" altLang="en-US" sz="1600" dirty="0"/>
+              <a:t>차 유형당 최대 </a:t>
+            </a:r>
+            <a:r>
+              <a:rPr lang="en-US" altLang="ko-KR" sz="1600" dirty="0"/>
+              <a:t>10</a:t>
+            </a:r>
+            <a:r>
+              <a:rPr lang="ko-KR" altLang="en-US" sz="1600" dirty="0" smtClean="0"/>
+              <a:t>개 까지만 </a:t>
+            </a:r>
+            <a:r>
+              <a:rPr lang="ko-KR" altLang="en-US" sz="1600" dirty="0"/>
+              <a:t>등록 되도록 처리</a:t>
+            </a:r>
+            <a:endParaRPr lang="en-US" altLang="ko-KR" sz="1600" dirty="0"/>
+          </a:p>
+          <a:p>
+            <a:endParaRPr lang="en-US" altLang="ko-KR" sz="1600" dirty="0" smtClean="0"/>
+          </a:p>
+        </p:txBody>
+      </p:sp>
+    </p:spTree>
+    <p:extLst>
+      <p:ext uri="{BB962C8B-B14F-4D97-AF65-F5344CB8AC3E}">
+        <p14:creationId xmlns:p14="http://schemas.microsoft.com/office/powerpoint/2010/main" val="1994437363"/>
+      </p:ext>
+    </p:extLst>
+  </p:cSld>
+  <p:clrMapOvr>
+    <a:masterClrMapping/>
+  </p:clrMapOvr>
+</p:sld>
+</file>
+
+<file path=ppt/slides/slide17.xml><?xml version="1.0" encoding="utf-8"?>
+<p:sld xmlns:a="http://schemas.openxmlformats.org/drawingml/2006/main" xmlns:r="http://schemas.openxmlformats.org/officeDocument/2006/relationships" xmlns:p="http://schemas.openxmlformats.org/presentationml/2006/main">
+  <p:cSld>
+    <p:spTree>
+      <p:nvGrpSpPr>
+        <p:cNvPr id="1" name=""/>
+        <p:cNvGrpSpPr/>
+        <p:nvPr/>
+      </p:nvGrpSpPr>
+      <p:grpSpPr>
+        <a:xfrm>
+          <a:off x="0" y="0"/>
+          <a:ext cx="0" cy="0"/>
+          <a:chOff x="0" y="0"/>
+          <a:chExt cx="0" cy="0"/>
+        </a:xfrm>
+      </p:grpSpPr>
+      <p:sp>
+        <p:nvSpPr>
+          <p:cNvPr id="2" name="제목 1"/>
+          <p:cNvSpPr>
+            <a:spLocks noGrp="1"/>
+          </p:cNvSpPr>
+          <p:nvPr>
+            <p:ph type="title"/>
+          </p:nvPr>
+        </p:nvSpPr>
+        <p:spPr>
+          <a:xfrm>
+            <a:off x="730666" y="0"/>
+            <a:ext cx="9601200" cy="1485900"/>
+          </a:xfrm>
+        </p:spPr>
+        <p:txBody>
+          <a:bodyPr/>
+          <a:lstStyle/>
+          <a:p>
+            <a:r>
+              <a:rPr lang="en-US" altLang="ko-KR" dirty="0" smtClean="0"/>
+              <a:t>Admin </a:t>
+            </a:r>
+            <a:r>
+              <a:rPr lang="en-US" altLang="ko-KR" dirty="0" err="1" smtClean="0"/>
+              <a:t>Faq</a:t>
+            </a:r>
+            <a:r>
+              <a:rPr lang="en-US" altLang="ko-KR" dirty="0" smtClean="0"/>
+              <a:t> Modify</a:t>
+            </a:r>
+            <a:r>
+              <a:rPr lang="ko-KR" altLang="en-US" dirty="0" smtClean="0"/>
+              <a:t>기능</a:t>
+            </a:r>
+            <a:endParaRPr lang="ko-KR" altLang="en-US" dirty="0"/>
+          </a:p>
+        </p:txBody>
+      </p:sp>
+      <p:pic>
+        <p:nvPicPr>
+          <p:cNvPr id="4" name="그림 3"/>
+          <p:cNvPicPr>
+            <a:picLocks noChangeAspect="1"/>
+          </p:cNvPicPr>
+          <p:nvPr/>
+        </p:nvPicPr>
+        <p:blipFill>
+          <a:blip r:embed="rId2">
+            <a:extLst>
+              <a:ext uri="{28A0092B-C50C-407E-A947-70E740481C1C}">
+                <a14:useLocalDpi xmlns:a14="http://schemas.microsoft.com/office/drawing/2010/main" val="0"/>
+              </a:ext>
+            </a:extLst>
+          </a:blip>
+          <a:stretch>
+            <a:fillRect/>
+          </a:stretch>
+        </p:blipFill>
+        <p:spPr>
+          <a:xfrm>
+            <a:off x="730666" y="633386"/>
+            <a:ext cx="7610131" cy="4707737"/>
+          </a:xfrm>
+          <a:prstGeom prst="rect">
+            <a:avLst/>
+          </a:prstGeom>
+        </p:spPr>
+      </p:pic>
+      <p:sp>
+        <p:nvSpPr>
+          <p:cNvPr id="6" name="TextBox 5"/>
+          <p:cNvSpPr txBox="1"/>
+          <p:nvPr/>
+        </p:nvSpPr>
+        <p:spPr>
+          <a:xfrm>
+            <a:off x="8676196" y="742950"/>
+            <a:ext cx="3153398" cy="3293209"/>
+          </a:xfrm>
+          <a:prstGeom prst="rect">
+            <a:avLst/>
+          </a:prstGeom>
+          <a:noFill/>
+        </p:spPr>
+        <p:txBody>
+          <a:bodyPr wrap="square" rtlCol="0">
+            <a:spAutoFit/>
+          </a:bodyPr>
+          <a:lstStyle/>
+          <a:p>
+            <a:r>
+              <a:rPr lang="ko-KR" altLang="en-US" sz="1600" dirty="0" smtClean="0"/>
+              <a:t>기능 </a:t>
+            </a:r>
+            <a:r>
+              <a:rPr lang="ko-KR" altLang="en-US" sz="1600" dirty="0" smtClean="0"/>
+              <a:t>설명</a:t>
+            </a:r>
+            <a:endParaRPr lang="en-US" altLang="ko-KR" sz="1600" dirty="0" smtClean="0"/>
+          </a:p>
+          <a:p>
+            <a:endParaRPr lang="en-US" altLang="ko-KR" sz="1600" dirty="0" smtClean="0"/>
+          </a:p>
+          <a:p>
+            <a:r>
+              <a:rPr lang="en-US" altLang="ko-KR" sz="1600" dirty="0" smtClean="0"/>
+              <a:t>1.  </a:t>
+            </a:r>
+            <a:r>
+              <a:rPr lang="en-US" altLang="ko-KR" sz="1600" dirty="0"/>
+              <a:t> </a:t>
+            </a:r>
+            <a:r>
+              <a:rPr lang="ko-KR" altLang="en-US" sz="1600" dirty="0" smtClean="0"/>
+              <a:t>글 수정</a:t>
+            </a:r>
+            <a:endParaRPr lang="en-US" altLang="ko-KR" sz="1600" dirty="0" smtClean="0"/>
+          </a:p>
+          <a:p>
+            <a:pPr marL="285750" indent="-285750">
+              <a:buFontTx/>
+              <a:buChar char="-"/>
+            </a:pPr>
+            <a:r>
+              <a:rPr lang="ko-KR" altLang="en-US" sz="1600" dirty="0" smtClean="0"/>
+              <a:t>유형 </a:t>
+            </a:r>
+            <a:r>
+              <a:rPr lang="ko-KR" altLang="en-US" sz="1600" dirty="0"/>
+              <a:t>기본 선택 </a:t>
+            </a:r>
+            <a:endParaRPr lang="en-US" altLang="ko-KR" sz="1600" dirty="0" smtClean="0"/>
+          </a:p>
+          <a:p>
+            <a:pPr marL="285750" indent="-285750">
+              <a:buFontTx/>
+              <a:buChar char="-"/>
+            </a:pPr>
+            <a:r>
+              <a:rPr lang="ko-KR" altLang="en-US" sz="1600" dirty="0" smtClean="0"/>
+              <a:t>제목 </a:t>
+            </a:r>
+            <a:r>
+              <a:rPr lang="ko-KR" altLang="en-US" sz="1600" dirty="0"/>
+              <a:t>기본 입력 </a:t>
+            </a:r>
+            <a:endParaRPr lang="en-US" altLang="ko-KR" sz="1600" dirty="0" smtClean="0"/>
+          </a:p>
+          <a:p>
+            <a:pPr marL="285750" indent="-285750">
+              <a:buFontTx/>
+              <a:buChar char="-"/>
+            </a:pPr>
+            <a:r>
+              <a:rPr lang="ko-KR" altLang="en-US" sz="1600" dirty="0" smtClean="0"/>
+              <a:t>내용 </a:t>
+            </a:r>
+            <a:r>
+              <a:rPr lang="ko-KR" altLang="en-US" sz="1600" dirty="0"/>
+              <a:t>기본 입력</a:t>
+            </a:r>
+            <a:r>
+              <a:rPr lang="en-US" altLang="ko-KR" sz="1600" dirty="0" smtClean="0"/>
+              <a:t/>
+            </a:r>
+            <a:br>
+              <a:rPr lang="en-US" altLang="ko-KR" sz="1600" dirty="0" smtClean="0"/>
+            </a:br>
+            <a:endParaRPr lang="en-US" altLang="ko-KR" sz="1600" dirty="0" smtClean="0"/>
+          </a:p>
+          <a:p>
+            <a:r>
+              <a:rPr lang="en-US" altLang="ko-KR" sz="1600" dirty="0" smtClean="0"/>
+              <a:t>2.   </a:t>
+            </a:r>
+            <a:r>
+              <a:rPr lang="ko-KR" altLang="en-US" sz="1600" dirty="0" smtClean="0"/>
+              <a:t>취소하기</a:t>
+            </a:r>
+            <a:endParaRPr lang="en-US" altLang="ko-KR" sz="1600" dirty="0" smtClean="0"/>
+          </a:p>
+          <a:p>
+            <a:pPr marL="285750" indent="-285750">
+              <a:buFontTx/>
+              <a:buChar char="-"/>
+            </a:pPr>
+            <a:r>
+              <a:rPr lang="en-US" altLang="ko-KR" sz="1600" dirty="0" err="1" smtClean="0"/>
+              <a:t>Faq</a:t>
+            </a:r>
+            <a:r>
+              <a:rPr lang="ko-KR" altLang="en-US" sz="1600" dirty="0" smtClean="0"/>
+              <a:t> 보기 </a:t>
+            </a:r>
+            <a:r>
+              <a:rPr lang="ko-KR" altLang="en-US" sz="1600" dirty="0"/>
+              <a:t>이동 </a:t>
+            </a:r>
+            <a:endParaRPr lang="en-US" altLang="ko-KR" sz="1600" dirty="0" smtClean="0"/>
+          </a:p>
+          <a:p>
+            <a:endParaRPr lang="en-US" altLang="ko-KR" sz="1600" dirty="0" smtClean="0"/>
+          </a:p>
+          <a:p>
+            <a:r>
+              <a:rPr lang="en-US" altLang="ko-KR" sz="1600" dirty="0"/>
+              <a:t>3</a:t>
+            </a:r>
+            <a:r>
+              <a:rPr lang="en-US" altLang="ko-KR" sz="1600" dirty="0" smtClean="0"/>
+              <a:t>.   </a:t>
+            </a:r>
+            <a:r>
+              <a:rPr lang="ko-KR" altLang="en-US" sz="1600" dirty="0" smtClean="0"/>
+              <a:t>수정하기</a:t>
+            </a:r>
+            <a:r>
+              <a:rPr lang="ko-KR" altLang="en-US" sz="1600" dirty="0" smtClean="0"/>
+              <a:t> </a:t>
+            </a:r>
+            <a:endParaRPr lang="en-US" altLang="ko-KR" sz="1600" dirty="0" smtClean="0"/>
+          </a:p>
+          <a:p>
+            <a:pPr marL="285750" indent="-285750">
+              <a:buFontTx/>
+              <a:buChar char="-"/>
+            </a:pPr>
+            <a:r>
+              <a:rPr lang="ko-KR" altLang="en-US" sz="1600" dirty="0" smtClean="0"/>
+              <a:t>테이블</a:t>
+            </a:r>
+            <a:r>
+              <a:rPr lang="en-US" altLang="ko-KR" sz="1600" dirty="0" smtClean="0"/>
+              <a:t>UPDATE</a:t>
+            </a:r>
+            <a:endParaRPr lang="en-US" altLang="ko-KR" sz="1600" dirty="0"/>
+          </a:p>
+          <a:p>
+            <a:endParaRPr lang="en-US" altLang="ko-KR" sz="1600" dirty="0" smtClean="0"/>
+          </a:p>
+        </p:txBody>
+      </p:sp>
+    </p:spTree>
+    <p:extLst>
+      <p:ext uri="{BB962C8B-B14F-4D97-AF65-F5344CB8AC3E}">
+        <p14:creationId xmlns:p14="http://schemas.microsoft.com/office/powerpoint/2010/main" val="161603595"/>
+      </p:ext>
+    </p:extLst>
+  </p:cSld>
+  <p:clrMapOvr>
+    <a:masterClrMapping/>
+  </p:clrMapOvr>
+</p:sld>
+</file>
+
+<file path=ppt/slides/slide18.xml><?xml version="1.0" encoding="utf-8"?>
+<p:sld xmlns:a="http://schemas.openxmlformats.org/drawingml/2006/main" xmlns:r="http://schemas.openxmlformats.org/officeDocument/2006/relationships" xmlns:p="http://schemas.openxmlformats.org/presentationml/2006/main">
+  <p:cSld>
+    <p:spTree>
+      <p:nvGrpSpPr>
+        <p:cNvPr id="1" name=""/>
+        <p:cNvGrpSpPr/>
+        <p:nvPr/>
+      </p:nvGrpSpPr>
+      <p:grpSpPr>
+        <a:xfrm>
+          <a:off x="0" y="0"/>
+          <a:ext cx="0" cy="0"/>
+          <a:chOff x="0" y="0"/>
+          <a:chExt cx="0" cy="0"/>
+        </a:xfrm>
+      </p:grpSpPr>
+      <p:sp>
+        <p:nvSpPr>
+          <p:cNvPr id="2" name="제목 1"/>
+          <p:cNvSpPr>
+            <a:spLocks noGrp="1"/>
+          </p:cNvSpPr>
+          <p:nvPr>
+            <p:ph type="title"/>
+          </p:nvPr>
+        </p:nvSpPr>
+        <p:spPr>
+          <a:xfrm>
+            <a:off x="730666" y="0"/>
+            <a:ext cx="9601200" cy="1485900"/>
+          </a:xfrm>
+        </p:spPr>
+        <p:txBody>
+          <a:bodyPr/>
+          <a:lstStyle/>
+          <a:p>
+            <a:r>
+              <a:rPr lang="en-US" altLang="ko-KR" dirty="0" smtClean="0"/>
+              <a:t>Admin </a:t>
+            </a:r>
+            <a:r>
+              <a:rPr lang="en-US" altLang="ko-KR" dirty="0" err="1" smtClean="0"/>
+              <a:t>Qna</a:t>
+            </a:r>
+            <a:r>
+              <a:rPr lang="en-US" altLang="ko-KR" dirty="0" smtClean="0"/>
+              <a:t> List</a:t>
+            </a:r>
+            <a:r>
+              <a:rPr lang="ko-KR" altLang="en-US" dirty="0" smtClean="0"/>
+              <a:t>기능</a:t>
+            </a:r>
+            <a:endParaRPr lang="ko-KR" altLang="en-US" dirty="0"/>
+          </a:p>
+        </p:txBody>
+      </p:sp>
+      <p:pic>
+        <p:nvPicPr>
+          <p:cNvPr id="3" name="그림 2"/>
+          <p:cNvPicPr>
+            <a:picLocks noChangeAspect="1"/>
+          </p:cNvPicPr>
+          <p:nvPr/>
+        </p:nvPicPr>
+        <p:blipFill>
+          <a:blip r:embed="rId2">
+            <a:extLst>
+              <a:ext uri="{28A0092B-C50C-407E-A947-70E740481C1C}">
+                <a14:useLocalDpi xmlns:a14="http://schemas.microsoft.com/office/drawing/2010/main" val="0"/>
+              </a:ext>
+            </a:extLst>
+          </a:blip>
+          <a:stretch>
+            <a:fillRect/>
+          </a:stretch>
+        </p:blipFill>
+        <p:spPr>
+          <a:xfrm>
+            <a:off x="730666" y="742950"/>
+            <a:ext cx="7477128" cy="4625459"/>
+          </a:xfrm>
+          <a:prstGeom prst="rect">
+            <a:avLst/>
+          </a:prstGeom>
+        </p:spPr>
+      </p:pic>
+      <p:sp>
+        <p:nvSpPr>
+          <p:cNvPr id="7" name="TextBox 6"/>
+          <p:cNvSpPr txBox="1"/>
+          <p:nvPr/>
+        </p:nvSpPr>
+        <p:spPr>
+          <a:xfrm>
+            <a:off x="8429892" y="90427"/>
+            <a:ext cx="3640187" cy="5755422"/>
+          </a:xfrm>
+          <a:prstGeom prst="rect">
+            <a:avLst/>
+          </a:prstGeom>
+          <a:noFill/>
+        </p:spPr>
+        <p:txBody>
+          <a:bodyPr wrap="square" rtlCol="0">
+            <a:spAutoFit/>
+          </a:bodyPr>
+          <a:lstStyle/>
+          <a:p>
+            <a:r>
+              <a:rPr lang="ko-KR" altLang="en-US" sz="1600" dirty="0" smtClean="0"/>
+              <a:t>기능 설명</a:t>
+            </a:r>
+            <a:endParaRPr lang="en-US" altLang="ko-KR" sz="1600" dirty="0" smtClean="0"/>
+          </a:p>
+          <a:p>
+            <a:pPr marL="342900" indent="-342900">
+              <a:buFont typeface="+mj-lt"/>
+              <a:buAutoNum type="arabicPeriod"/>
+            </a:pPr>
+            <a:r>
+              <a:rPr lang="ko-KR" altLang="en-US" sz="1600" dirty="0"/>
+              <a:t>문의하기 </a:t>
+            </a:r>
+            <a:r>
+              <a:rPr lang="ko-KR" altLang="en-US" sz="1600" dirty="0" smtClean="0"/>
+              <a:t>메뉴</a:t>
+            </a:r>
+            <a:r>
+              <a:rPr lang="en-US" altLang="ko-KR" sz="1600" dirty="0" smtClean="0"/>
+              <a:t> </a:t>
+            </a:r>
+            <a:endParaRPr lang="en-US" altLang="ko-KR" sz="1600" dirty="0" smtClean="0"/>
+          </a:p>
+          <a:p>
+            <a:pPr marL="285750" indent="-285750">
+              <a:buFontTx/>
+              <a:buChar char="-"/>
+            </a:pPr>
+            <a:r>
+              <a:rPr lang="ko-KR" altLang="en-US" sz="1600" dirty="0" smtClean="0"/>
+              <a:t>쇼핑몰 </a:t>
+            </a:r>
+            <a:r>
+              <a:rPr lang="ko-KR" altLang="en-US" sz="1600" dirty="0"/>
+              <a:t>사용자가 문의 하는 내용에 답변할 수 있는 메뉴 </a:t>
+            </a:r>
+            <a:endParaRPr lang="en-US" altLang="ko-KR" sz="1600" dirty="0" smtClean="0"/>
+          </a:p>
+          <a:p>
+            <a:endParaRPr lang="en-US" altLang="ko-KR" sz="1600" dirty="0" smtClean="0"/>
+          </a:p>
+          <a:p>
+            <a:pPr marL="342900" indent="-342900">
+              <a:buAutoNum type="arabicPeriod" startAt="2"/>
+            </a:pPr>
+            <a:r>
+              <a:rPr lang="ko-KR" altLang="en-US" sz="1600" dirty="0" smtClean="0"/>
+              <a:t>유형 </a:t>
+            </a:r>
+            <a:r>
+              <a:rPr lang="ko-KR" altLang="en-US" sz="1600" dirty="0" smtClean="0"/>
+              <a:t>선택 </a:t>
+            </a:r>
+            <a:endParaRPr lang="en-US" altLang="ko-KR" sz="1600" dirty="0" smtClean="0"/>
+          </a:p>
+          <a:p>
+            <a:pPr marL="285750" indent="-285750">
+              <a:buFontTx/>
+              <a:buChar char="-"/>
+            </a:pPr>
+            <a:r>
+              <a:rPr lang="ko-KR" altLang="en-US" sz="1600" dirty="0" smtClean="0"/>
+              <a:t>유형별 </a:t>
+            </a:r>
+            <a:r>
+              <a:rPr lang="ko-KR" altLang="en-US" sz="1600" dirty="0"/>
+              <a:t>목록 출력하기</a:t>
+            </a:r>
+            <a:endParaRPr lang="en-US" altLang="ko-KR" sz="1600" dirty="0" smtClean="0"/>
+          </a:p>
+          <a:p>
+            <a:pPr marL="285750" indent="-285750">
+              <a:buFontTx/>
+              <a:buChar char="-"/>
+            </a:pPr>
+            <a:r>
+              <a:rPr lang="ko-KR" altLang="en-US" sz="1600" dirty="0" smtClean="0"/>
+              <a:t>유형 </a:t>
+            </a:r>
+            <a:r>
+              <a:rPr lang="ko-KR" altLang="en-US" sz="1600" dirty="0"/>
+              <a:t>선택할 때 마다 목록 갱신 됨 </a:t>
+            </a:r>
+            <a:endParaRPr lang="en-US" altLang="ko-KR" sz="1600" dirty="0" smtClean="0"/>
+          </a:p>
+          <a:p>
+            <a:endParaRPr lang="en-US" altLang="ko-KR" sz="1600" dirty="0" smtClean="0"/>
+          </a:p>
+          <a:p>
+            <a:r>
+              <a:rPr lang="en-US" altLang="ko-KR" sz="1600" dirty="0" smtClean="0"/>
+              <a:t>3.  </a:t>
+            </a:r>
+            <a:r>
+              <a:rPr lang="ko-KR" altLang="en-US" sz="1600" dirty="0" smtClean="0"/>
+              <a:t>선택 삭제 </a:t>
+            </a:r>
+            <a:endParaRPr lang="en-US" altLang="ko-KR" sz="1600" dirty="0" smtClean="0"/>
+          </a:p>
+          <a:p>
+            <a:pPr marL="285750" indent="-285750">
+              <a:buFontTx/>
+              <a:buChar char="-"/>
+            </a:pPr>
+            <a:r>
+              <a:rPr lang="ko-KR" altLang="en-US" sz="1600" dirty="0" smtClean="0"/>
+              <a:t>체크박스 </a:t>
+            </a:r>
+            <a:r>
+              <a:rPr lang="ko-KR" altLang="en-US" sz="1600" dirty="0"/>
+              <a:t>선택한 글 </a:t>
+            </a:r>
+            <a:r>
+              <a:rPr lang="ko-KR" altLang="en-US" sz="1600" dirty="0" smtClean="0"/>
+              <a:t>선택 삭제</a:t>
+            </a:r>
+            <a:endParaRPr lang="en-US" altLang="ko-KR" sz="1600" dirty="0" smtClean="0"/>
+          </a:p>
+          <a:p>
+            <a:endParaRPr lang="en-US" altLang="ko-KR" sz="1600" dirty="0" smtClean="0"/>
+          </a:p>
+          <a:p>
+            <a:r>
+              <a:rPr lang="en-US" altLang="ko-KR" sz="1600" dirty="0" smtClean="0"/>
+              <a:t>4.  </a:t>
+            </a:r>
+            <a:r>
+              <a:rPr lang="ko-KR" altLang="en-US" sz="1600" dirty="0" smtClean="0"/>
+              <a:t>공지사항 </a:t>
+            </a:r>
+            <a:r>
+              <a:rPr lang="ko-KR" altLang="en-US" sz="1600" dirty="0"/>
+              <a:t>제목 </a:t>
+            </a:r>
+            <a:endParaRPr lang="en-US" altLang="ko-KR" sz="1600" dirty="0" smtClean="0"/>
+          </a:p>
+          <a:p>
+            <a:r>
+              <a:rPr lang="en-US" altLang="ko-KR" sz="1600" dirty="0" smtClean="0"/>
+              <a:t>-    </a:t>
+            </a:r>
+            <a:r>
+              <a:rPr lang="ko-KR" altLang="en-US" sz="1600" dirty="0" smtClean="0"/>
+              <a:t>제목 클릭 시 글 보기 </a:t>
+            </a:r>
+            <a:r>
+              <a:rPr lang="ko-KR" altLang="en-US" sz="1600" dirty="0"/>
+              <a:t>이동 </a:t>
+            </a:r>
+            <a:endParaRPr lang="en-US" altLang="ko-KR" sz="1600" dirty="0"/>
+          </a:p>
+          <a:p>
+            <a:endParaRPr lang="en-US" altLang="ko-KR" sz="1600" dirty="0" smtClean="0"/>
+          </a:p>
+          <a:p>
+            <a:r>
+              <a:rPr lang="en-US" altLang="ko-KR" sz="1600" dirty="0" smtClean="0"/>
+              <a:t>5. </a:t>
+            </a:r>
+            <a:r>
+              <a:rPr lang="ko-KR" altLang="en-US" sz="1600" dirty="0"/>
+              <a:t>상태 </a:t>
+            </a:r>
+            <a:r>
+              <a:rPr lang="ko-KR" altLang="en-US" sz="1600" dirty="0" smtClean="0"/>
+              <a:t> </a:t>
+            </a:r>
+            <a:endParaRPr lang="en-US" altLang="ko-KR" sz="1600" dirty="0" smtClean="0"/>
+          </a:p>
+          <a:p>
+            <a:pPr marL="285750" indent="-285750">
+              <a:buFontTx/>
+              <a:buChar char="-"/>
+            </a:pPr>
+            <a:r>
+              <a:rPr lang="ko-KR" altLang="en-US" sz="1600" dirty="0" smtClean="0"/>
+              <a:t>답변 </a:t>
+            </a:r>
+            <a:r>
+              <a:rPr lang="ko-KR" altLang="en-US" sz="1600" dirty="0"/>
+              <a:t>상태 확인 </a:t>
+            </a:r>
+            <a:endParaRPr lang="en-US" altLang="ko-KR" sz="1600" dirty="0" smtClean="0"/>
+          </a:p>
+          <a:p>
+            <a:pPr marL="285750" indent="-285750">
+              <a:buFontTx/>
+              <a:buChar char="-"/>
+            </a:pPr>
+            <a:endParaRPr lang="en-US" altLang="ko-KR" sz="1600" dirty="0"/>
+          </a:p>
+          <a:p>
+            <a:r>
+              <a:rPr lang="en-US" altLang="ko-KR" sz="1600" dirty="0"/>
+              <a:t>6 </a:t>
+            </a:r>
+            <a:r>
+              <a:rPr lang="en-US" altLang="ko-KR" sz="1600" dirty="0" smtClean="0"/>
+              <a:t>. </a:t>
+            </a:r>
+            <a:r>
+              <a:rPr lang="ko-KR" altLang="en-US" sz="1600" dirty="0"/>
+              <a:t>문의하기 보기</a:t>
+            </a:r>
+            <a:r>
+              <a:rPr lang="ko-KR" altLang="en-US" sz="1600" dirty="0" smtClean="0"/>
+              <a:t>  </a:t>
+            </a:r>
+            <a:endParaRPr lang="en-US" altLang="ko-KR" sz="1600" dirty="0" smtClean="0"/>
+          </a:p>
+          <a:p>
+            <a:pPr marL="285750" indent="-285750">
+              <a:buFontTx/>
+              <a:buChar char="-"/>
+            </a:pPr>
+            <a:r>
+              <a:rPr lang="ko-KR" altLang="en-US" sz="1600" dirty="0" smtClean="0"/>
+              <a:t>제목 </a:t>
+            </a:r>
+            <a:r>
+              <a:rPr lang="ko-KR" altLang="en-US" sz="1600" dirty="0"/>
+              <a:t>클릭해서 보기 화면 </a:t>
+            </a:r>
+            <a:r>
+              <a:rPr lang="ko-KR" altLang="en-US" sz="1600" dirty="0" smtClean="0"/>
+              <a:t>이동</a:t>
+            </a:r>
+            <a:endParaRPr lang="en-US" altLang="ko-KR" sz="1600" dirty="0" smtClean="0"/>
+          </a:p>
+          <a:p>
+            <a:endParaRPr lang="en-US" altLang="ko-KR" sz="1600" dirty="0" smtClean="0"/>
+          </a:p>
+          <a:p>
+            <a:pPr marL="342900" indent="-342900">
+              <a:buAutoNum type="arabicPeriod" startAt="7"/>
+            </a:pPr>
+            <a:r>
+              <a:rPr lang="ko-KR" altLang="en-US" sz="1600" dirty="0"/>
+              <a:t>페이지 번호</a:t>
+            </a:r>
+            <a:r>
+              <a:rPr lang="ko-KR" altLang="en-US" sz="1600" dirty="0" smtClean="0"/>
+              <a:t> </a:t>
+            </a:r>
+            <a:endParaRPr lang="en-US" altLang="ko-KR" sz="1600" dirty="0" smtClean="0"/>
+          </a:p>
+          <a:p>
+            <a:pPr marL="285750" indent="-285750">
+              <a:buFontTx/>
+              <a:buChar char="-"/>
+            </a:pPr>
+            <a:r>
+              <a:rPr lang="en-US" altLang="ko-KR" sz="1600" dirty="0" smtClean="0"/>
+              <a:t>10</a:t>
+            </a:r>
+            <a:r>
+              <a:rPr lang="ko-KR" altLang="en-US" sz="1600" dirty="0"/>
+              <a:t>개씩 공지사항 출력</a:t>
+            </a:r>
+            <a:endParaRPr lang="en-US" altLang="ko-KR" sz="1600" dirty="0" smtClean="0"/>
+          </a:p>
+        </p:txBody>
+      </p:sp>
+    </p:spTree>
+    <p:extLst>
+      <p:ext uri="{BB962C8B-B14F-4D97-AF65-F5344CB8AC3E}">
+        <p14:creationId xmlns:p14="http://schemas.microsoft.com/office/powerpoint/2010/main" val="4275518591"/>
+      </p:ext>
+    </p:extLst>
+  </p:cSld>
+  <p:clrMapOvr>
+    <a:masterClrMapping/>
+  </p:clrMapOvr>
+</p:sld>
+</file>
+
+<file path=ppt/slides/slide19.xml><?xml version="1.0" encoding="utf-8"?>
+<p:sld xmlns:a="http://schemas.openxmlformats.org/drawingml/2006/main" xmlns:r="http://schemas.openxmlformats.org/officeDocument/2006/relationships" xmlns:p="http://schemas.openxmlformats.org/presentationml/2006/main">
+  <p:cSld>
+    <p:spTree>
+      <p:nvGrpSpPr>
+        <p:cNvPr id="1" name=""/>
+        <p:cNvGrpSpPr/>
+        <p:nvPr/>
+      </p:nvGrpSpPr>
+      <p:grpSpPr>
+        <a:xfrm>
+          <a:off x="0" y="0"/>
+          <a:ext cx="0" cy="0"/>
+          <a:chOff x="0" y="0"/>
+          <a:chExt cx="0" cy="0"/>
+        </a:xfrm>
+      </p:grpSpPr>
+      <p:sp>
+        <p:nvSpPr>
+          <p:cNvPr id="2" name="제목 1"/>
+          <p:cNvSpPr>
+            <a:spLocks noGrp="1"/>
+          </p:cNvSpPr>
+          <p:nvPr>
+            <p:ph type="title"/>
+          </p:nvPr>
+        </p:nvSpPr>
+        <p:spPr>
+          <a:xfrm>
+            <a:off x="730666" y="0"/>
+            <a:ext cx="9601200" cy="1485900"/>
+          </a:xfrm>
+        </p:spPr>
+        <p:txBody>
+          <a:bodyPr/>
+          <a:lstStyle/>
+          <a:p>
+            <a:r>
+              <a:rPr lang="en-US" altLang="ko-KR" dirty="0" smtClean="0"/>
+              <a:t>Admin </a:t>
+            </a:r>
+            <a:r>
+              <a:rPr lang="en-US" altLang="ko-KR" dirty="0" err="1" smtClean="0"/>
+              <a:t>Qna</a:t>
+            </a:r>
+            <a:r>
+              <a:rPr lang="en-US" altLang="ko-KR" dirty="0" smtClean="0"/>
+              <a:t> View / Reply </a:t>
+            </a:r>
+            <a:r>
+              <a:rPr lang="ko-KR" altLang="en-US" dirty="0" smtClean="0"/>
+              <a:t>기능</a:t>
+            </a:r>
+            <a:endParaRPr lang="ko-KR" altLang="en-US" dirty="0"/>
+          </a:p>
+        </p:txBody>
+      </p:sp>
+      <p:sp>
+        <p:nvSpPr>
+          <p:cNvPr id="7" name="TextBox 6"/>
+          <p:cNvSpPr txBox="1"/>
+          <p:nvPr/>
+        </p:nvSpPr>
+        <p:spPr>
+          <a:xfrm>
+            <a:off x="8429892" y="90427"/>
+            <a:ext cx="3640187" cy="5755422"/>
+          </a:xfrm>
+          <a:prstGeom prst="rect">
+            <a:avLst/>
+          </a:prstGeom>
+          <a:noFill/>
+        </p:spPr>
+        <p:txBody>
+          <a:bodyPr wrap="square" rtlCol="0">
+            <a:spAutoFit/>
+          </a:bodyPr>
+          <a:lstStyle/>
+          <a:p>
+            <a:r>
+              <a:rPr lang="ko-KR" altLang="en-US" sz="1600" dirty="0" smtClean="0"/>
+              <a:t>기능 설명</a:t>
+            </a:r>
+            <a:endParaRPr lang="en-US" altLang="ko-KR" sz="1600" dirty="0" smtClean="0"/>
+          </a:p>
+          <a:p>
+            <a:pPr marL="342900" indent="-342900">
+              <a:buFont typeface="+mj-lt"/>
+              <a:buAutoNum type="arabicPeriod"/>
+            </a:pPr>
+            <a:r>
+              <a:rPr lang="ko-KR" altLang="en-US" sz="1600" dirty="0"/>
+              <a:t>문의하기 </a:t>
+            </a:r>
+            <a:r>
+              <a:rPr lang="ko-KR" altLang="en-US" sz="1600" dirty="0" smtClean="0"/>
+              <a:t>메뉴</a:t>
+            </a:r>
+            <a:r>
+              <a:rPr lang="en-US" altLang="ko-KR" sz="1600" dirty="0" smtClean="0"/>
+              <a:t> </a:t>
+            </a:r>
+            <a:endParaRPr lang="en-US" altLang="ko-KR" sz="1600" dirty="0" smtClean="0"/>
+          </a:p>
+          <a:p>
+            <a:pPr marL="285750" indent="-285750">
+              <a:buFontTx/>
+              <a:buChar char="-"/>
+            </a:pPr>
+            <a:r>
+              <a:rPr lang="ko-KR" altLang="en-US" sz="1600" dirty="0" smtClean="0"/>
+              <a:t>쇼핑몰 </a:t>
+            </a:r>
+            <a:r>
+              <a:rPr lang="ko-KR" altLang="en-US" sz="1600" dirty="0"/>
+              <a:t>사용자가 문의 하는 내용에 답변할 수 있는 메뉴 </a:t>
+            </a:r>
+            <a:endParaRPr lang="en-US" altLang="ko-KR" sz="1600" dirty="0" smtClean="0"/>
+          </a:p>
+          <a:p>
+            <a:endParaRPr lang="en-US" altLang="ko-KR" sz="1600" dirty="0" smtClean="0"/>
+          </a:p>
+          <a:p>
+            <a:pPr marL="342900" indent="-342900">
+              <a:buAutoNum type="arabicPeriod" startAt="2"/>
+            </a:pPr>
+            <a:r>
+              <a:rPr lang="ko-KR" altLang="en-US" sz="1600" dirty="0" smtClean="0"/>
+              <a:t>보기</a:t>
+            </a:r>
+            <a:endParaRPr lang="en-US" altLang="ko-KR" sz="1600" dirty="0" smtClean="0"/>
+          </a:p>
+          <a:p>
+            <a:pPr marL="285750" indent="-285750">
+              <a:buFontTx/>
+              <a:buChar char="-"/>
+            </a:pPr>
+            <a:r>
+              <a:rPr lang="ko-KR" altLang="en-US" sz="1600" dirty="0" smtClean="0"/>
+              <a:t>목록에서 </a:t>
+            </a:r>
+            <a:r>
+              <a:rPr lang="ko-KR" altLang="en-US" sz="1600" dirty="0"/>
+              <a:t>선택한 내용 </a:t>
+            </a:r>
+            <a:r>
+              <a:rPr lang="ko-KR" altLang="en-US" sz="1600" dirty="0" smtClean="0"/>
+              <a:t>출력</a:t>
+            </a:r>
+            <a:endParaRPr lang="en-US" altLang="ko-KR" sz="1600" dirty="0" smtClean="0"/>
+          </a:p>
+          <a:p>
+            <a:pPr marL="285750" indent="-285750">
+              <a:buFontTx/>
+              <a:buChar char="-"/>
+            </a:pPr>
+            <a:endParaRPr lang="en-US" altLang="ko-KR" sz="1600" dirty="0" smtClean="0"/>
+          </a:p>
+          <a:p>
+            <a:r>
+              <a:rPr lang="en-US" altLang="ko-KR" sz="1600" dirty="0" smtClean="0"/>
+              <a:t>3. </a:t>
+            </a:r>
+            <a:r>
+              <a:rPr lang="ko-KR" altLang="en-US" sz="1600" dirty="0" smtClean="0"/>
+              <a:t>답변</a:t>
+            </a:r>
+            <a:r>
+              <a:rPr lang="ko-KR" altLang="en-US" sz="1600" dirty="0" smtClean="0"/>
+              <a:t> </a:t>
+            </a:r>
+            <a:endParaRPr lang="en-US" altLang="ko-KR" sz="1600" dirty="0" smtClean="0"/>
+          </a:p>
+          <a:p>
+            <a:pPr marL="285750" indent="-285750">
+              <a:buFontTx/>
+              <a:buChar char="-"/>
+            </a:pPr>
+            <a:r>
+              <a:rPr lang="ko-KR" altLang="en-US" sz="1600" dirty="0" smtClean="0"/>
+              <a:t>체크박스 </a:t>
+            </a:r>
+            <a:r>
+              <a:rPr lang="ko-KR" altLang="en-US" sz="1600" dirty="0"/>
+              <a:t>선택한 글 </a:t>
+            </a:r>
+            <a:r>
+              <a:rPr lang="ko-KR" altLang="en-US" sz="1600" dirty="0" smtClean="0"/>
+              <a:t>선택 삭제</a:t>
+            </a:r>
+            <a:endParaRPr lang="en-US" altLang="ko-KR" sz="1600" dirty="0" smtClean="0"/>
+          </a:p>
+          <a:p>
+            <a:endParaRPr lang="en-US" altLang="ko-KR" sz="1600" dirty="0" smtClean="0"/>
+          </a:p>
+          <a:p>
+            <a:r>
+              <a:rPr lang="en-US" altLang="ko-KR" sz="1600" dirty="0" smtClean="0"/>
+              <a:t>4.  </a:t>
+            </a:r>
+            <a:r>
+              <a:rPr lang="ko-KR" altLang="en-US" sz="1600" dirty="0" smtClean="0"/>
+              <a:t>공지사항 </a:t>
+            </a:r>
+            <a:r>
+              <a:rPr lang="ko-KR" altLang="en-US" sz="1600" dirty="0"/>
+              <a:t>제목 </a:t>
+            </a:r>
+            <a:endParaRPr lang="en-US" altLang="ko-KR" sz="1600" dirty="0" smtClean="0"/>
+          </a:p>
+          <a:p>
+            <a:r>
+              <a:rPr lang="en-US" altLang="ko-KR" sz="1600" dirty="0" smtClean="0"/>
+              <a:t>-    </a:t>
+            </a:r>
+            <a:r>
+              <a:rPr lang="ko-KR" altLang="en-US" sz="1600" dirty="0" smtClean="0"/>
+              <a:t>문의 내용에 </a:t>
+            </a:r>
+            <a:r>
+              <a:rPr lang="ko-KR" altLang="en-US" sz="1600" dirty="0"/>
+              <a:t>맞는 답변 작성</a:t>
+            </a:r>
+            <a:endParaRPr lang="en-US" altLang="ko-KR" sz="1600" dirty="0"/>
+          </a:p>
+          <a:p>
+            <a:endParaRPr lang="en-US" altLang="ko-KR" sz="1600" dirty="0" smtClean="0"/>
+          </a:p>
+          <a:p>
+            <a:r>
+              <a:rPr lang="en-US" altLang="ko-KR" sz="1600" dirty="0" smtClean="0"/>
+              <a:t>5. </a:t>
+            </a:r>
+            <a:r>
+              <a:rPr lang="en-US" altLang="ko-KR" sz="1600" dirty="0" smtClean="0"/>
+              <a:t> </a:t>
+            </a:r>
+            <a:r>
+              <a:rPr lang="ko-KR" altLang="en-US" sz="1600" dirty="0" smtClean="0"/>
+              <a:t>삭제 </a:t>
+            </a:r>
+            <a:r>
+              <a:rPr lang="ko-KR" altLang="en-US" sz="1600" dirty="0" smtClean="0"/>
+              <a:t> </a:t>
+            </a:r>
+            <a:endParaRPr lang="en-US" altLang="ko-KR" sz="1600" dirty="0" smtClean="0"/>
+          </a:p>
+          <a:p>
+            <a:pPr marL="285750" indent="-285750">
+              <a:buFontTx/>
+              <a:buChar char="-"/>
+            </a:pPr>
+            <a:r>
+              <a:rPr lang="ko-KR" altLang="en-US" sz="1600" dirty="0" smtClean="0"/>
+              <a:t>해당 </a:t>
+            </a:r>
+            <a:r>
+              <a:rPr lang="ko-KR" altLang="en-US" sz="1600" dirty="0"/>
+              <a:t>글 삭제 </a:t>
+            </a:r>
+            <a:endParaRPr lang="en-US" altLang="ko-KR" sz="1600" dirty="0" smtClean="0"/>
+          </a:p>
+          <a:p>
+            <a:pPr marL="285750" indent="-285750">
+              <a:buFontTx/>
+              <a:buChar char="-"/>
+            </a:pPr>
+            <a:r>
+              <a:rPr lang="ko-KR" altLang="en-US" sz="1600" dirty="0" smtClean="0"/>
+              <a:t>사용자 </a:t>
+            </a:r>
+            <a:r>
+              <a:rPr lang="ko-KR" altLang="en-US" sz="1600" dirty="0"/>
+              <a:t>확인 대화상자 </a:t>
+            </a:r>
+            <a:r>
+              <a:rPr lang="ko-KR" altLang="en-US" sz="1600" dirty="0" smtClean="0"/>
+              <a:t>출력</a:t>
+            </a:r>
+            <a:endParaRPr lang="en-US" altLang="ko-KR" sz="1600" dirty="0" smtClean="0"/>
+          </a:p>
+          <a:p>
+            <a:r>
+              <a:rPr lang="ko-KR" altLang="en-US" sz="1600" dirty="0" smtClean="0"/>
+              <a:t> </a:t>
+            </a:r>
+            <a:endParaRPr lang="en-US" altLang="ko-KR" sz="1600" dirty="0"/>
+          </a:p>
+          <a:p>
+            <a:r>
+              <a:rPr lang="en-US" altLang="ko-KR" sz="1600" dirty="0"/>
+              <a:t>6 </a:t>
+            </a:r>
+            <a:r>
+              <a:rPr lang="en-US" altLang="ko-KR" sz="1600" dirty="0" smtClean="0"/>
+              <a:t>. </a:t>
+            </a:r>
+            <a:r>
+              <a:rPr lang="ko-KR" altLang="en-US" sz="1600" dirty="0" smtClean="0"/>
+              <a:t>답변 등록</a:t>
+            </a:r>
+            <a:r>
+              <a:rPr lang="ko-KR" altLang="en-US" sz="1600" dirty="0" smtClean="0"/>
+              <a:t>  </a:t>
+            </a:r>
+            <a:endParaRPr lang="en-US" altLang="ko-KR" sz="1600" dirty="0" smtClean="0"/>
+          </a:p>
+          <a:p>
+            <a:pPr marL="285750" indent="-285750">
+              <a:buFontTx/>
+              <a:buChar char="-"/>
+            </a:pPr>
+            <a:r>
+              <a:rPr lang="ko-KR" altLang="en-US" sz="1600" dirty="0" smtClean="0"/>
+              <a:t>작성된 </a:t>
+            </a:r>
+            <a:r>
+              <a:rPr lang="ko-KR" altLang="en-US" sz="1600" dirty="0"/>
+              <a:t>답변 등록하기 </a:t>
+            </a:r>
+            <a:endParaRPr lang="en-US" altLang="ko-KR" sz="1600" dirty="0" smtClean="0"/>
+          </a:p>
+          <a:p>
+            <a:pPr marL="285750" indent="-285750">
+              <a:buFontTx/>
+              <a:buChar char="-"/>
+            </a:pPr>
+            <a:endParaRPr lang="en-US" altLang="ko-KR" sz="1600" dirty="0" smtClean="0"/>
+          </a:p>
+          <a:p>
+            <a:pPr marL="342900" indent="-342900">
+              <a:buAutoNum type="arabicPeriod" startAt="7"/>
+            </a:pPr>
+            <a:r>
+              <a:rPr lang="ko-KR" altLang="en-US" sz="1600" dirty="0" smtClean="0"/>
+              <a:t>목록</a:t>
+            </a:r>
+            <a:r>
+              <a:rPr lang="ko-KR" altLang="en-US" sz="1600" dirty="0" smtClean="0"/>
+              <a:t> </a:t>
+            </a:r>
+            <a:endParaRPr lang="en-US" altLang="ko-KR" sz="1600" dirty="0" smtClean="0"/>
+          </a:p>
+          <a:p>
+            <a:pPr marL="285750" indent="-285750">
+              <a:buFontTx/>
+              <a:buChar char="-"/>
+            </a:pPr>
+            <a:r>
+              <a:rPr lang="ko-KR" altLang="en-US" sz="1600" dirty="0" smtClean="0"/>
+              <a:t>글 </a:t>
+            </a:r>
+            <a:r>
+              <a:rPr lang="ko-KR" altLang="en-US" sz="1600" dirty="0"/>
+              <a:t>목록 이동</a:t>
+            </a:r>
+            <a:endParaRPr lang="en-US" altLang="ko-KR" sz="1600" dirty="0" smtClean="0"/>
+          </a:p>
+        </p:txBody>
+      </p:sp>
+      <p:pic>
+        <p:nvPicPr>
+          <p:cNvPr id="4" name="그림 3"/>
+          <p:cNvPicPr>
+            <a:picLocks noChangeAspect="1"/>
+          </p:cNvPicPr>
+          <p:nvPr/>
+        </p:nvPicPr>
+        <p:blipFill>
+          <a:blip r:embed="rId2">
+            <a:extLst>
+              <a:ext uri="{28A0092B-C50C-407E-A947-70E740481C1C}">
+                <a14:useLocalDpi xmlns:a14="http://schemas.microsoft.com/office/drawing/2010/main" val="0"/>
+              </a:ext>
+            </a:extLst>
+          </a:blip>
+          <a:stretch>
+            <a:fillRect/>
+          </a:stretch>
+        </p:blipFill>
+        <p:spPr>
+          <a:xfrm>
+            <a:off x="730666" y="742950"/>
+            <a:ext cx="7269309" cy="4496899"/>
+          </a:xfrm>
+          <a:prstGeom prst="rect">
+            <a:avLst/>
+          </a:prstGeom>
+        </p:spPr>
+      </p:pic>
+    </p:spTree>
+    <p:extLst>
+      <p:ext uri="{BB962C8B-B14F-4D97-AF65-F5344CB8AC3E}">
+        <p14:creationId xmlns:p14="http://schemas.microsoft.com/office/powerpoint/2010/main" val="3560220332"/>
+      </p:ext>
+    </p:extLst>
+  </p:cSld>
+  <p:clrMapOvr>
+    <a:masterClrMapping/>
+  </p:clrMapOvr>
+</p:sld>
+</file>
+
 <file path=ppt/slides/slide2.xml><?xml version="1.0" encoding="utf-8"?>
 <p:sld xmlns:a="http://schemas.openxmlformats.org/drawingml/2006/main" xmlns:r="http://schemas.openxmlformats.org/officeDocument/2006/relationships" xmlns:p="http://schemas.openxmlformats.org/presentationml/2006/main">
   <p:cSld>

</xml_diff>